<commit_message>
[ENSG ASI 2014] Reorg
</commit_message>
<xml_diff>
--- a/cours/ensg-asi-2014/src/raws/img_gen.pptx
+++ b/cours/ensg-asi-2014/src/raws/img_gen.pptx
@@ -9,6 +9,7 @@
     <p:sldId id="257" r:id="rId3"/>
     <p:sldId id="258" r:id="rId4"/>
     <p:sldId id="259" r:id="rId5"/>
+    <p:sldId id="260" r:id="rId6"/>
   </p:sldIdLst>
   <p:sldSz cx="9144000" cy="6858000" type="screen4x3"/>
   <p:notesSz cx="6858000" cy="9144000"/>
@@ -5012,6 +5013,477 @@
 </p:sld>
 </file>
 
+<file path=ppt/slides/slide5.xml><?xml version="1.0" encoding="utf-8"?>
+<p:sld xmlns:a="http://schemas.openxmlformats.org/drawingml/2006/main" xmlns:r="http://schemas.openxmlformats.org/officeDocument/2006/relationships" xmlns:p="http://schemas.openxmlformats.org/presentationml/2006/main">
+  <p:cSld>
+    <p:spTree>
+      <p:nvGrpSpPr>
+        <p:cNvPr id="1" name=""/>
+        <p:cNvGrpSpPr/>
+        <p:nvPr/>
+      </p:nvGrpSpPr>
+      <p:grpSpPr>
+        <a:xfrm>
+          <a:off x="0" y="0"/>
+          <a:ext cx="0" cy="0"/>
+          <a:chOff x="0" y="0"/>
+          <a:chExt cx="0" cy="0"/>
+        </a:xfrm>
+      </p:grpSpPr>
+      <p:sp>
+        <p:nvSpPr>
+          <p:cNvPr id="2" name="Rectangle à coins arrondis 1"/>
+          <p:cNvSpPr/>
+          <p:nvPr/>
+        </p:nvSpPr>
+        <p:spPr>
+          <a:xfrm>
+            <a:off x="2877433" y="1362069"/>
+            <a:ext cx="2808312" cy="826190"/>
+          </a:xfrm>
+          <a:prstGeom prst="roundRect">
+            <a:avLst/>
+          </a:prstGeom>
+        </p:spPr>
+        <p:style>
+          <a:lnRef idx="2">
+            <a:schemeClr val="accent3">
+              <a:shade val="50000"/>
+            </a:schemeClr>
+          </a:lnRef>
+          <a:fillRef idx="1">
+            <a:schemeClr val="accent3"/>
+          </a:fillRef>
+          <a:effectRef idx="0">
+            <a:schemeClr val="accent3"/>
+          </a:effectRef>
+          <a:fontRef idx="minor">
+            <a:schemeClr val="lt1"/>
+          </a:fontRef>
+        </p:style>
+        <p:txBody>
+          <a:bodyPr rtlCol="0" anchor="ctr"/>
+          <a:lstStyle/>
+          <a:p>
+            <a:r>
+              <a:rPr lang="fr-FR" sz="2400" dirty="0" smtClean="0"/>
+              <a:t>Présentation</a:t>
+            </a:r>
+            <a:endParaRPr lang="fr-FR" sz="2400" dirty="0"/>
+          </a:p>
+        </p:txBody>
+      </p:sp>
+      <p:sp>
+        <p:nvSpPr>
+          <p:cNvPr id="5" name="Rectangle à coins arrondis 4"/>
+          <p:cNvSpPr/>
+          <p:nvPr/>
+        </p:nvSpPr>
+        <p:spPr>
+          <a:xfrm>
+            <a:off x="2877433" y="2708920"/>
+            <a:ext cx="2808312" cy="826190"/>
+          </a:xfrm>
+          <a:prstGeom prst="roundRect">
+            <a:avLst/>
+          </a:prstGeom>
+        </p:spPr>
+        <p:style>
+          <a:lnRef idx="2">
+            <a:schemeClr val="accent1">
+              <a:shade val="50000"/>
+            </a:schemeClr>
+          </a:lnRef>
+          <a:fillRef idx="1">
+            <a:schemeClr val="accent1"/>
+          </a:fillRef>
+          <a:effectRef idx="0">
+            <a:schemeClr val="accent1"/>
+          </a:effectRef>
+          <a:fontRef idx="minor">
+            <a:schemeClr val="lt1"/>
+          </a:fontRef>
+        </p:style>
+        <p:txBody>
+          <a:bodyPr rtlCol="0" anchor="ctr"/>
+          <a:lstStyle/>
+          <a:p>
+            <a:r>
+              <a:rPr lang="fr-FR" sz="2400" dirty="0" smtClean="0"/>
+              <a:t>Métier</a:t>
+            </a:r>
+            <a:endParaRPr lang="fr-FR" sz="2400" dirty="0"/>
+          </a:p>
+        </p:txBody>
+      </p:sp>
+      <p:sp>
+        <p:nvSpPr>
+          <p:cNvPr id="6" name="Rectangle à coins arrondis 5"/>
+          <p:cNvSpPr/>
+          <p:nvPr/>
+        </p:nvSpPr>
+        <p:spPr>
+          <a:xfrm>
+            <a:off x="2877433" y="4061923"/>
+            <a:ext cx="2808312" cy="826190"/>
+          </a:xfrm>
+          <a:prstGeom prst="roundRect">
+            <a:avLst/>
+          </a:prstGeom>
+        </p:spPr>
+        <p:style>
+          <a:lnRef idx="2">
+            <a:schemeClr val="accent2">
+              <a:shade val="50000"/>
+            </a:schemeClr>
+          </a:lnRef>
+          <a:fillRef idx="1">
+            <a:schemeClr val="accent2"/>
+          </a:fillRef>
+          <a:effectRef idx="0">
+            <a:schemeClr val="accent2"/>
+          </a:effectRef>
+          <a:fontRef idx="minor">
+            <a:schemeClr val="lt1"/>
+          </a:fontRef>
+        </p:style>
+        <p:txBody>
+          <a:bodyPr rtlCol="0" anchor="ctr"/>
+          <a:lstStyle/>
+          <a:p>
+            <a:r>
+              <a:rPr lang="fr-FR" sz="2400" dirty="0" smtClean="0"/>
+              <a:t>Accès aux donnée</a:t>
+            </a:r>
+            <a:endParaRPr lang="fr-FR" sz="2400" dirty="0"/>
+          </a:p>
+        </p:txBody>
+      </p:sp>
+      <p:sp>
+        <p:nvSpPr>
+          <p:cNvPr id="7" name="Émoticône 6"/>
+          <p:cNvSpPr/>
+          <p:nvPr/>
+        </p:nvSpPr>
+        <p:spPr>
+          <a:xfrm>
+            <a:off x="3966560" y="404664"/>
+            <a:ext cx="630057" cy="576064"/>
+          </a:xfrm>
+          <a:prstGeom prst="smileyFace">
+            <a:avLst/>
+          </a:prstGeom>
+        </p:spPr>
+        <p:style>
+          <a:lnRef idx="2">
+            <a:schemeClr val="accent3">
+              <a:shade val="50000"/>
+            </a:schemeClr>
+          </a:lnRef>
+          <a:fillRef idx="1">
+            <a:schemeClr val="accent3"/>
+          </a:fillRef>
+          <a:effectRef idx="0">
+            <a:schemeClr val="accent3"/>
+          </a:effectRef>
+          <a:fontRef idx="minor">
+            <a:schemeClr val="lt1"/>
+          </a:fontRef>
+        </p:style>
+        <p:txBody>
+          <a:bodyPr rtlCol="0" anchor="ctr"/>
+          <a:lstStyle/>
+          <a:p>
+            <a:pPr algn="ctr"/>
+            <a:endParaRPr lang="fr-FR"/>
+          </a:p>
+        </p:txBody>
+      </p:sp>
+      <p:sp>
+        <p:nvSpPr>
+          <p:cNvPr id="8" name="Cylindre 7"/>
+          <p:cNvSpPr/>
+          <p:nvPr/>
+        </p:nvSpPr>
+        <p:spPr>
+          <a:xfrm>
+            <a:off x="3743908" y="5464937"/>
+            <a:ext cx="1080120" cy="936104"/>
+          </a:xfrm>
+          <a:prstGeom prst="can">
+            <a:avLst/>
+          </a:prstGeom>
+        </p:spPr>
+        <p:style>
+          <a:lnRef idx="2">
+            <a:schemeClr val="accent6">
+              <a:shade val="50000"/>
+            </a:schemeClr>
+          </a:lnRef>
+          <a:fillRef idx="1">
+            <a:schemeClr val="accent6"/>
+          </a:fillRef>
+          <a:effectRef idx="0">
+            <a:schemeClr val="accent6"/>
+          </a:effectRef>
+          <a:fontRef idx="minor">
+            <a:schemeClr val="lt1"/>
+          </a:fontRef>
+        </p:style>
+        <p:txBody>
+          <a:bodyPr rtlCol="0" anchor="ctr"/>
+          <a:lstStyle/>
+          <a:p>
+            <a:pPr algn="ctr"/>
+            <a:r>
+              <a:rPr lang="fr-FR" dirty="0" smtClean="0"/>
+              <a:t>Donnée</a:t>
+            </a:r>
+            <a:endParaRPr lang="fr-FR" dirty="0"/>
+          </a:p>
+        </p:txBody>
+      </p:sp>
+      <p:sp>
+        <p:nvSpPr>
+          <p:cNvPr id="9" name="Éclair 8"/>
+          <p:cNvSpPr/>
+          <p:nvPr/>
+        </p:nvSpPr>
+        <p:spPr>
+          <a:xfrm>
+            <a:off x="4878315" y="1553601"/>
+            <a:ext cx="576064" cy="443126"/>
+          </a:xfrm>
+          <a:prstGeom prst="lightningBolt">
+            <a:avLst/>
+          </a:prstGeom>
+        </p:spPr>
+        <p:style>
+          <a:lnRef idx="2">
+            <a:schemeClr val="accent3">
+              <a:shade val="50000"/>
+            </a:schemeClr>
+          </a:lnRef>
+          <a:fillRef idx="1">
+            <a:schemeClr val="accent3"/>
+          </a:fillRef>
+          <a:effectRef idx="0">
+            <a:schemeClr val="accent3"/>
+          </a:effectRef>
+          <a:fontRef idx="minor">
+            <a:schemeClr val="lt1"/>
+          </a:fontRef>
+        </p:style>
+        <p:txBody>
+          <a:bodyPr rtlCol="0" anchor="ctr"/>
+          <a:lstStyle/>
+          <a:p>
+            <a:pPr algn="ctr"/>
+            <a:endParaRPr lang="fr-FR"/>
+          </a:p>
+        </p:txBody>
+      </p:sp>
+      <p:sp>
+        <p:nvSpPr>
+          <p:cNvPr id="10" name="Éclair 9"/>
+          <p:cNvSpPr/>
+          <p:nvPr/>
+        </p:nvSpPr>
+        <p:spPr>
+          <a:xfrm>
+            <a:off x="4878315" y="2900452"/>
+            <a:ext cx="576064" cy="443126"/>
+          </a:xfrm>
+          <a:prstGeom prst="lightningBolt">
+            <a:avLst/>
+          </a:prstGeom>
+        </p:spPr>
+        <p:style>
+          <a:lnRef idx="2">
+            <a:schemeClr val="accent1">
+              <a:shade val="50000"/>
+            </a:schemeClr>
+          </a:lnRef>
+          <a:fillRef idx="1">
+            <a:schemeClr val="accent1"/>
+          </a:fillRef>
+          <a:effectRef idx="0">
+            <a:schemeClr val="accent1"/>
+          </a:effectRef>
+          <a:fontRef idx="minor">
+            <a:schemeClr val="lt1"/>
+          </a:fontRef>
+        </p:style>
+        <p:txBody>
+          <a:bodyPr rtlCol="0" anchor="ctr"/>
+          <a:lstStyle/>
+          <a:p>
+            <a:pPr algn="ctr"/>
+            <a:endParaRPr lang="fr-FR"/>
+          </a:p>
+        </p:txBody>
+      </p:sp>
+      <p:cxnSp>
+        <p:nvCxnSpPr>
+          <p:cNvPr id="12" name="Connecteur droit avec flèche 11"/>
+          <p:cNvCxnSpPr>
+            <a:stCxn id="7" idx="4"/>
+            <a:endCxn id="2" idx="0"/>
+          </p:cNvCxnSpPr>
+          <p:nvPr/>
+        </p:nvCxnSpPr>
+        <p:spPr>
+          <a:xfrm>
+            <a:off x="4281589" y="980728"/>
+            <a:ext cx="0" cy="381341"/>
+          </a:xfrm>
+          <a:prstGeom prst="straightConnector1">
+            <a:avLst/>
+          </a:prstGeom>
+          <a:ln>
+            <a:headEnd type="arrow"/>
+            <a:tailEnd type="arrow"/>
+          </a:ln>
+        </p:spPr>
+        <p:style>
+          <a:lnRef idx="2">
+            <a:schemeClr val="dk1"/>
+          </a:lnRef>
+          <a:fillRef idx="0">
+            <a:schemeClr val="dk1"/>
+          </a:fillRef>
+          <a:effectRef idx="1">
+            <a:schemeClr val="dk1"/>
+          </a:effectRef>
+          <a:fontRef idx="minor">
+            <a:schemeClr val="tx1"/>
+          </a:fontRef>
+        </p:style>
+      </p:cxnSp>
+      <p:cxnSp>
+        <p:nvCxnSpPr>
+          <p:cNvPr id="13" name="Connecteur droit avec flèche 12"/>
+          <p:cNvCxnSpPr>
+            <a:stCxn id="2" idx="2"/>
+            <a:endCxn id="5" idx="0"/>
+          </p:cNvCxnSpPr>
+          <p:nvPr/>
+        </p:nvCxnSpPr>
+        <p:spPr>
+          <a:xfrm>
+            <a:off x="4281589" y="2188259"/>
+            <a:ext cx="0" cy="520661"/>
+          </a:xfrm>
+          <a:prstGeom prst="straightConnector1">
+            <a:avLst/>
+          </a:prstGeom>
+          <a:ln>
+            <a:headEnd type="arrow"/>
+            <a:tailEnd type="arrow"/>
+          </a:ln>
+        </p:spPr>
+        <p:style>
+          <a:lnRef idx="2">
+            <a:schemeClr val="dk1"/>
+          </a:lnRef>
+          <a:fillRef idx="0">
+            <a:schemeClr val="dk1"/>
+          </a:fillRef>
+          <a:effectRef idx="1">
+            <a:schemeClr val="dk1"/>
+          </a:effectRef>
+          <a:fontRef idx="minor">
+            <a:schemeClr val="tx1"/>
+          </a:fontRef>
+        </p:style>
+      </p:cxnSp>
+      <p:cxnSp>
+        <p:nvCxnSpPr>
+          <p:cNvPr id="16" name="Connecteur droit avec flèche 15"/>
+          <p:cNvCxnSpPr>
+            <a:stCxn id="5" idx="2"/>
+            <a:endCxn id="6" idx="0"/>
+          </p:cNvCxnSpPr>
+          <p:nvPr/>
+        </p:nvCxnSpPr>
+        <p:spPr>
+          <a:xfrm>
+            <a:off x="4281589" y="3535110"/>
+            <a:ext cx="0" cy="526813"/>
+          </a:xfrm>
+          <a:prstGeom prst="straightConnector1">
+            <a:avLst/>
+          </a:prstGeom>
+          <a:ln>
+            <a:headEnd type="arrow"/>
+            <a:tailEnd type="arrow"/>
+          </a:ln>
+        </p:spPr>
+        <p:style>
+          <a:lnRef idx="2">
+            <a:schemeClr val="dk1"/>
+          </a:lnRef>
+          <a:fillRef idx="0">
+            <a:schemeClr val="dk1"/>
+          </a:fillRef>
+          <a:effectRef idx="1">
+            <a:schemeClr val="dk1"/>
+          </a:effectRef>
+          <a:fontRef idx="minor">
+            <a:schemeClr val="tx1"/>
+          </a:fontRef>
+        </p:style>
+      </p:cxnSp>
+      <p:cxnSp>
+        <p:nvCxnSpPr>
+          <p:cNvPr id="19" name="Connecteur droit avec flèche 18"/>
+          <p:cNvCxnSpPr>
+            <a:stCxn id="6" idx="2"/>
+            <a:endCxn id="8" idx="1"/>
+          </p:cNvCxnSpPr>
+          <p:nvPr/>
+        </p:nvCxnSpPr>
+        <p:spPr>
+          <a:xfrm>
+            <a:off x="4281589" y="4888113"/>
+            <a:ext cx="2379" cy="576824"/>
+          </a:xfrm>
+          <a:prstGeom prst="straightConnector1">
+            <a:avLst/>
+          </a:prstGeom>
+          <a:ln>
+            <a:headEnd type="arrow"/>
+            <a:tailEnd type="arrow"/>
+          </a:ln>
+        </p:spPr>
+        <p:style>
+          <a:lnRef idx="2">
+            <a:schemeClr val="dk1"/>
+          </a:lnRef>
+          <a:fillRef idx="0">
+            <a:schemeClr val="dk1"/>
+          </a:fillRef>
+          <a:effectRef idx="1">
+            <a:schemeClr val="dk1"/>
+          </a:effectRef>
+          <a:fontRef idx="minor">
+            <a:schemeClr val="tx1"/>
+          </a:fontRef>
+        </p:style>
+      </p:cxnSp>
+    </p:spTree>
+    <p:extLst>
+      <p:ext uri="{BB962C8B-B14F-4D97-AF65-F5344CB8AC3E}">
+        <p14:creationId xmlns:p14="http://schemas.microsoft.com/office/powerpoint/2010/main" val="526575183"/>
+      </p:ext>
+    </p:extLst>
+  </p:cSld>
+  <p:clrMapOvr>
+    <a:masterClrMapping/>
+  </p:clrMapOvr>
+</p:sld>
+</file>
+
 <file path=ppt/theme/theme1.xml><?xml version="1.0" encoding="utf-8"?>
 <a:theme xmlns:a="http://schemas.openxmlformats.org/drawingml/2006/main" name="Thème Office">
   <a:themeElements>

</xml_diff>

<commit_message>
[ENSG ASI 2104] Ajout slides sur index + wip concepts
</commit_message>
<xml_diff>
--- a/cours/ensg-asi-2014/src/raws/img_gen.pptx
+++ b/cours/ensg-asi-2014/src/raws/img_gen.pptx
@@ -10,6 +10,9 @@
     <p:sldId id="258" r:id="rId4"/>
     <p:sldId id="259" r:id="rId5"/>
     <p:sldId id="260" r:id="rId6"/>
+    <p:sldId id="263" r:id="rId7"/>
+    <p:sldId id="261" r:id="rId8"/>
+    <p:sldId id="262" r:id="rId9"/>
   </p:sldIdLst>
   <p:sldSz cx="9144000" cy="6858000" type="screen4x3"/>
   <p:notesSz cx="6858000" cy="9144000"/>
@@ -5153,7 +5156,11 @@
           <a:p>
             <a:r>
               <a:rPr lang="fr-FR" sz="2400" dirty="0" smtClean="0"/>
-              <a:t>Accès aux donnée</a:t>
+              <a:t>Accès aux </a:t>
+            </a:r>
+            <a:r>
+              <a:rPr lang="fr-FR" sz="2400" dirty="0" smtClean="0"/>
+              <a:t>données</a:t>
             </a:r>
             <a:endParaRPr lang="fr-FR" sz="2400" dirty="0"/>
           </a:p>
@@ -5237,7 +5244,7 @@
             <a:pPr algn="ctr"/>
             <a:r>
               <a:rPr lang="fr-FR" dirty="0" smtClean="0"/>
-              <a:t>Donnée</a:t>
+              <a:t>Données</a:t>
             </a:r>
             <a:endParaRPr lang="fr-FR" dirty="0"/>
           </a:p>
@@ -5475,6 +5482,1622 @@
     <p:extLst>
       <p:ext uri="{BB962C8B-B14F-4D97-AF65-F5344CB8AC3E}">
         <p14:creationId xmlns:p14="http://schemas.microsoft.com/office/powerpoint/2010/main" val="526575183"/>
+      </p:ext>
+    </p:extLst>
+  </p:cSld>
+  <p:clrMapOvr>
+    <a:masterClrMapping/>
+  </p:clrMapOvr>
+</p:sld>
+</file>
+
+<file path=ppt/slides/slide6.xml><?xml version="1.0" encoding="utf-8"?>
+<p:sld xmlns:a="http://schemas.openxmlformats.org/drawingml/2006/main" xmlns:r="http://schemas.openxmlformats.org/officeDocument/2006/relationships" xmlns:p="http://schemas.openxmlformats.org/presentationml/2006/main">
+  <p:cSld>
+    <p:spTree>
+      <p:nvGrpSpPr>
+        <p:cNvPr id="1" name=""/>
+        <p:cNvGrpSpPr/>
+        <p:nvPr/>
+      </p:nvGrpSpPr>
+      <p:grpSpPr>
+        <a:xfrm>
+          <a:off x="0" y="0"/>
+          <a:ext cx="0" cy="0"/>
+          <a:chOff x="0" y="0"/>
+          <a:chExt cx="0" cy="0"/>
+        </a:xfrm>
+      </p:grpSpPr>
+      <p:sp>
+        <p:nvSpPr>
+          <p:cNvPr id="2" name="Rectangle à coins arrondis 1"/>
+          <p:cNvSpPr/>
+          <p:nvPr/>
+        </p:nvSpPr>
+        <p:spPr>
+          <a:xfrm>
+            <a:off x="935596" y="1362069"/>
+            <a:ext cx="2808312" cy="826190"/>
+          </a:xfrm>
+          <a:prstGeom prst="roundRect">
+            <a:avLst/>
+          </a:prstGeom>
+        </p:spPr>
+        <p:style>
+          <a:lnRef idx="2">
+            <a:schemeClr val="accent3">
+              <a:shade val="50000"/>
+            </a:schemeClr>
+          </a:lnRef>
+          <a:fillRef idx="1">
+            <a:schemeClr val="accent3"/>
+          </a:fillRef>
+          <a:effectRef idx="0">
+            <a:schemeClr val="accent3"/>
+          </a:effectRef>
+          <a:fontRef idx="minor">
+            <a:schemeClr val="lt1"/>
+          </a:fontRef>
+        </p:style>
+        <p:txBody>
+          <a:bodyPr rtlCol="0" anchor="ctr"/>
+          <a:lstStyle/>
+          <a:p>
+            <a:pPr algn="ctr"/>
+            <a:r>
+              <a:rPr lang="fr-FR" sz="2400" dirty="0" smtClean="0"/>
+              <a:t>Présentation 1</a:t>
+            </a:r>
+            <a:endParaRPr lang="fr-FR" sz="2400" dirty="0"/>
+          </a:p>
+        </p:txBody>
+      </p:sp>
+      <p:sp>
+        <p:nvSpPr>
+          <p:cNvPr id="5" name="Rectangle à coins arrondis 4"/>
+          <p:cNvSpPr/>
+          <p:nvPr/>
+        </p:nvSpPr>
+        <p:spPr>
+          <a:xfrm>
+            <a:off x="645439" y="2829282"/>
+            <a:ext cx="1694313" cy="826190"/>
+          </a:xfrm>
+          <a:prstGeom prst="roundRect">
+            <a:avLst/>
+          </a:prstGeom>
+        </p:spPr>
+        <p:style>
+          <a:lnRef idx="2">
+            <a:schemeClr val="accent1">
+              <a:shade val="50000"/>
+            </a:schemeClr>
+          </a:lnRef>
+          <a:fillRef idx="1">
+            <a:schemeClr val="accent1"/>
+          </a:fillRef>
+          <a:effectRef idx="0">
+            <a:schemeClr val="accent1"/>
+          </a:effectRef>
+          <a:fontRef idx="minor">
+            <a:schemeClr val="lt1"/>
+          </a:fontRef>
+        </p:style>
+        <p:txBody>
+          <a:bodyPr rtlCol="0" anchor="ctr"/>
+          <a:lstStyle/>
+          <a:p>
+            <a:pPr algn="ctr"/>
+            <a:r>
+              <a:rPr lang="fr-FR" sz="2400" dirty="0" smtClean="0"/>
+              <a:t>Métier  1</a:t>
+            </a:r>
+            <a:endParaRPr lang="fr-FR" sz="2400" dirty="0"/>
+          </a:p>
+        </p:txBody>
+      </p:sp>
+      <p:sp>
+        <p:nvSpPr>
+          <p:cNvPr id="6" name="Rectangle à coins arrondis 5"/>
+          <p:cNvSpPr/>
+          <p:nvPr/>
+        </p:nvSpPr>
+        <p:spPr>
+          <a:xfrm>
+            <a:off x="1619672" y="4445318"/>
+            <a:ext cx="2952328" cy="826190"/>
+          </a:xfrm>
+          <a:prstGeom prst="roundRect">
+            <a:avLst/>
+          </a:prstGeom>
+        </p:spPr>
+        <p:style>
+          <a:lnRef idx="2">
+            <a:schemeClr val="accent2">
+              <a:shade val="50000"/>
+            </a:schemeClr>
+          </a:lnRef>
+          <a:fillRef idx="1">
+            <a:schemeClr val="accent2"/>
+          </a:fillRef>
+          <a:effectRef idx="0">
+            <a:schemeClr val="accent2"/>
+          </a:effectRef>
+          <a:fontRef idx="minor">
+            <a:schemeClr val="lt1"/>
+          </a:fontRef>
+        </p:style>
+        <p:txBody>
+          <a:bodyPr rtlCol="0" anchor="ctr"/>
+          <a:lstStyle/>
+          <a:p>
+            <a:r>
+              <a:rPr lang="fr-FR" sz="2400" dirty="0" smtClean="0"/>
+              <a:t>Accès aux </a:t>
+            </a:r>
+            <a:r>
+              <a:rPr lang="fr-FR" sz="2400" dirty="0" smtClean="0"/>
+              <a:t>données 1</a:t>
+            </a:r>
+            <a:endParaRPr lang="fr-FR" sz="2400" dirty="0"/>
+          </a:p>
+        </p:txBody>
+      </p:sp>
+      <p:sp>
+        <p:nvSpPr>
+          <p:cNvPr id="7" name="Émoticône 6"/>
+          <p:cNvSpPr/>
+          <p:nvPr/>
+        </p:nvSpPr>
+        <p:spPr>
+          <a:xfrm>
+            <a:off x="4085959" y="404664"/>
+            <a:ext cx="630057" cy="576064"/>
+          </a:xfrm>
+          <a:prstGeom prst="smileyFace">
+            <a:avLst/>
+          </a:prstGeom>
+        </p:spPr>
+        <p:style>
+          <a:lnRef idx="2">
+            <a:schemeClr val="accent3">
+              <a:shade val="50000"/>
+            </a:schemeClr>
+          </a:lnRef>
+          <a:fillRef idx="1">
+            <a:schemeClr val="accent3"/>
+          </a:fillRef>
+          <a:effectRef idx="0">
+            <a:schemeClr val="accent3"/>
+          </a:effectRef>
+          <a:fontRef idx="minor">
+            <a:schemeClr val="lt1"/>
+          </a:fontRef>
+        </p:style>
+        <p:txBody>
+          <a:bodyPr rtlCol="0" anchor="ctr"/>
+          <a:lstStyle/>
+          <a:p>
+            <a:pPr algn="ctr"/>
+            <a:endParaRPr lang="fr-FR"/>
+          </a:p>
+        </p:txBody>
+      </p:sp>
+      <p:sp>
+        <p:nvSpPr>
+          <p:cNvPr id="8" name="Cylindre 7"/>
+          <p:cNvSpPr/>
+          <p:nvPr/>
+        </p:nvSpPr>
+        <p:spPr>
+          <a:xfrm>
+            <a:off x="2555776" y="5661248"/>
+            <a:ext cx="1080120" cy="936104"/>
+          </a:xfrm>
+          <a:prstGeom prst="can">
+            <a:avLst/>
+          </a:prstGeom>
+        </p:spPr>
+        <p:style>
+          <a:lnRef idx="2">
+            <a:schemeClr val="accent6">
+              <a:shade val="50000"/>
+            </a:schemeClr>
+          </a:lnRef>
+          <a:fillRef idx="1">
+            <a:schemeClr val="accent6"/>
+          </a:fillRef>
+          <a:effectRef idx="0">
+            <a:schemeClr val="accent6"/>
+          </a:effectRef>
+          <a:fontRef idx="minor">
+            <a:schemeClr val="lt1"/>
+          </a:fontRef>
+        </p:style>
+        <p:txBody>
+          <a:bodyPr rtlCol="0" anchor="ctr"/>
+          <a:lstStyle/>
+          <a:p>
+            <a:pPr algn="ctr"/>
+            <a:endParaRPr lang="fr-FR" dirty="0"/>
+          </a:p>
+        </p:txBody>
+      </p:sp>
+      <p:cxnSp>
+        <p:nvCxnSpPr>
+          <p:cNvPr id="12" name="Connecteur droit avec flèche 11"/>
+          <p:cNvCxnSpPr>
+            <a:stCxn id="7" idx="3"/>
+            <a:endCxn id="2" idx="0"/>
+          </p:cNvCxnSpPr>
+          <p:nvPr/>
+        </p:nvCxnSpPr>
+        <p:spPr>
+          <a:xfrm flipH="1">
+            <a:off x="2339752" y="896365"/>
+            <a:ext cx="1838477" cy="465704"/>
+          </a:xfrm>
+          <a:prstGeom prst="straightConnector1">
+            <a:avLst/>
+          </a:prstGeom>
+          <a:ln>
+            <a:headEnd type="arrow"/>
+            <a:tailEnd type="arrow"/>
+          </a:ln>
+        </p:spPr>
+        <p:style>
+          <a:lnRef idx="2">
+            <a:schemeClr val="dk1"/>
+          </a:lnRef>
+          <a:fillRef idx="0">
+            <a:schemeClr val="dk1"/>
+          </a:fillRef>
+          <a:effectRef idx="1">
+            <a:schemeClr val="dk1"/>
+          </a:effectRef>
+          <a:fontRef idx="minor">
+            <a:schemeClr val="tx1"/>
+          </a:fontRef>
+        </p:style>
+      </p:cxnSp>
+      <p:cxnSp>
+        <p:nvCxnSpPr>
+          <p:cNvPr id="13" name="Connecteur droit avec flèche 12"/>
+          <p:cNvCxnSpPr>
+            <a:stCxn id="2" idx="2"/>
+            <a:endCxn id="5" idx="0"/>
+          </p:cNvCxnSpPr>
+          <p:nvPr/>
+        </p:nvCxnSpPr>
+        <p:spPr>
+          <a:xfrm flipH="1">
+            <a:off x="1492596" y="2188259"/>
+            <a:ext cx="847156" cy="641023"/>
+          </a:xfrm>
+          <a:prstGeom prst="straightConnector1">
+            <a:avLst/>
+          </a:prstGeom>
+          <a:ln>
+            <a:headEnd type="arrow"/>
+            <a:tailEnd type="arrow"/>
+          </a:ln>
+        </p:spPr>
+        <p:style>
+          <a:lnRef idx="2">
+            <a:schemeClr val="dk1"/>
+          </a:lnRef>
+          <a:fillRef idx="0">
+            <a:schemeClr val="dk1"/>
+          </a:fillRef>
+          <a:effectRef idx="1">
+            <a:schemeClr val="dk1"/>
+          </a:effectRef>
+          <a:fontRef idx="minor">
+            <a:schemeClr val="tx1"/>
+          </a:fontRef>
+        </p:style>
+      </p:cxnSp>
+      <p:cxnSp>
+        <p:nvCxnSpPr>
+          <p:cNvPr id="16" name="Connecteur droit avec flèche 15"/>
+          <p:cNvCxnSpPr>
+            <a:stCxn id="5" idx="2"/>
+            <a:endCxn id="6" idx="0"/>
+          </p:cNvCxnSpPr>
+          <p:nvPr/>
+        </p:nvCxnSpPr>
+        <p:spPr>
+          <a:xfrm>
+            <a:off x="1492596" y="3655472"/>
+            <a:ext cx="1603240" cy="789846"/>
+          </a:xfrm>
+          <a:prstGeom prst="straightConnector1">
+            <a:avLst/>
+          </a:prstGeom>
+          <a:ln>
+            <a:headEnd type="arrow"/>
+            <a:tailEnd type="arrow"/>
+          </a:ln>
+        </p:spPr>
+        <p:style>
+          <a:lnRef idx="2">
+            <a:schemeClr val="dk1"/>
+          </a:lnRef>
+          <a:fillRef idx="0">
+            <a:schemeClr val="dk1"/>
+          </a:fillRef>
+          <a:effectRef idx="1">
+            <a:schemeClr val="dk1"/>
+          </a:effectRef>
+          <a:fontRef idx="minor">
+            <a:schemeClr val="tx1"/>
+          </a:fontRef>
+        </p:style>
+      </p:cxnSp>
+      <p:cxnSp>
+        <p:nvCxnSpPr>
+          <p:cNvPr id="19" name="Connecteur droit avec flèche 18"/>
+          <p:cNvCxnSpPr>
+            <a:stCxn id="6" idx="2"/>
+            <a:endCxn id="8" idx="1"/>
+          </p:cNvCxnSpPr>
+          <p:nvPr/>
+        </p:nvCxnSpPr>
+        <p:spPr>
+          <a:xfrm>
+            <a:off x="3095836" y="5271508"/>
+            <a:ext cx="0" cy="389740"/>
+          </a:xfrm>
+          <a:prstGeom prst="straightConnector1">
+            <a:avLst/>
+          </a:prstGeom>
+          <a:ln>
+            <a:headEnd type="arrow"/>
+            <a:tailEnd type="arrow"/>
+          </a:ln>
+        </p:spPr>
+        <p:style>
+          <a:lnRef idx="2">
+            <a:schemeClr val="dk1"/>
+          </a:lnRef>
+          <a:fillRef idx="0">
+            <a:schemeClr val="dk1"/>
+          </a:fillRef>
+          <a:effectRef idx="1">
+            <a:schemeClr val="dk1"/>
+          </a:effectRef>
+          <a:fontRef idx="minor">
+            <a:schemeClr val="tx1"/>
+          </a:fontRef>
+        </p:style>
+      </p:cxnSp>
+      <p:sp>
+        <p:nvSpPr>
+          <p:cNvPr id="22" name="Rectangle à coins arrondis 21"/>
+          <p:cNvSpPr/>
+          <p:nvPr/>
+        </p:nvSpPr>
+        <p:spPr>
+          <a:xfrm>
+            <a:off x="3436811" y="2863740"/>
+            <a:ext cx="1694313" cy="826190"/>
+          </a:xfrm>
+          <a:prstGeom prst="roundRect">
+            <a:avLst/>
+          </a:prstGeom>
+        </p:spPr>
+        <p:style>
+          <a:lnRef idx="2">
+            <a:schemeClr val="accent1">
+              <a:shade val="50000"/>
+            </a:schemeClr>
+          </a:lnRef>
+          <a:fillRef idx="1">
+            <a:schemeClr val="accent1"/>
+          </a:fillRef>
+          <a:effectRef idx="0">
+            <a:schemeClr val="accent1"/>
+          </a:effectRef>
+          <a:fontRef idx="minor">
+            <a:schemeClr val="lt1"/>
+          </a:fontRef>
+        </p:style>
+        <p:txBody>
+          <a:bodyPr rtlCol="0" anchor="ctr"/>
+          <a:lstStyle/>
+          <a:p>
+            <a:pPr algn="ctr"/>
+            <a:r>
+              <a:rPr lang="fr-FR" sz="2400" dirty="0" smtClean="0"/>
+              <a:t>Métier 2</a:t>
+            </a:r>
+            <a:endParaRPr lang="fr-FR" sz="2400" dirty="0"/>
+          </a:p>
+        </p:txBody>
+      </p:sp>
+      <p:sp>
+        <p:nvSpPr>
+          <p:cNvPr id="23" name="Rectangle à coins arrondis 22"/>
+          <p:cNvSpPr/>
+          <p:nvPr/>
+        </p:nvSpPr>
+        <p:spPr>
+          <a:xfrm>
+            <a:off x="4788113" y="1362069"/>
+            <a:ext cx="2808312" cy="826190"/>
+          </a:xfrm>
+          <a:prstGeom prst="roundRect">
+            <a:avLst/>
+          </a:prstGeom>
+        </p:spPr>
+        <p:style>
+          <a:lnRef idx="2">
+            <a:schemeClr val="accent3">
+              <a:shade val="50000"/>
+            </a:schemeClr>
+          </a:lnRef>
+          <a:fillRef idx="1">
+            <a:schemeClr val="accent3"/>
+          </a:fillRef>
+          <a:effectRef idx="0">
+            <a:schemeClr val="accent3"/>
+          </a:effectRef>
+          <a:fontRef idx="minor">
+            <a:schemeClr val="lt1"/>
+          </a:fontRef>
+        </p:style>
+        <p:txBody>
+          <a:bodyPr rtlCol="0" anchor="ctr"/>
+          <a:lstStyle/>
+          <a:p>
+            <a:pPr algn="ctr"/>
+            <a:r>
+              <a:rPr lang="fr-FR" sz="2400" dirty="0" smtClean="0"/>
+              <a:t>Présentation 2</a:t>
+            </a:r>
+            <a:endParaRPr lang="fr-FR" sz="2400" dirty="0"/>
+          </a:p>
+        </p:txBody>
+      </p:sp>
+      <p:sp>
+        <p:nvSpPr>
+          <p:cNvPr id="24" name="Rectangle à coins arrondis 23"/>
+          <p:cNvSpPr/>
+          <p:nvPr/>
+        </p:nvSpPr>
+        <p:spPr>
+          <a:xfrm>
+            <a:off x="6111788" y="2863740"/>
+            <a:ext cx="1694313" cy="826190"/>
+          </a:xfrm>
+          <a:prstGeom prst="roundRect">
+            <a:avLst/>
+          </a:prstGeom>
+        </p:spPr>
+        <p:style>
+          <a:lnRef idx="2">
+            <a:schemeClr val="accent1">
+              <a:shade val="50000"/>
+            </a:schemeClr>
+          </a:lnRef>
+          <a:fillRef idx="1">
+            <a:schemeClr val="accent1"/>
+          </a:fillRef>
+          <a:effectRef idx="0">
+            <a:schemeClr val="accent1"/>
+          </a:effectRef>
+          <a:fontRef idx="minor">
+            <a:schemeClr val="lt1"/>
+          </a:fontRef>
+        </p:style>
+        <p:txBody>
+          <a:bodyPr rtlCol="0" anchor="ctr"/>
+          <a:lstStyle/>
+          <a:p>
+            <a:pPr algn="ctr"/>
+            <a:r>
+              <a:rPr lang="fr-FR" sz="2400" dirty="0" smtClean="0"/>
+              <a:t>Métier 3</a:t>
+            </a:r>
+            <a:endParaRPr lang="fr-FR" sz="2400" dirty="0"/>
+          </a:p>
+        </p:txBody>
+      </p:sp>
+      <p:sp>
+        <p:nvSpPr>
+          <p:cNvPr id="32" name="Rectangle à coins arrondis 31"/>
+          <p:cNvSpPr/>
+          <p:nvPr/>
+        </p:nvSpPr>
+        <p:spPr>
+          <a:xfrm>
+            <a:off x="4853773" y="4446062"/>
+            <a:ext cx="2952328" cy="826190"/>
+          </a:xfrm>
+          <a:prstGeom prst="roundRect">
+            <a:avLst/>
+          </a:prstGeom>
+        </p:spPr>
+        <p:style>
+          <a:lnRef idx="2">
+            <a:schemeClr val="accent2">
+              <a:shade val="50000"/>
+            </a:schemeClr>
+          </a:lnRef>
+          <a:fillRef idx="1">
+            <a:schemeClr val="accent2"/>
+          </a:fillRef>
+          <a:effectRef idx="0">
+            <a:schemeClr val="accent2"/>
+          </a:effectRef>
+          <a:fontRef idx="minor">
+            <a:schemeClr val="lt1"/>
+          </a:fontRef>
+        </p:style>
+        <p:txBody>
+          <a:bodyPr rtlCol="0" anchor="ctr"/>
+          <a:lstStyle/>
+          <a:p>
+            <a:r>
+              <a:rPr lang="fr-FR" sz="2400" dirty="0" smtClean="0"/>
+              <a:t>Accès aux </a:t>
+            </a:r>
+            <a:r>
+              <a:rPr lang="fr-FR" sz="2400" dirty="0" smtClean="0"/>
+              <a:t>données 2</a:t>
+            </a:r>
+            <a:endParaRPr lang="fr-FR" sz="2400" dirty="0"/>
+          </a:p>
+        </p:txBody>
+      </p:sp>
+      <p:sp>
+        <p:nvSpPr>
+          <p:cNvPr id="33" name="Cylindre 32"/>
+          <p:cNvSpPr/>
+          <p:nvPr/>
+        </p:nvSpPr>
+        <p:spPr>
+          <a:xfrm>
+            <a:off x="5796136" y="5661248"/>
+            <a:ext cx="1080120" cy="936104"/>
+          </a:xfrm>
+          <a:prstGeom prst="can">
+            <a:avLst/>
+          </a:prstGeom>
+        </p:spPr>
+        <p:style>
+          <a:lnRef idx="2">
+            <a:schemeClr val="accent6">
+              <a:shade val="50000"/>
+            </a:schemeClr>
+          </a:lnRef>
+          <a:fillRef idx="1">
+            <a:schemeClr val="accent6"/>
+          </a:fillRef>
+          <a:effectRef idx="0">
+            <a:schemeClr val="accent6"/>
+          </a:effectRef>
+          <a:fontRef idx="minor">
+            <a:schemeClr val="lt1"/>
+          </a:fontRef>
+        </p:style>
+        <p:txBody>
+          <a:bodyPr rtlCol="0" anchor="ctr"/>
+          <a:lstStyle/>
+          <a:p>
+            <a:pPr algn="ctr"/>
+            <a:endParaRPr lang="fr-FR" dirty="0"/>
+          </a:p>
+        </p:txBody>
+      </p:sp>
+      <p:cxnSp>
+        <p:nvCxnSpPr>
+          <p:cNvPr id="34" name="Connecteur droit avec flèche 33"/>
+          <p:cNvCxnSpPr>
+            <a:stCxn id="32" idx="2"/>
+            <a:endCxn id="33" idx="1"/>
+          </p:cNvCxnSpPr>
+          <p:nvPr/>
+        </p:nvCxnSpPr>
+        <p:spPr>
+          <a:xfrm>
+            <a:off x="6329937" y="5272252"/>
+            <a:ext cx="6259" cy="388996"/>
+          </a:xfrm>
+          <a:prstGeom prst="straightConnector1">
+            <a:avLst/>
+          </a:prstGeom>
+          <a:ln>
+            <a:headEnd type="arrow"/>
+            <a:tailEnd type="arrow"/>
+          </a:ln>
+        </p:spPr>
+        <p:style>
+          <a:lnRef idx="2">
+            <a:schemeClr val="dk1"/>
+          </a:lnRef>
+          <a:fillRef idx="0">
+            <a:schemeClr val="dk1"/>
+          </a:fillRef>
+          <a:effectRef idx="1">
+            <a:schemeClr val="dk1"/>
+          </a:effectRef>
+          <a:fontRef idx="minor">
+            <a:schemeClr val="tx1"/>
+          </a:fontRef>
+        </p:style>
+      </p:cxnSp>
+      <p:cxnSp>
+        <p:nvCxnSpPr>
+          <p:cNvPr id="35" name="Connecteur droit avec flèche 34"/>
+          <p:cNvCxnSpPr>
+            <a:stCxn id="22" idx="2"/>
+            <a:endCxn id="32" idx="0"/>
+          </p:cNvCxnSpPr>
+          <p:nvPr/>
+        </p:nvCxnSpPr>
+        <p:spPr>
+          <a:xfrm>
+            <a:off x="4283968" y="3689930"/>
+            <a:ext cx="2045969" cy="756132"/>
+          </a:xfrm>
+          <a:prstGeom prst="straightConnector1">
+            <a:avLst/>
+          </a:prstGeom>
+          <a:ln>
+            <a:headEnd type="arrow"/>
+            <a:tailEnd type="arrow"/>
+          </a:ln>
+        </p:spPr>
+        <p:style>
+          <a:lnRef idx="2">
+            <a:schemeClr val="dk1"/>
+          </a:lnRef>
+          <a:fillRef idx="0">
+            <a:schemeClr val="dk1"/>
+          </a:fillRef>
+          <a:effectRef idx="1">
+            <a:schemeClr val="dk1"/>
+          </a:effectRef>
+          <a:fontRef idx="minor">
+            <a:schemeClr val="tx1"/>
+          </a:fontRef>
+        </p:style>
+      </p:cxnSp>
+      <p:cxnSp>
+        <p:nvCxnSpPr>
+          <p:cNvPr id="41" name="Connecteur droit avec flèche 40"/>
+          <p:cNvCxnSpPr>
+            <a:stCxn id="24" idx="2"/>
+            <a:endCxn id="32" idx="0"/>
+          </p:cNvCxnSpPr>
+          <p:nvPr/>
+        </p:nvCxnSpPr>
+        <p:spPr>
+          <a:xfrm flipH="1">
+            <a:off x="6329937" y="3689930"/>
+            <a:ext cx="629008" cy="756132"/>
+          </a:xfrm>
+          <a:prstGeom prst="straightConnector1">
+            <a:avLst/>
+          </a:prstGeom>
+          <a:ln>
+            <a:headEnd type="arrow"/>
+            <a:tailEnd type="arrow"/>
+          </a:ln>
+        </p:spPr>
+        <p:style>
+          <a:lnRef idx="2">
+            <a:schemeClr val="dk1"/>
+          </a:lnRef>
+          <a:fillRef idx="0">
+            <a:schemeClr val="dk1"/>
+          </a:fillRef>
+          <a:effectRef idx="1">
+            <a:schemeClr val="dk1"/>
+          </a:effectRef>
+          <a:fontRef idx="minor">
+            <a:schemeClr val="tx1"/>
+          </a:fontRef>
+        </p:style>
+      </p:cxnSp>
+      <p:cxnSp>
+        <p:nvCxnSpPr>
+          <p:cNvPr id="45" name="Connecteur droit avec flèche 44"/>
+          <p:cNvCxnSpPr>
+            <a:stCxn id="2" idx="2"/>
+            <a:endCxn id="22" idx="0"/>
+          </p:cNvCxnSpPr>
+          <p:nvPr/>
+        </p:nvCxnSpPr>
+        <p:spPr>
+          <a:xfrm>
+            <a:off x="2339752" y="2188259"/>
+            <a:ext cx="1944216" cy="675481"/>
+          </a:xfrm>
+          <a:prstGeom prst="straightConnector1">
+            <a:avLst/>
+          </a:prstGeom>
+          <a:ln>
+            <a:headEnd type="arrow"/>
+            <a:tailEnd type="arrow"/>
+          </a:ln>
+        </p:spPr>
+        <p:style>
+          <a:lnRef idx="2">
+            <a:schemeClr val="dk1"/>
+          </a:lnRef>
+          <a:fillRef idx="0">
+            <a:schemeClr val="dk1"/>
+          </a:fillRef>
+          <a:effectRef idx="1">
+            <a:schemeClr val="dk1"/>
+          </a:effectRef>
+          <a:fontRef idx="minor">
+            <a:schemeClr val="tx1"/>
+          </a:fontRef>
+        </p:style>
+      </p:cxnSp>
+      <p:cxnSp>
+        <p:nvCxnSpPr>
+          <p:cNvPr id="48" name="Connecteur droit avec flèche 47"/>
+          <p:cNvCxnSpPr>
+            <a:stCxn id="22" idx="2"/>
+            <a:endCxn id="6" idx="0"/>
+          </p:cNvCxnSpPr>
+          <p:nvPr/>
+        </p:nvCxnSpPr>
+        <p:spPr>
+          <a:xfrm flipH="1">
+            <a:off x="3095836" y="3689930"/>
+            <a:ext cx="1188132" cy="755388"/>
+          </a:xfrm>
+          <a:prstGeom prst="straightConnector1">
+            <a:avLst/>
+          </a:prstGeom>
+          <a:ln>
+            <a:headEnd type="arrow"/>
+            <a:tailEnd type="arrow"/>
+          </a:ln>
+        </p:spPr>
+        <p:style>
+          <a:lnRef idx="2">
+            <a:schemeClr val="dk1"/>
+          </a:lnRef>
+          <a:fillRef idx="0">
+            <a:schemeClr val="dk1"/>
+          </a:fillRef>
+          <a:effectRef idx="1">
+            <a:schemeClr val="dk1"/>
+          </a:effectRef>
+          <a:fontRef idx="minor">
+            <a:schemeClr val="tx1"/>
+          </a:fontRef>
+        </p:style>
+      </p:cxnSp>
+      <p:cxnSp>
+        <p:nvCxnSpPr>
+          <p:cNvPr id="51" name="Connecteur droit avec flèche 50"/>
+          <p:cNvCxnSpPr>
+            <a:stCxn id="23" idx="2"/>
+            <a:endCxn id="24" idx="0"/>
+          </p:cNvCxnSpPr>
+          <p:nvPr/>
+        </p:nvCxnSpPr>
+        <p:spPr>
+          <a:xfrm>
+            <a:off x="6192269" y="2188259"/>
+            <a:ext cx="766676" cy="675481"/>
+          </a:xfrm>
+          <a:prstGeom prst="straightConnector1">
+            <a:avLst/>
+          </a:prstGeom>
+          <a:ln>
+            <a:headEnd type="arrow"/>
+            <a:tailEnd type="arrow"/>
+          </a:ln>
+        </p:spPr>
+        <p:style>
+          <a:lnRef idx="2">
+            <a:schemeClr val="dk1"/>
+          </a:lnRef>
+          <a:fillRef idx="0">
+            <a:schemeClr val="dk1"/>
+          </a:fillRef>
+          <a:effectRef idx="1">
+            <a:schemeClr val="dk1"/>
+          </a:effectRef>
+          <a:fontRef idx="minor">
+            <a:schemeClr val="tx1"/>
+          </a:fontRef>
+        </p:style>
+      </p:cxnSp>
+      <p:cxnSp>
+        <p:nvCxnSpPr>
+          <p:cNvPr id="54" name="Connecteur droit avec flèche 53"/>
+          <p:cNvCxnSpPr>
+            <a:stCxn id="23" idx="0"/>
+            <a:endCxn id="7" idx="5"/>
+          </p:cNvCxnSpPr>
+          <p:nvPr/>
+        </p:nvCxnSpPr>
+        <p:spPr>
+          <a:xfrm flipH="1" flipV="1">
+            <a:off x="4623746" y="896365"/>
+            <a:ext cx="1568523" cy="465704"/>
+          </a:xfrm>
+          <a:prstGeom prst="straightConnector1">
+            <a:avLst/>
+          </a:prstGeom>
+          <a:ln>
+            <a:headEnd type="arrow"/>
+            <a:tailEnd type="arrow"/>
+          </a:ln>
+        </p:spPr>
+        <p:style>
+          <a:lnRef idx="2">
+            <a:schemeClr val="dk1"/>
+          </a:lnRef>
+          <a:fillRef idx="0">
+            <a:schemeClr val="dk1"/>
+          </a:fillRef>
+          <a:effectRef idx="1">
+            <a:schemeClr val="dk1"/>
+          </a:effectRef>
+          <a:fontRef idx="minor">
+            <a:schemeClr val="tx1"/>
+          </a:fontRef>
+        </p:style>
+      </p:cxnSp>
+    </p:spTree>
+    <p:extLst>
+      <p:ext uri="{BB962C8B-B14F-4D97-AF65-F5344CB8AC3E}">
+        <p14:creationId xmlns:p14="http://schemas.microsoft.com/office/powerpoint/2010/main" val="1085324764"/>
+      </p:ext>
+    </p:extLst>
+  </p:cSld>
+  <p:clrMapOvr>
+    <a:masterClrMapping/>
+  </p:clrMapOvr>
+</p:sld>
+</file>
+
+<file path=ppt/slides/slide7.xml><?xml version="1.0" encoding="utf-8"?>
+<p:sld xmlns:a="http://schemas.openxmlformats.org/drawingml/2006/main" xmlns:r="http://schemas.openxmlformats.org/officeDocument/2006/relationships" xmlns:p="http://schemas.openxmlformats.org/presentationml/2006/main">
+  <p:cSld>
+    <p:spTree>
+      <p:nvGrpSpPr>
+        <p:cNvPr id="1" name=""/>
+        <p:cNvGrpSpPr/>
+        <p:nvPr/>
+      </p:nvGrpSpPr>
+      <p:grpSpPr>
+        <a:xfrm>
+          <a:off x="0" y="0"/>
+          <a:ext cx="0" cy="0"/>
+          <a:chOff x="0" y="0"/>
+          <a:chExt cx="0" cy="0"/>
+        </a:xfrm>
+      </p:grpSpPr>
+      <p:sp>
+        <p:nvSpPr>
+          <p:cNvPr id="2" name="Rectangle à coins arrondis 1"/>
+          <p:cNvSpPr/>
+          <p:nvPr/>
+        </p:nvSpPr>
+        <p:spPr>
+          <a:xfrm>
+            <a:off x="611560" y="764704"/>
+            <a:ext cx="4176464" cy="4824536"/>
+          </a:xfrm>
+          <a:prstGeom prst="roundRect">
+            <a:avLst/>
+          </a:prstGeom>
+        </p:spPr>
+        <p:style>
+          <a:lnRef idx="1">
+            <a:schemeClr val="dk1"/>
+          </a:lnRef>
+          <a:fillRef idx="2">
+            <a:schemeClr val="dk1"/>
+          </a:fillRef>
+          <a:effectRef idx="1">
+            <a:schemeClr val="dk1"/>
+          </a:effectRef>
+          <a:fontRef idx="minor">
+            <a:schemeClr val="dk1"/>
+          </a:fontRef>
+        </p:style>
+        <p:txBody>
+          <a:bodyPr vert="vert270" rtlCol="0" anchor="b" anchorCtr="1"/>
+          <a:lstStyle/>
+          <a:p>
+            <a:pPr algn="ctr"/>
+            <a:r>
+              <a:rPr lang="fr-FR" sz="2400" dirty="0" smtClean="0"/>
+              <a:t>Système</a:t>
+            </a:r>
+          </a:p>
+          <a:p>
+            <a:pPr algn="ctr"/>
+            <a:r>
+              <a:rPr lang="fr-FR" sz="2400" dirty="0" smtClean="0"/>
+              <a:t>d’Information</a:t>
+            </a:r>
+            <a:endParaRPr lang="fr-FR" sz="2400" dirty="0"/>
+          </a:p>
+        </p:txBody>
+      </p:sp>
+      <p:sp>
+        <p:nvSpPr>
+          <p:cNvPr id="3" name="Rectangle à coins arrondis 2"/>
+          <p:cNvSpPr/>
+          <p:nvPr/>
+        </p:nvSpPr>
+        <p:spPr>
+          <a:xfrm>
+            <a:off x="1152778" y="1143697"/>
+            <a:ext cx="1622559" cy="826190"/>
+          </a:xfrm>
+          <a:prstGeom prst="roundRect">
+            <a:avLst/>
+          </a:prstGeom>
+        </p:spPr>
+        <p:style>
+          <a:lnRef idx="2">
+            <a:schemeClr val="accent3">
+              <a:shade val="50000"/>
+            </a:schemeClr>
+          </a:lnRef>
+          <a:fillRef idx="1">
+            <a:schemeClr val="accent3"/>
+          </a:fillRef>
+          <a:effectRef idx="0">
+            <a:schemeClr val="accent3"/>
+          </a:effectRef>
+          <a:fontRef idx="minor">
+            <a:schemeClr val="lt1"/>
+          </a:fontRef>
+        </p:style>
+        <p:txBody>
+          <a:bodyPr rtlCol="0" anchor="ctr"/>
+          <a:lstStyle/>
+          <a:p>
+            <a:r>
+              <a:rPr lang="fr-FR" sz="2400" dirty="0" smtClean="0"/>
+              <a:t>Personnel</a:t>
+            </a:r>
+            <a:endParaRPr lang="fr-FR" sz="2400" dirty="0"/>
+          </a:p>
+        </p:txBody>
+      </p:sp>
+      <p:sp>
+        <p:nvSpPr>
+          <p:cNvPr id="4" name="Rectangle à coins arrondis 3"/>
+          <p:cNvSpPr/>
+          <p:nvPr/>
+        </p:nvSpPr>
+        <p:spPr>
+          <a:xfrm>
+            <a:off x="1152777" y="3176972"/>
+            <a:ext cx="1622559" cy="826190"/>
+          </a:xfrm>
+          <a:prstGeom prst="roundRect">
+            <a:avLst/>
+          </a:prstGeom>
+        </p:spPr>
+        <p:style>
+          <a:lnRef idx="2">
+            <a:schemeClr val="accent3">
+              <a:shade val="50000"/>
+            </a:schemeClr>
+          </a:lnRef>
+          <a:fillRef idx="1">
+            <a:schemeClr val="accent3"/>
+          </a:fillRef>
+          <a:effectRef idx="0">
+            <a:schemeClr val="accent3"/>
+          </a:effectRef>
+          <a:fontRef idx="minor">
+            <a:schemeClr val="lt1"/>
+          </a:fontRef>
+        </p:style>
+        <p:txBody>
+          <a:bodyPr rtlCol="0" anchor="ctr"/>
+          <a:lstStyle/>
+          <a:p>
+            <a:r>
+              <a:rPr lang="fr-FR" sz="2400" dirty="0" smtClean="0"/>
+              <a:t>Matériel</a:t>
+            </a:r>
+            <a:endParaRPr lang="fr-FR" sz="2400" dirty="0"/>
+          </a:p>
+        </p:txBody>
+      </p:sp>
+      <p:sp>
+        <p:nvSpPr>
+          <p:cNvPr id="5" name="Rectangle à coins arrondis 4"/>
+          <p:cNvSpPr/>
+          <p:nvPr/>
+        </p:nvSpPr>
+        <p:spPr>
+          <a:xfrm>
+            <a:off x="1152778" y="2153606"/>
+            <a:ext cx="1622559" cy="826190"/>
+          </a:xfrm>
+          <a:prstGeom prst="roundRect">
+            <a:avLst/>
+          </a:prstGeom>
+        </p:spPr>
+        <p:style>
+          <a:lnRef idx="2">
+            <a:schemeClr val="accent3">
+              <a:shade val="50000"/>
+            </a:schemeClr>
+          </a:lnRef>
+          <a:fillRef idx="1">
+            <a:schemeClr val="accent3"/>
+          </a:fillRef>
+          <a:effectRef idx="0">
+            <a:schemeClr val="accent3"/>
+          </a:effectRef>
+          <a:fontRef idx="minor">
+            <a:schemeClr val="lt1"/>
+          </a:fontRef>
+        </p:style>
+        <p:txBody>
+          <a:bodyPr rtlCol="0" anchor="ctr"/>
+          <a:lstStyle/>
+          <a:p>
+            <a:r>
+              <a:rPr lang="fr-FR" sz="2400" dirty="0" smtClean="0"/>
+              <a:t>Logiciel</a:t>
+            </a:r>
+            <a:endParaRPr lang="fr-FR" sz="2400" dirty="0"/>
+          </a:p>
+        </p:txBody>
+      </p:sp>
+      <p:sp>
+        <p:nvSpPr>
+          <p:cNvPr id="6" name="Rectangle à coins arrondis 5"/>
+          <p:cNvSpPr/>
+          <p:nvPr/>
+        </p:nvSpPr>
+        <p:spPr>
+          <a:xfrm>
+            <a:off x="1152778" y="4229981"/>
+            <a:ext cx="1622559" cy="826190"/>
+          </a:xfrm>
+          <a:prstGeom prst="roundRect">
+            <a:avLst/>
+          </a:prstGeom>
+        </p:spPr>
+        <p:style>
+          <a:lnRef idx="2">
+            <a:schemeClr val="accent3">
+              <a:shade val="50000"/>
+            </a:schemeClr>
+          </a:lnRef>
+          <a:fillRef idx="1">
+            <a:schemeClr val="accent3"/>
+          </a:fillRef>
+          <a:effectRef idx="0">
+            <a:schemeClr val="accent3"/>
+          </a:effectRef>
+          <a:fontRef idx="minor">
+            <a:schemeClr val="lt1"/>
+          </a:fontRef>
+        </p:style>
+        <p:txBody>
+          <a:bodyPr rtlCol="0" anchor="ctr"/>
+          <a:lstStyle/>
+          <a:p>
+            <a:r>
+              <a:rPr lang="fr-FR" sz="2400" dirty="0" smtClean="0"/>
+              <a:t>Données</a:t>
+            </a:r>
+            <a:endParaRPr lang="fr-FR" sz="2400" dirty="0"/>
+          </a:p>
+        </p:txBody>
+      </p:sp>
+      <p:cxnSp>
+        <p:nvCxnSpPr>
+          <p:cNvPr id="10" name="Connecteur droit avec flèche 9"/>
+          <p:cNvCxnSpPr/>
+          <p:nvPr/>
+        </p:nvCxnSpPr>
+        <p:spPr>
+          <a:xfrm>
+            <a:off x="4788024" y="1588150"/>
+            <a:ext cx="1008112" cy="0"/>
+          </a:xfrm>
+          <a:prstGeom prst="straightConnector1">
+            <a:avLst/>
+          </a:prstGeom>
+          <a:ln>
+            <a:tailEnd type="arrow"/>
+          </a:ln>
+        </p:spPr>
+        <p:style>
+          <a:lnRef idx="2">
+            <a:schemeClr val="dk1"/>
+          </a:lnRef>
+          <a:fillRef idx="0">
+            <a:schemeClr val="dk1"/>
+          </a:fillRef>
+          <a:effectRef idx="1">
+            <a:schemeClr val="dk1"/>
+          </a:effectRef>
+          <a:fontRef idx="minor">
+            <a:schemeClr val="tx1"/>
+          </a:fontRef>
+        </p:style>
+      </p:cxnSp>
+      <p:cxnSp>
+        <p:nvCxnSpPr>
+          <p:cNvPr id="13" name="Connecteur droit avec flèche 12"/>
+          <p:cNvCxnSpPr/>
+          <p:nvPr/>
+        </p:nvCxnSpPr>
+        <p:spPr>
+          <a:xfrm>
+            <a:off x="4788024" y="2492896"/>
+            <a:ext cx="1008112" cy="0"/>
+          </a:xfrm>
+          <a:prstGeom prst="straightConnector1">
+            <a:avLst/>
+          </a:prstGeom>
+          <a:ln>
+            <a:tailEnd type="arrow"/>
+          </a:ln>
+        </p:spPr>
+        <p:style>
+          <a:lnRef idx="2">
+            <a:schemeClr val="dk1"/>
+          </a:lnRef>
+          <a:fillRef idx="0">
+            <a:schemeClr val="dk1"/>
+          </a:fillRef>
+          <a:effectRef idx="1">
+            <a:schemeClr val="dk1"/>
+          </a:effectRef>
+          <a:fontRef idx="minor">
+            <a:schemeClr val="tx1"/>
+          </a:fontRef>
+        </p:style>
+      </p:cxnSp>
+      <p:cxnSp>
+        <p:nvCxnSpPr>
+          <p:cNvPr id="14" name="Connecteur droit avec flèche 13"/>
+          <p:cNvCxnSpPr/>
+          <p:nvPr/>
+        </p:nvCxnSpPr>
+        <p:spPr>
+          <a:xfrm>
+            <a:off x="4788024" y="3573016"/>
+            <a:ext cx="1008112" cy="0"/>
+          </a:xfrm>
+          <a:prstGeom prst="straightConnector1">
+            <a:avLst/>
+          </a:prstGeom>
+          <a:ln>
+            <a:tailEnd type="arrow"/>
+          </a:ln>
+        </p:spPr>
+        <p:style>
+          <a:lnRef idx="2">
+            <a:schemeClr val="dk1"/>
+          </a:lnRef>
+          <a:fillRef idx="0">
+            <a:schemeClr val="dk1"/>
+          </a:fillRef>
+          <a:effectRef idx="1">
+            <a:schemeClr val="dk1"/>
+          </a:effectRef>
+          <a:fontRef idx="minor">
+            <a:schemeClr val="tx1"/>
+          </a:fontRef>
+        </p:style>
+      </p:cxnSp>
+      <p:cxnSp>
+        <p:nvCxnSpPr>
+          <p:cNvPr id="15" name="Connecteur droit avec flèche 14"/>
+          <p:cNvCxnSpPr/>
+          <p:nvPr/>
+        </p:nvCxnSpPr>
+        <p:spPr>
+          <a:xfrm>
+            <a:off x="4788024" y="4581128"/>
+            <a:ext cx="1008112" cy="0"/>
+          </a:xfrm>
+          <a:prstGeom prst="straightConnector1">
+            <a:avLst/>
+          </a:prstGeom>
+          <a:ln>
+            <a:tailEnd type="arrow"/>
+          </a:ln>
+        </p:spPr>
+        <p:style>
+          <a:lnRef idx="2">
+            <a:schemeClr val="dk1"/>
+          </a:lnRef>
+          <a:fillRef idx="0">
+            <a:schemeClr val="dk1"/>
+          </a:fillRef>
+          <a:effectRef idx="1">
+            <a:schemeClr val="dk1"/>
+          </a:effectRef>
+          <a:fontRef idx="minor">
+            <a:schemeClr val="tx1"/>
+          </a:fontRef>
+        </p:style>
+      </p:cxnSp>
+      <p:sp>
+        <p:nvSpPr>
+          <p:cNvPr id="16" name="ZoneTexte 15"/>
+          <p:cNvSpPr txBox="1"/>
+          <p:nvPr/>
+        </p:nvSpPr>
+        <p:spPr>
+          <a:xfrm>
+            <a:off x="6084168" y="1403484"/>
+            <a:ext cx="1656184" cy="369332"/>
+          </a:xfrm>
+          <a:prstGeom prst="rect">
+            <a:avLst/>
+          </a:prstGeom>
+          <a:noFill/>
+        </p:spPr>
+        <p:txBody>
+          <a:bodyPr wrap="square" rtlCol="0">
+            <a:spAutoFit/>
+          </a:bodyPr>
+          <a:lstStyle/>
+          <a:p>
+            <a:r>
+              <a:rPr lang="fr-FR" dirty="0" smtClean="0"/>
+              <a:t>Collecter</a:t>
+            </a:r>
+            <a:endParaRPr lang="fr-FR" dirty="0"/>
+          </a:p>
+        </p:txBody>
+      </p:sp>
+      <p:sp>
+        <p:nvSpPr>
+          <p:cNvPr id="17" name="ZoneTexte 16"/>
+          <p:cNvSpPr txBox="1"/>
+          <p:nvPr/>
+        </p:nvSpPr>
+        <p:spPr>
+          <a:xfrm>
+            <a:off x="6084168" y="2308230"/>
+            <a:ext cx="1656184" cy="369332"/>
+          </a:xfrm>
+          <a:prstGeom prst="rect">
+            <a:avLst/>
+          </a:prstGeom>
+          <a:noFill/>
+        </p:spPr>
+        <p:txBody>
+          <a:bodyPr wrap="square" rtlCol="0">
+            <a:spAutoFit/>
+          </a:bodyPr>
+          <a:lstStyle/>
+          <a:p>
+            <a:r>
+              <a:rPr lang="fr-FR" dirty="0" smtClean="0"/>
+              <a:t>Transformer</a:t>
+            </a:r>
+            <a:endParaRPr lang="fr-FR" dirty="0"/>
+          </a:p>
+        </p:txBody>
+      </p:sp>
+      <p:sp>
+        <p:nvSpPr>
+          <p:cNvPr id="18" name="ZoneTexte 17"/>
+          <p:cNvSpPr txBox="1"/>
+          <p:nvPr/>
+        </p:nvSpPr>
+        <p:spPr>
+          <a:xfrm>
+            <a:off x="6084168" y="3347329"/>
+            <a:ext cx="1656184" cy="369332"/>
+          </a:xfrm>
+          <a:prstGeom prst="rect">
+            <a:avLst/>
+          </a:prstGeom>
+          <a:noFill/>
+        </p:spPr>
+        <p:txBody>
+          <a:bodyPr wrap="square" rtlCol="0">
+            <a:spAutoFit/>
+          </a:bodyPr>
+          <a:lstStyle/>
+          <a:p>
+            <a:r>
+              <a:rPr lang="fr-FR" dirty="0" smtClean="0"/>
+              <a:t>Conserver</a:t>
+            </a:r>
+            <a:endParaRPr lang="fr-FR" dirty="0"/>
+          </a:p>
+        </p:txBody>
+      </p:sp>
+      <p:sp>
+        <p:nvSpPr>
+          <p:cNvPr id="19" name="ZoneTexte 18"/>
+          <p:cNvSpPr txBox="1"/>
+          <p:nvPr/>
+        </p:nvSpPr>
+        <p:spPr>
+          <a:xfrm>
+            <a:off x="6084168" y="4396462"/>
+            <a:ext cx="1656184" cy="369332"/>
+          </a:xfrm>
+          <a:prstGeom prst="rect">
+            <a:avLst/>
+          </a:prstGeom>
+          <a:noFill/>
+        </p:spPr>
+        <p:txBody>
+          <a:bodyPr wrap="square" rtlCol="0">
+            <a:spAutoFit/>
+          </a:bodyPr>
+          <a:lstStyle/>
+          <a:p>
+            <a:r>
+              <a:rPr lang="fr-FR" dirty="0" smtClean="0"/>
+              <a:t>Diffuser</a:t>
+            </a:r>
+            <a:endParaRPr lang="fr-FR" dirty="0"/>
+          </a:p>
+        </p:txBody>
+      </p:sp>
+    </p:spTree>
+    <p:extLst>
+      <p:ext uri="{BB962C8B-B14F-4D97-AF65-F5344CB8AC3E}">
+        <p14:creationId xmlns:p14="http://schemas.microsoft.com/office/powerpoint/2010/main" val="643032167"/>
+      </p:ext>
+    </p:extLst>
+  </p:cSld>
+  <p:clrMapOvr>
+    <a:masterClrMapping/>
+  </p:clrMapOvr>
+</p:sld>
+</file>
+
+<file path=ppt/slides/slide8.xml><?xml version="1.0" encoding="utf-8"?>
+<p:sld xmlns:a="http://schemas.openxmlformats.org/drawingml/2006/main" xmlns:r="http://schemas.openxmlformats.org/officeDocument/2006/relationships" xmlns:p="http://schemas.openxmlformats.org/presentationml/2006/main">
+  <p:cSld>
+    <p:spTree>
+      <p:nvGrpSpPr>
+        <p:cNvPr id="1" name=""/>
+        <p:cNvGrpSpPr/>
+        <p:nvPr/>
+      </p:nvGrpSpPr>
+      <p:grpSpPr>
+        <a:xfrm>
+          <a:off x="0" y="0"/>
+          <a:ext cx="0" cy="0"/>
+          <a:chOff x="0" y="0"/>
+          <a:chExt cx="0" cy="0"/>
+        </a:xfrm>
+      </p:grpSpPr>
+      <p:sp>
+        <p:nvSpPr>
+          <p:cNvPr id="2" name="Ellipse 1"/>
+          <p:cNvSpPr/>
+          <p:nvPr/>
+        </p:nvSpPr>
+        <p:spPr>
+          <a:xfrm>
+            <a:off x="2195736" y="1412776"/>
+            <a:ext cx="4896544" cy="3816424"/>
+          </a:xfrm>
+          <a:prstGeom prst="ellipse">
+            <a:avLst/>
+          </a:prstGeom>
+        </p:spPr>
+        <p:style>
+          <a:lnRef idx="2">
+            <a:schemeClr val="accent1">
+              <a:shade val="50000"/>
+            </a:schemeClr>
+          </a:lnRef>
+          <a:fillRef idx="1">
+            <a:schemeClr val="accent1"/>
+          </a:fillRef>
+          <a:effectRef idx="0">
+            <a:schemeClr val="accent1"/>
+          </a:effectRef>
+          <a:fontRef idx="minor">
+            <a:schemeClr val="lt1"/>
+          </a:fontRef>
+        </p:style>
+        <p:txBody>
+          <a:bodyPr rtlCol="0" anchor="ctr"/>
+          <a:lstStyle/>
+          <a:p>
+            <a:pPr algn="ctr"/>
+            <a:r>
+              <a:rPr lang="fr-FR" sz="2400" dirty="0" smtClean="0"/>
+              <a:t>Use cases</a:t>
+            </a:r>
+            <a:endParaRPr lang="fr-FR" sz="2400" dirty="0"/>
+          </a:p>
+        </p:txBody>
+      </p:sp>
+      <p:sp>
+        <p:nvSpPr>
+          <p:cNvPr id="3" name="Rectangle à coins arrondis 2"/>
+          <p:cNvSpPr/>
+          <p:nvPr/>
+        </p:nvSpPr>
+        <p:spPr>
+          <a:xfrm>
+            <a:off x="1475656" y="1124744"/>
+            <a:ext cx="2304256" cy="1656184"/>
+          </a:xfrm>
+          <a:prstGeom prst="roundRect">
+            <a:avLst/>
+          </a:prstGeom>
+        </p:spPr>
+        <p:style>
+          <a:lnRef idx="2">
+            <a:schemeClr val="accent2"/>
+          </a:lnRef>
+          <a:fillRef idx="1">
+            <a:schemeClr val="lt1"/>
+          </a:fillRef>
+          <a:effectRef idx="0">
+            <a:schemeClr val="accent2"/>
+          </a:effectRef>
+          <a:fontRef idx="minor">
+            <a:schemeClr val="dk1"/>
+          </a:fontRef>
+        </p:style>
+        <p:txBody>
+          <a:bodyPr rtlCol="0" anchor="ctr"/>
+          <a:lstStyle/>
+          <a:p>
+            <a:pPr algn="ctr"/>
+            <a:r>
+              <a:rPr lang="fr-FR" dirty="0" smtClean="0"/>
+              <a:t>Vue logique</a:t>
+            </a:r>
+            <a:endParaRPr lang="fr-FR" dirty="0"/>
+          </a:p>
+        </p:txBody>
+      </p:sp>
+      <p:sp>
+        <p:nvSpPr>
+          <p:cNvPr id="4" name="Rectangle à coins arrondis 3"/>
+          <p:cNvSpPr/>
+          <p:nvPr/>
+        </p:nvSpPr>
+        <p:spPr>
+          <a:xfrm>
+            <a:off x="1475656" y="3789040"/>
+            <a:ext cx="2304256" cy="1656184"/>
+          </a:xfrm>
+          <a:prstGeom prst="roundRect">
+            <a:avLst/>
+          </a:prstGeom>
+        </p:spPr>
+        <p:style>
+          <a:lnRef idx="2">
+            <a:schemeClr val="accent3"/>
+          </a:lnRef>
+          <a:fillRef idx="1">
+            <a:schemeClr val="lt1"/>
+          </a:fillRef>
+          <a:effectRef idx="0">
+            <a:schemeClr val="accent3"/>
+          </a:effectRef>
+          <a:fontRef idx="minor">
+            <a:schemeClr val="dk1"/>
+          </a:fontRef>
+        </p:style>
+        <p:txBody>
+          <a:bodyPr rtlCol="0" anchor="ctr"/>
+          <a:lstStyle/>
+          <a:p>
+            <a:pPr algn="ctr"/>
+            <a:r>
+              <a:rPr lang="fr-FR" dirty="0" smtClean="0"/>
+              <a:t>Vue processus</a:t>
+            </a:r>
+            <a:endParaRPr lang="fr-FR" dirty="0"/>
+          </a:p>
+        </p:txBody>
+      </p:sp>
+      <p:sp>
+        <p:nvSpPr>
+          <p:cNvPr id="5" name="Rectangle à coins arrondis 4"/>
+          <p:cNvSpPr/>
+          <p:nvPr/>
+        </p:nvSpPr>
+        <p:spPr>
+          <a:xfrm>
+            <a:off x="5652120" y="3789040"/>
+            <a:ext cx="2304256" cy="1656184"/>
+          </a:xfrm>
+          <a:prstGeom prst="roundRect">
+            <a:avLst/>
+          </a:prstGeom>
+        </p:spPr>
+        <p:style>
+          <a:lnRef idx="2">
+            <a:schemeClr val="accent6"/>
+          </a:lnRef>
+          <a:fillRef idx="1">
+            <a:schemeClr val="lt1"/>
+          </a:fillRef>
+          <a:effectRef idx="0">
+            <a:schemeClr val="accent6"/>
+          </a:effectRef>
+          <a:fontRef idx="minor">
+            <a:schemeClr val="dk1"/>
+          </a:fontRef>
+        </p:style>
+        <p:txBody>
+          <a:bodyPr rtlCol="0" anchor="ctr"/>
+          <a:lstStyle/>
+          <a:p>
+            <a:pPr algn="ctr"/>
+            <a:r>
+              <a:rPr lang="fr-FR" dirty="0" smtClean="0"/>
+              <a:t>Vue déploiement</a:t>
+            </a:r>
+            <a:endParaRPr lang="fr-FR" dirty="0"/>
+          </a:p>
+        </p:txBody>
+      </p:sp>
+      <p:sp>
+        <p:nvSpPr>
+          <p:cNvPr id="6" name="Rectangle à coins arrondis 5"/>
+          <p:cNvSpPr/>
+          <p:nvPr/>
+        </p:nvSpPr>
+        <p:spPr>
+          <a:xfrm>
+            <a:off x="5652120" y="1124744"/>
+            <a:ext cx="2304256" cy="1656184"/>
+          </a:xfrm>
+          <a:prstGeom prst="roundRect">
+            <a:avLst/>
+          </a:prstGeom>
+        </p:spPr>
+        <p:style>
+          <a:lnRef idx="2">
+            <a:schemeClr val="dk1"/>
+          </a:lnRef>
+          <a:fillRef idx="1">
+            <a:schemeClr val="lt1"/>
+          </a:fillRef>
+          <a:effectRef idx="0">
+            <a:schemeClr val="dk1"/>
+          </a:effectRef>
+          <a:fontRef idx="minor">
+            <a:schemeClr val="dk1"/>
+          </a:fontRef>
+        </p:style>
+        <p:txBody>
+          <a:bodyPr rtlCol="0" anchor="ctr"/>
+          <a:lstStyle/>
+          <a:p>
+            <a:pPr algn="ctr"/>
+            <a:r>
+              <a:rPr lang="fr-FR" dirty="0" smtClean="0"/>
+              <a:t>Vue composants</a:t>
+            </a:r>
+            <a:endParaRPr lang="fr-FR" dirty="0"/>
+          </a:p>
+        </p:txBody>
+      </p:sp>
+    </p:spTree>
+    <p:extLst>
+      <p:ext uri="{BB962C8B-B14F-4D97-AF65-F5344CB8AC3E}">
+        <p14:creationId xmlns:p14="http://schemas.microsoft.com/office/powerpoint/2010/main" val="972004577"/>
       </p:ext>
     </p:extLst>
   </p:cSld>

</xml_diff>

<commit_message>
[ENSG ASI 2014] wip
</commit_message>
<xml_diff>
--- a/cours/ensg-asi-2014/src/raws/img_gen.pptx
+++ b/cours/ensg-asi-2014/src/raws/img_gen.pptx
@@ -10,6 +10,9 @@
     <p:sldId id="258" r:id="rId4"/>
     <p:sldId id="259" r:id="rId5"/>
     <p:sldId id="260" r:id="rId6"/>
+    <p:sldId id="263" r:id="rId7"/>
+    <p:sldId id="261" r:id="rId8"/>
+    <p:sldId id="262" r:id="rId9"/>
   </p:sldIdLst>
   <p:sldSz cx="9144000" cy="6858000" type="screen4x3"/>
   <p:notesSz cx="6858000" cy="9144000"/>
@@ -292,7 +295,7 @@
           <a:p>
             <a:fld id="{B511EEBD-DB93-4DB6-9ADA-68547254FD74}" type="datetimeFigureOut">
               <a:rPr lang="fr-FR" smtClean="0"/>
-              <a:t>19/10/2014</a:t>
+              <a:t>20/10/2014</a:t>
             </a:fld>
             <a:endParaRPr lang="fr-FR"/>
           </a:p>
@@ -462,7 +465,7 @@
           <a:p>
             <a:fld id="{B511EEBD-DB93-4DB6-9ADA-68547254FD74}" type="datetimeFigureOut">
               <a:rPr lang="fr-FR" smtClean="0"/>
-              <a:t>19/10/2014</a:t>
+              <a:t>20/10/2014</a:t>
             </a:fld>
             <a:endParaRPr lang="fr-FR"/>
           </a:p>
@@ -642,7 +645,7 @@
           <a:p>
             <a:fld id="{B511EEBD-DB93-4DB6-9ADA-68547254FD74}" type="datetimeFigureOut">
               <a:rPr lang="fr-FR" smtClean="0"/>
-              <a:t>19/10/2014</a:t>
+              <a:t>20/10/2014</a:t>
             </a:fld>
             <a:endParaRPr lang="fr-FR"/>
           </a:p>
@@ -812,7 +815,7 @@
           <a:p>
             <a:fld id="{B511EEBD-DB93-4DB6-9ADA-68547254FD74}" type="datetimeFigureOut">
               <a:rPr lang="fr-FR" smtClean="0"/>
-              <a:t>19/10/2014</a:t>
+              <a:t>20/10/2014</a:t>
             </a:fld>
             <a:endParaRPr lang="fr-FR"/>
           </a:p>
@@ -1058,7 +1061,7 @@
           <a:p>
             <a:fld id="{B511EEBD-DB93-4DB6-9ADA-68547254FD74}" type="datetimeFigureOut">
               <a:rPr lang="fr-FR" smtClean="0"/>
-              <a:t>19/10/2014</a:t>
+              <a:t>20/10/2014</a:t>
             </a:fld>
             <a:endParaRPr lang="fr-FR"/>
           </a:p>
@@ -1346,7 +1349,7 @@
           <a:p>
             <a:fld id="{B511EEBD-DB93-4DB6-9ADA-68547254FD74}" type="datetimeFigureOut">
               <a:rPr lang="fr-FR" smtClean="0"/>
-              <a:t>19/10/2014</a:t>
+              <a:t>20/10/2014</a:t>
             </a:fld>
             <a:endParaRPr lang="fr-FR"/>
           </a:p>
@@ -1768,7 +1771,7 @@
           <a:p>
             <a:fld id="{B511EEBD-DB93-4DB6-9ADA-68547254FD74}" type="datetimeFigureOut">
               <a:rPr lang="fr-FR" smtClean="0"/>
-              <a:t>19/10/2014</a:t>
+              <a:t>20/10/2014</a:t>
             </a:fld>
             <a:endParaRPr lang="fr-FR"/>
           </a:p>
@@ -1886,7 +1889,7 @@
           <a:p>
             <a:fld id="{B511EEBD-DB93-4DB6-9ADA-68547254FD74}" type="datetimeFigureOut">
               <a:rPr lang="fr-FR" smtClean="0"/>
-              <a:t>19/10/2014</a:t>
+              <a:t>20/10/2014</a:t>
             </a:fld>
             <a:endParaRPr lang="fr-FR"/>
           </a:p>
@@ -1981,7 +1984,7 @@
           <a:p>
             <a:fld id="{B511EEBD-DB93-4DB6-9ADA-68547254FD74}" type="datetimeFigureOut">
               <a:rPr lang="fr-FR" smtClean="0"/>
-              <a:t>19/10/2014</a:t>
+              <a:t>20/10/2014</a:t>
             </a:fld>
             <a:endParaRPr lang="fr-FR"/>
           </a:p>
@@ -2258,7 +2261,7 @@
           <a:p>
             <a:fld id="{B511EEBD-DB93-4DB6-9ADA-68547254FD74}" type="datetimeFigureOut">
               <a:rPr lang="fr-FR" smtClean="0"/>
-              <a:t>19/10/2014</a:t>
+              <a:t>20/10/2014</a:t>
             </a:fld>
             <a:endParaRPr lang="fr-FR"/>
           </a:p>
@@ -2511,7 +2514,7 @@
           <a:p>
             <a:fld id="{B511EEBD-DB93-4DB6-9ADA-68547254FD74}" type="datetimeFigureOut">
               <a:rPr lang="fr-FR" smtClean="0"/>
-              <a:t>19/10/2014</a:t>
+              <a:t>20/10/2014</a:t>
             </a:fld>
             <a:endParaRPr lang="fr-FR"/>
           </a:p>
@@ -2724,7 +2727,7 @@
           <a:p>
             <a:fld id="{B511EEBD-DB93-4DB6-9ADA-68547254FD74}" type="datetimeFigureOut">
               <a:rPr lang="fr-FR" smtClean="0"/>
-              <a:t>19/10/2014</a:t>
+              <a:t>20/10/2014</a:t>
             </a:fld>
             <a:endParaRPr lang="fr-FR"/>
           </a:p>
@@ -3207,7 +3210,7 @@
             <a:pPr algn="ctr"/>
             <a:r>
               <a:rPr lang="fr-FR" sz="4000" dirty="0" smtClean="0"/>
-              <a:t>Client</a:t>
+              <a:t>Serveur</a:t>
             </a:r>
             <a:endParaRPr lang="fr-FR" sz="4000" dirty="0"/>
           </a:p>
@@ -3248,8 +3251,8 @@
           <a:p>
             <a:pPr algn="ctr"/>
             <a:r>
-              <a:rPr lang="fr-FR" sz="4000" dirty="0" smtClean="0"/>
-              <a:t>Serveur</a:t>
+              <a:rPr lang="fr-FR" sz="4000" dirty="0"/>
+              <a:t>Client</a:t>
             </a:r>
             <a:endParaRPr lang="fr-FR" sz="4000" dirty="0"/>
           </a:p>
@@ -5153,7 +5156,7 @@
           <a:p>
             <a:r>
               <a:rPr lang="fr-FR" sz="2400" dirty="0" smtClean="0"/>
-              <a:t>Accès aux donnée</a:t>
+              <a:t>Accès aux données</a:t>
             </a:r>
             <a:endParaRPr lang="fr-FR" sz="2400" dirty="0"/>
           </a:p>
@@ -5237,7 +5240,7 @@
             <a:pPr algn="ctr"/>
             <a:r>
               <a:rPr lang="fr-FR" dirty="0" smtClean="0"/>
-              <a:t>Donnée</a:t>
+              <a:t>Données</a:t>
             </a:r>
             <a:endParaRPr lang="fr-FR" dirty="0"/>
           </a:p>
@@ -5475,6 +5478,1614 @@
     <p:extLst>
       <p:ext uri="{BB962C8B-B14F-4D97-AF65-F5344CB8AC3E}">
         <p14:creationId xmlns:p14="http://schemas.microsoft.com/office/powerpoint/2010/main" val="526575183"/>
+      </p:ext>
+    </p:extLst>
+  </p:cSld>
+  <p:clrMapOvr>
+    <a:masterClrMapping/>
+  </p:clrMapOvr>
+</p:sld>
+</file>
+
+<file path=ppt/slides/slide6.xml><?xml version="1.0" encoding="utf-8"?>
+<p:sld xmlns:a="http://schemas.openxmlformats.org/drawingml/2006/main" xmlns:r="http://schemas.openxmlformats.org/officeDocument/2006/relationships" xmlns:p="http://schemas.openxmlformats.org/presentationml/2006/main">
+  <p:cSld>
+    <p:spTree>
+      <p:nvGrpSpPr>
+        <p:cNvPr id="1" name=""/>
+        <p:cNvGrpSpPr/>
+        <p:nvPr/>
+      </p:nvGrpSpPr>
+      <p:grpSpPr>
+        <a:xfrm>
+          <a:off x="0" y="0"/>
+          <a:ext cx="0" cy="0"/>
+          <a:chOff x="0" y="0"/>
+          <a:chExt cx="0" cy="0"/>
+        </a:xfrm>
+      </p:grpSpPr>
+      <p:sp>
+        <p:nvSpPr>
+          <p:cNvPr id="2" name="Rectangle à coins arrondis 1"/>
+          <p:cNvSpPr/>
+          <p:nvPr/>
+        </p:nvSpPr>
+        <p:spPr>
+          <a:xfrm>
+            <a:off x="935596" y="1362069"/>
+            <a:ext cx="2808312" cy="826190"/>
+          </a:xfrm>
+          <a:prstGeom prst="roundRect">
+            <a:avLst/>
+          </a:prstGeom>
+        </p:spPr>
+        <p:style>
+          <a:lnRef idx="2">
+            <a:schemeClr val="accent3">
+              <a:shade val="50000"/>
+            </a:schemeClr>
+          </a:lnRef>
+          <a:fillRef idx="1">
+            <a:schemeClr val="accent3"/>
+          </a:fillRef>
+          <a:effectRef idx="0">
+            <a:schemeClr val="accent3"/>
+          </a:effectRef>
+          <a:fontRef idx="minor">
+            <a:schemeClr val="lt1"/>
+          </a:fontRef>
+        </p:style>
+        <p:txBody>
+          <a:bodyPr rtlCol="0" anchor="ctr"/>
+          <a:lstStyle/>
+          <a:p>
+            <a:pPr algn="ctr"/>
+            <a:r>
+              <a:rPr lang="fr-FR" sz="2400" dirty="0" smtClean="0"/>
+              <a:t>Présentation 1</a:t>
+            </a:r>
+            <a:endParaRPr lang="fr-FR" sz="2400" dirty="0"/>
+          </a:p>
+        </p:txBody>
+      </p:sp>
+      <p:sp>
+        <p:nvSpPr>
+          <p:cNvPr id="5" name="Rectangle à coins arrondis 4"/>
+          <p:cNvSpPr/>
+          <p:nvPr/>
+        </p:nvSpPr>
+        <p:spPr>
+          <a:xfrm>
+            <a:off x="645439" y="2829282"/>
+            <a:ext cx="1694313" cy="826190"/>
+          </a:xfrm>
+          <a:prstGeom prst="roundRect">
+            <a:avLst/>
+          </a:prstGeom>
+        </p:spPr>
+        <p:style>
+          <a:lnRef idx="2">
+            <a:schemeClr val="accent1">
+              <a:shade val="50000"/>
+            </a:schemeClr>
+          </a:lnRef>
+          <a:fillRef idx="1">
+            <a:schemeClr val="accent1"/>
+          </a:fillRef>
+          <a:effectRef idx="0">
+            <a:schemeClr val="accent1"/>
+          </a:effectRef>
+          <a:fontRef idx="minor">
+            <a:schemeClr val="lt1"/>
+          </a:fontRef>
+        </p:style>
+        <p:txBody>
+          <a:bodyPr rtlCol="0" anchor="ctr"/>
+          <a:lstStyle/>
+          <a:p>
+            <a:pPr algn="ctr"/>
+            <a:r>
+              <a:rPr lang="fr-FR" sz="2400" dirty="0" smtClean="0"/>
+              <a:t>Métier  1</a:t>
+            </a:r>
+            <a:endParaRPr lang="fr-FR" sz="2400" dirty="0"/>
+          </a:p>
+        </p:txBody>
+      </p:sp>
+      <p:sp>
+        <p:nvSpPr>
+          <p:cNvPr id="6" name="Rectangle à coins arrondis 5"/>
+          <p:cNvSpPr/>
+          <p:nvPr/>
+        </p:nvSpPr>
+        <p:spPr>
+          <a:xfrm>
+            <a:off x="1619672" y="4445318"/>
+            <a:ext cx="2952328" cy="826190"/>
+          </a:xfrm>
+          <a:prstGeom prst="roundRect">
+            <a:avLst/>
+          </a:prstGeom>
+        </p:spPr>
+        <p:style>
+          <a:lnRef idx="2">
+            <a:schemeClr val="accent2">
+              <a:shade val="50000"/>
+            </a:schemeClr>
+          </a:lnRef>
+          <a:fillRef idx="1">
+            <a:schemeClr val="accent2"/>
+          </a:fillRef>
+          <a:effectRef idx="0">
+            <a:schemeClr val="accent2"/>
+          </a:effectRef>
+          <a:fontRef idx="minor">
+            <a:schemeClr val="lt1"/>
+          </a:fontRef>
+        </p:style>
+        <p:txBody>
+          <a:bodyPr rtlCol="0" anchor="ctr"/>
+          <a:lstStyle/>
+          <a:p>
+            <a:r>
+              <a:rPr lang="fr-FR" sz="2400" dirty="0" smtClean="0"/>
+              <a:t>Accès aux données 1</a:t>
+            </a:r>
+            <a:endParaRPr lang="fr-FR" sz="2400" dirty="0"/>
+          </a:p>
+        </p:txBody>
+      </p:sp>
+      <p:sp>
+        <p:nvSpPr>
+          <p:cNvPr id="7" name="Émoticône 6"/>
+          <p:cNvSpPr/>
+          <p:nvPr/>
+        </p:nvSpPr>
+        <p:spPr>
+          <a:xfrm>
+            <a:off x="4085959" y="404664"/>
+            <a:ext cx="630057" cy="576064"/>
+          </a:xfrm>
+          <a:prstGeom prst="smileyFace">
+            <a:avLst/>
+          </a:prstGeom>
+        </p:spPr>
+        <p:style>
+          <a:lnRef idx="2">
+            <a:schemeClr val="accent3">
+              <a:shade val="50000"/>
+            </a:schemeClr>
+          </a:lnRef>
+          <a:fillRef idx="1">
+            <a:schemeClr val="accent3"/>
+          </a:fillRef>
+          <a:effectRef idx="0">
+            <a:schemeClr val="accent3"/>
+          </a:effectRef>
+          <a:fontRef idx="minor">
+            <a:schemeClr val="lt1"/>
+          </a:fontRef>
+        </p:style>
+        <p:txBody>
+          <a:bodyPr rtlCol="0" anchor="ctr"/>
+          <a:lstStyle/>
+          <a:p>
+            <a:pPr algn="ctr"/>
+            <a:endParaRPr lang="fr-FR"/>
+          </a:p>
+        </p:txBody>
+      </p:sp>
+      <p:sp>
+        <p:nvSpPr>
+          <p:cNvPr id="8" name="Cylindre 7"/>
+          <p:cNvSpPr/>
+          <p:nvPr/>
+        </p:nvSpPr>
+        <p:spPr>
+          <a:xfrm>
+            <a:off x="2555776" y="5661248"/>
+            <a:ext cx="1080120" cy="936104"/>
+          </a:xfrm>
+          <a:prstGeom prst="can">
+            <a:avLst/>
+          </a:prstGeom>
+        </p:spPr>
+        <p:style>
+          <a:lnRef idx="2">
+            <a:schemeClr val="accent6">
+              <a:shade val="50000"/>
+            </a:schemeClr>
+          </a:lnRef>
+          <a:fillRef idx="1">
+            <a:schemeClr val="accent6"/>
+          </a:fillRef>
+          <a:effectRef idx="0">
+            <a:schemeClr val="accent6"/>
+          </a:effectRef>
+          <a:fontRef idx="minor">
+            <a:schemeClr val="lt1"/>
+          </a:fontRef>
+        </p:style>
+        <p:txBody>
+          <a:bodyPr rtlCol="0" anchor="ctr"/>
+          <a:lstStyle/>
+          <a:p>
+            <a:pPr algn="ctr"/>
+            <a:endParaRPr lang="fr-FR" dirty="0"/>
+          </a:p>
+        </p:txBody>
+      </p:sp>
+      <p:cxnSp>
+        <p:nvCxnSpPr>
+          <p:cNvPr id="12" name="Connecteur droit avec flèche 11"/>
+          <p:cNvCxnSpPr>
+            <a:stCxn id="7" idx="3"/>
+            <a:endCxn id="2" idx="0"/>
+          </p:cNvCxnSpPr>
+          <p:nvPr/>
+        </p:nvCxnSpPr>
+        <p:spPr>
+          <a:xfrm flipH="1">
+            <a:off x="2339752" y="896365"/>
+            <a:ext cx="1838477" cy="465704"/>
+          </a:xfrm>
+          <a:prstGeom prst="straightConnector1">
+            <a:avLst/>
+          </a:prstGeom>
+          <a:ln>
+            <a:headEnd type="arrow"/>
+            <a:tailEnd type="arrow"/>
+          </a:ln>
+        </p:spPr>
+        <p:style>
+          <a:lnRef idx="2">
+            <a:schemeClr val="dk1"/>
+          </a:lnRef>
+          <a:fillRef idx="0">
+            <a:schemeClr val="dk1"/>
+          </a:fillRef>
+          <a:effectRef idx="1">
+            <a:schemeClr val="dk1"/>
+          </a:effectRef>
+          <a:fontRef idx="minor">
+            <a:schemeClr val="tx1"/>
+          </a:fontRef>
+        </p:style>
+      </p:cxnSp>
+      <p:cxnSp>
+        <p:nvCxnSpPr>
+          <p:cNvPr id="13" name="Connecteur droit avec flèche 12"/>
+          <p:cNvCxnSpPr>
+            <a:stCxn id="2" idx="2"/>
+            <a:endCxn id="5" idx="0"/>
+          </p:cNvCxnSpPr>
+          <p:nvPr/>
+        </p:nvCxnSpPr>
+        <p:spPr>
+          <a:xfrm flipH="1">
+            <a:off x="1492596" y="2188259"/>
+            <a:ext cx="847156" cy="641023"/>
+          </a:xfrm>
+          <a:prstGeom prst="straightConnector1">
+            <a:avLst/>
+          </a:prstGeom>
+          <a:ln>
+            <a:headEnd type="arrow"/>
+            <a:tailEnd type="arrow"/>
+          </a:ln>
+        </p:spPr>
+        <p:style>
+          <a:lnRef idx="2">
+            <a:schemeClr val="dk1"/>
+          </a:lnRef>
+          <a:fillRef idx="0">
+            <a:schemeClr val="dk1"/>
+          </a:fillRef>
+          <a:effectRef idx="1">
+            <a:schemeClr val="dk1"/>
+          </a:effectRef>
+          <a:fontRef idx="minor">
+            <a:schemeClr val="tx1"/>
+          </a:fontRef>
+        </p:style>
+      </p:cxnSp>
+      <p:cxnSp>
+        <p:nvCxnSpPr>
+          <p:cNvPr id="16" name="Connecteur droit avec flèche 15"/>
+          <p:cNvCxnSpPr>
+            <a:stCxn id="5" idx="2"/>
+            <a:endCxn id="6" idx="0"/>
+          </p:cNvCxnSpPr>
+          <p:nvPr/>
+        </p:nvCxnSpPr>
+        <p:spPr>
+          <a:xfrm>
+            <a:off x="1492596" y="3655472"/>
+            <a:ext cx="1603240" cy="789846"/>
+          </a:xfrm>
+          <a:prstGeom prst="straightConnector1">
+            <a:avLst/>
+          </a:prstGeom>
+          <a:ln>
+            <a:headEnd type="arrow"/>
+            <a:tailEnd type="arrow"/>
+          </a:ln>
+        </p:spPr>
+        <p:style>
+          <a:lnRef idx="2">
+            <a:schemeClr val="dk1"/>
+          </a:lnRef>
+          <a:fillRef idx="0">
+            <a:schemeClr val="dk1"/>
+          </a:fillRef>
+          <a:effectRef idx="1">
+            <a:schemeClr val="dk1"/>
+          </a:effectRef>
+          <a:fontRef idx="minor">
+            <a:schemeClr val="tx1"/>
+          </a:fontRef>
+        </p:style>
+      </p:cxnSp>
+      <p:cxnSp>
+        <p:nvCxnSpPr>
+          <p:cNvPr id="19" name="Connecteur droit avec flèche 18"/>
+          <p:cNvCxnSpPr>
+            <a:stCxn id="6" idx="2"/>
+            <a:endCxn id="8" idx="1"/>
+          </p:cNvCxnSpPr>
+          <p:nvPr/>
+        </p:nvCxnSpPr>
+        <p:spPr>
+          <a:xfrm>
+            <a:off x="3095836" y="5271508"/>
+            <a:ext cx="0" cy="389740"/>
+          </a:xfrm>
+          <a:prstGeom prst="straightConnector1">
+            <a:avLst/>
+          </a:prstGeom>
+          <a:ln>
+            <a:headEnd type="arrow"/>
+            <a:tailEnd type="arrow"/>
+          </a:ln>
+        </p:spPr>
+        <p:style>
+          <a:lnRef idx="2">
+            <a:schemeClr val="dk1"/>
+          </a:lnRef>
+          <a:fillRef idx="0">
+            <a:schemeClr val="dk1"/>
+          </a:fillRef>
+          <a:effectRef idx="1">
+            <a:schemeClr val="dk1"/>
+          </a:effectRef>
+          <a:fontRef idx="minor">
+            <a:schemeClr val="tx1"/>
+          </a:fontRef>
+        </p:style>
+      </p:cxnSp>
+      <p:sp>
+        <p:nvSpPr>
+          <p:cNvPr id="22" name="Rectangle à coins arrondis 21"/>
+          <p:cNvSpPr/>
+          <p:nvPr/>
+        </p:nvSpPr>
+        <p:spPr>
+          <a:xfrm>
+            <a:off x="3436811" y="2863740"/>
+            <a:ext cx="1694313" cy="826190"/>
+          </a:xfrm>
+          <a:prstGeom prst="roundRect">
+            <a:avLst/>
+          </a:prstGeom>
+        </p:spPr>
+        <p:style>
+          <a:lnRef idx="2">
+            <a:schemeClr val="accent1">
+              <a:shade val="50000"/>
+            </a:schemeClr>
+          </a:lnRef>
+          <a:fillRef idx="1">
+            <a:schemeClr val="accent1"/>
+          </a:fillRef>
+          <a:effectRef idx="0">
+            <a:schemeClr val="accent1"/>
+          </a:effectRef>
+          <a:fontRef idx="minor">
+            <a:schemeClr val="lt1"/>
+          </a:fontRef>
+        </p:style>
+        <p:txBody>
+          <a:bodyPr rtlCol="0" anchor="ctr"/>
+          <a:lstStyle/>
+          <a:p>
+            <a:pPr algn="ctr"/>
+            <a:r>
+              <a:rPr lang="fr-FR" sz="2400" dirty="0" smtClean="0"/>
+              <a:t>Métier 2</a:t>
+            </a:r>
+            <a:endParaRPr lang="fr-FR" sz="2400" dirty="0"/>
+          </a:p>
+        </p:txBody>
+      </p:sp>
+      <p:sp>
+        <p:nvSpPr>
+          <p:cNvPr id="23" name="Rectangle à coins arrondis 22"/>
+          <p:cNvSpPr/>
+          <p:nvPr/>
+        </p:nvSpPr>
+        <p:spPr>
+          <a:xfrm>
+            <a:off x="4788113" y="1362069"/>
+            <a:ext cx="2808312" cy="826190"/>
+          </a:xfrm>
+          <a:prstGeom prst="roundRect">
+            <a:avLst/>
+          </a:prstGeom>
+        </p:spPr>
+        <p:style>
+          <a:lnRef idx="2">
+            <a:schemeClr val="accent3">
+              <a:shade val="50000"/>
+            </a:schemeClr>
+          </a:lnRef>
+          <a:fillRef idx="1">
+            <a:schemeClr val="accent3"/>
+          </a:fillRef>
+          <a:effectRef idx="0">
+            <a:schemeClr val="accent3"/>
+          </a:effectRef>
+          <a:fontRef idx="minor">
+            <a:schemeClr val="lt1"/>
+          </a:fontRef>
+        </p:style>
+        <p:txBody>
+          <a:bodyPr rtlCol="0" anchor="ctr"/>
+          <a:lstStyle/>
+          <a:p>
+            <a:pPr algn="ctr"/>
+            <a:r>
+              <a:rPr lang="fr-FR" sz="2400" dirty="0" smtClean="0"/>
+              <a:t>Présentation 2</a:t>
+            </a:r>
+            <a:endParaRPr lang="fr-FR" sz="2400" dirty="0"/>
+          </a:p>
+        </p:txBody>
+      </p:sp>
+      <p:sp>
+        <p:nvSpPr>
+          <p:cNvPr id="24" name="Rectangle à coins arrondis 23"/>
+          <p:cNvSpPr/>
+          <p:nvPr/>
+        </p:nvSpPr>
+        <p:spPr>
+          <a:xfrm>
+            <a:off x="6111788" y="2863740"/>
+            <a:ext cx="1694313" cy="826190"/>
+          </a:xfrm>
+          <a:prstGeom prst="roundRect">
+            <a:avLst/>
+          </a:prstGeom>
+        </p:spPr>
+        <p:style>
+          <a:lnRef idx="2">
+            <a:schemeClr val="accent1">
+              <a:shade val="50000"/>
+            </a:schemeClr>
+          </a:lnRef>
+          <a:fillRef idx="1">
+            <a:schemeClr val="accent1"/>
+          </a:fillRef>
+          <a:effectRef idx="0">
+            <a:schemeClr val="accent1"/>
+          </a:effectRef>
+          <a:fontRef idx="minor">
+            <a:schemeClr val="lt1"/>
+          </a:fontRef>
+        </p:style>
+        <p:txBody>
+          <a:bodyPr rtlCol="0" anchor="ctr"/>
+          <a:lstStyle/>
+          <a:p>
+            <a:pPr algn="ctr"/>
+            <a:r>
+              <a:rPr lang="fr-FR" sz="2400" dirty="0" smtClean="0"/>
+              <a:t>Métier 3</a:t>
+            </a:r>
+            <a:endParaRPr lang="fr-FR" sz="2400" dirty="0"/>
+          </a:p>
+        </p:txBody>
+      </p:sp>
+      <p:sp>
+        <p:nvSpPr>
+          <p:cNvPr id="32" name="Rectangle à coins arrondis 31"/>
+          <p:cNvSpPr/>
+          <p:nvPr/>
+        </p:nvSpPr>
+        <p:spPr>
+          <a:xfrm>
+            <a:off x="4853773" y="4446062"/>
+            <a:ext cx="2952328" cy="826190"/>
+          </a:xfrm>
+          <a:prstGeom prst="roundRect">
+            <a:avLst/>
+          </a:prstGeom>
+        </p:spPr>
+        <p:style>
+          <a:lnRef idx="2">
+            <a:schemeClr val="accent2">
+              <a:shade val="50000"/>
+            </a:schemeClr>
+          </a:lnRef>
+          <a:fillRef idx="1">
+            <a:schemeClr val="accent2"/>
+          </a:fillRef>
+          <a:effectRef idx="0">
+            <a:schemeClr val="accent2"/>
+          </a:effectRef>
+          <a:fontRef idx="minor">
+            <a:schemeClr val="lt1"/>
+          </a:fontRef>
+        </p:style>
+        <p:txBody>
+          <a:bodyPr rtlCol="0" anchor="ctr"/>
+          <a:lstStyle/>
+          <a:p>
+            <a:r>
+              <a:rPr lang="fr-FR" sz="2400" dirty="0" smtClean="0"/>
+              <a:t>Accès aux données 2</a:t>
+            </a:r>
+            <a:endParaRPr lang="fr-FR" sz="2400" dirty="0"/>
+          </a:p>
+        </p:txBody>
+      </p:sp>
+      <p:sp>
+        <p:nvSpPr>
+          <p:cNvPr id="33" name="Cylindre 32"/>
+          <p:cNvSpPr/>
+          <p:nvPr/>
+        </p:nvSpPr>
+        <p:spPr>
+          <a:xfrm>
+            <a:off x="5796136" y="5661248"/>
+            <a:ext cx="1080120" cy="936104"/>
+          </a:xfrm>
+          <a:prstGeom prst="can">
+            <a:avLst/>
+          </a:prstGeom>
+        </p:spPr>
+        <p:style>
+          <a:lnRef idx="2">
+            <a:schemeClr val="accent6">
+              <a:shade val="50000"/>
+            </a:schemeClr>
+          </a:lnRef>
+          <a:fillRef idx="1">
+            <a:schemeClr val="accent6"/>
+          </a:fillRef>
+          <a:effectRef idx="0">
+            <a:schemeClr val="accent6"/>
+          </a:effectRef>
+          <a:fontRef idx="minor">
+            <a:schemeClr val="lt1"/>
+          </a:fontRef>
+        </p:style>
+        <p:txBody>
+          <a:bodyPr rtlCol="0" anchor="ctr"/>
+          <a:lstStyle/>
+          <a:p>
+            <a:pPr algn="ctr"/>
+            <a:endParaRPr lang="fr-FR" dirty="0"/>
+          </a:p>
+        </p:txBody>
+      </p:sp>
+      <p:cxnSp>
+        <p:nvCxnSpPr>
+          <p:cNvPr id="34" name="Connecteur droit avec flèche 33"/>
+          <p:cNvCxnSpPr>
+            <a:stCxn id="32" idx="2"/>
+            <a:endCxn id="33" idx="1"/>
+          </p:cNvCxnSpPr>
+          <p:nvPr/>
+        </p:nvCxnSpPr>
+        <p:spPr>
+          <a:xfrm>
+            <a:off x="6329937" y="5272252"/>
+            <a:ext cx="6259" cy="388996"/>
+          </a:xfrm>
+          <a:prstGeom prst="straightConnector1">
+            <a:avLst/>
+          </a:prstGeom>
+          <a:ln>
+            <a:headEnd type="arrow"/>
+            <a:tailEnd type="arrow"/>
+          </a:ln>
+        </p:spPr>
+        <p:style>
+          <a:lnRef idx="2">
+            <a:schemeClr val="dk1"/>
+          </a:lnRef>
+          <a:fillRef idx="0">
+            <a:schemeClr val="dk1"/>
+          </a:fillRef>
+          <a:effectRef idx="1">
+            <a:schemeClr val="dk1"/>
+          </a:effectRef>
+          <a:fontRef idx="minor">
+            <a:schemeClr val="tx1"/>
+          </a:fontRef>
+        </p:style>
+      </p:cxnSp>
+      <p:cxnSp>
+        <p:nvCxnSpPr>
+          <p:cNvPr id="35" name="Connecteur droit avec flèche 34"/>
+          <p:cNvCxnSpPr>
+            <a:stCxn id="22" idx="2"/>
+            <a:endCxn id="32" idx="0"/>
+          </p:cNvCxnSpPr>
+          <p:nvPr/>
+        </p:nvCxnSpPr>
+        <p:spPr>
+          <a:xfrm>
+            <a:off x="4283968" y="3689930"/>
+            <a:ext cx="2045969" cy="756132"/>
+          </a:xfrm>
+          <a:prstGeom prst="straightConnector1">
+            <a:avLst/>
+          </a:prstGeom>
+          <a:ln>
+            <a:headEnd type="arrow"/>
+            <a:tailEnd type="arrow"/>
+          </a:ln>
+        </p:spPr>
+        <p:style>
+          <a:lnRef idx="2">
+            <a:schemeClr val="dk1"/>
+          </a:lnRef>
+          <a:fillRef idx="0">
+            <a:schemeClr val="dk1"/>
+          </a:fillRef>
+          <a:effectRef idx="1">
+            <a:schemeClr val="dk1"/>
+          </a:effectRef>
+          <a:fontRef idx="minor">
+            <a:schemeClr val="tx1"/>
+          </a:fontRef>
+        </p:style>
+      </p:cxnSp>
+      <p:cxnSp>
+        <p:nvCxnSpPr>
+          <p:cNvPr id="41" name="Connecteur droit avec flèche 40"/>
+          <p:cNvCxnSpPr>
+            <a:stCxn id="24" idx="2"/>
+            <a:endCxn id="32" idx="0"/>
+          </p:cNvCxnSpPr>
+          <p:nvPr/>
+        </p:nvCxnSpPr>
+        <p:spPr>
+          <a:xfrm flipH="1">
+            <a:off x="6329937" y="3689930"/>
+            <a:ext cx="629008" cy="756132"/>
+          </a:xfrm>
+          <a:prstGeom prst="straightConnector1">
+            <a:avLst/>
+          </a:prstGeom>
+          <a:ln>
+            <a:headEnd type="arrow"/>
+            <a:tailEnd type="arrow"/>
+          </a:ln>
+        </p:spPr>
+        <p:style>
+          <a:lnRef idx="2">
+            <a:schemeClr val="dk1"/>
+          </a:lnRef>
+          <a:fillRef idx="0">
+            <a:schemeClr val="dk1"/>
+          </a:fillRef>
+          <a:effectRef idx="1">
+            <a:schemeClr val="dk1"/>
+          </a:effectRef>
+          <a:fontRef idx="minor">
+            <a:schemeClr val="tx1"/>
+          </a:fontRef>
+        </p:style>
+      </p:cxnSp>
+      <p:cxnSp>
+        <p:nvCxnSpPr>
+          <p:cNvPr id="45" name="Connecteur droit avec flèche 44"/>
+          <p:cNvCxnSpPr>
+            <a:stCxn id="2" idx="2"/>
+            <a:endCxn id="22" idx="0"/>
+          </p:cNvCxnSpPr>
+          <p:nvPr/>
+        </p:nvCxnSpPr>
+        <p:spPr>
+          <a:xfrm>
+            <a:off x="2339752" y="2188259"/>
+            <a:ext cx="1944216" cy="675481"/>
+          </a:xfrm>
+          <a:prstGeom prst="straightConnector1">
+            <a:avLst/>
+          </a:prstGeom>
+          <a:ln>
+            <a:headEnd type="arrow"/>
+            <a:tailEnd type="arrow"/>
+          </a:ln>
+        </p:spPr>
+        <p:style>
+          <a:lnRef idx="2">
+            <a:schemeClr val="dk1"/>
+          </a:lnRef>
+          <a:fillRef idx="0">
+            <a:schemeClr val="dk1"/>
+          </a:fillRef>
+          <a:effectRef idx="1">
+            <a:schemeClr val="dk1"/>
+          </a:effectRef>
+          <a:fontRef idx="minor">
+            <a:schemeClr val="tx1"/>
+          </a:fontRef>
+        </p:style>
+      </p:cxnSp>
+      <p:cxnSp>
+        <p:nvCxnSpPr>
+          <p:cNvPr id="48" name="Connecteur droit avec flèche 47"/>
+          <p:cNvCxnSpPr>
+            <a:stCxn id="22" idx="2"/>
+            <a:endCxn id="6" idx="0"/>
+          </p:cNvCxnSpPr>
+          <p:nvPr/>
+        </p:nvCxnSpPr>
+        <p:spPr>
+          <a:xfrm flipH="1">
+            <a:off x="3095836" y="3689930"/>
+            <a:ext cx="1188132" cy="755388"/>
+          </a:xfrm>
+          <a:prstGeom prst="straightConnector1">
+            <a:avLst/>
+          </a:prstGeom>
+          <a:ln>
+            <a:headEnd type="arrow"/>
+            <a:tailEnd type="arrow"/>
+          </a:ln>
+        </p:spPr>
+        <p:style>
+          <a:lnRef idx="2">
+            <a:schemeClr val="dk1"/>
+          </a:lnRef>
+          <a:fillRef idx="0">
+            <a:schemeClr val="dk1"/>
+          </a:fillRef>
+          <a:effectRef idx="1">
+            <a:schemeClr val="dk1"/>
+          </a:effectRef>
+          <a:fontRef idx="minor">
+            <a:schemeClr val="tx1"/>
+          </a:fontRef>
+        </p:style>
+      </p:cxnSp>
+      <p:cxnSp>
+        <p:nvCxnSpPr>
+          <p:cNvPr id="51" name="Connecteur droit avec flèche 50"/>
+          <p:cNvCxnSpPr>
+            <a:stCxn id="23" idx="2"/>
+            <a:endCxn id="24" idx="0"/>
+          </p:cNvCxnSpPr>
+          <p:nvPr/>
+        </p:nvCxnSpPr>
+        <p:spPr>
+          <a:xfrm>
+            <a:off x="6192269" y="2188259"/>
+            <a:ext cx="766676" cy="675481"/>
+          </a:xfrm>
+          <a:prstGeom prst="straightConnector1">
+            <a:avLst/>
+          </a:prstGeom>
+          <a:ln>
+            <a:headEnd type="arrow"/>
+            <a:tailEnd type="arrow"/>
+          </a:ln>
+        </p:spPr>
+        <p:style>
+          <a:lnRef idx="2">
+            <a:schemeClr val="dk1"/>
+          </a:lnRef>
+          <a:fillRef idx="0">
+            <a:schemeClr val="dk1"/>
+          </a:fillRef>
+          <a:effectRef idx="1">
+            <a:schemeClr val="dk1"/>
+          </a:effectRef>
+          <a:fontRef idx="minor">
+            <a:schemeClr val="tx1"/>
+          </a:fontRef>
+        </p:style>
+      </p:cxnSp>
+      <p:cxnSp>
+        <p:nvCxnSpPr>
+          <p:cNvPr id="54" name="Connecteur droit avec flèche 53"/>
+          <p:cNvCxnSpPr>
+            <a:stCxn id="23" idx="0"/>
+            <a:endCxn id="7" idx="5"/>
+          </p:cNvCxnSpPr>
+          <p:nvPr/>
+        </p:nvCxnSpPr>
+        <p:spPr>
+          <a:xfrm flipH="1" flipV="1">
+            <a:off x="4623746" y="896365"/>
+            <a:ext cx="1568523" cy="465704"/>
+          </a:xfrm>
+          <a:prstGeom prst="straightConnector1">
+            <a:avLst/>
+          </a:prstGeom>
+          <a:ln>
+            <a:headEnd type="arrow"/>
+            <a:tailEnd type="arrow"/>
+          </a:ln>
+        </p:spPr>
+        <p:style>
+          <a:lnRef idx="2">
+            <a:schemeClr val="dk1"/>
+          </a:lnRef>
+          <a:fillRef idx="0">
+            <a:schemeClr val="dk1"/>
+          </a:fillRef>
+          <a:effectRef idx="1">
+            <a:schemeClr val="dk1"/>
+          </a:effectRef>
+          <a:fontRef idx="minor">
+            <a:schemeClr val="tx1"/>
+          </a:fontRef>
+        </p:style>
+      </p:cxnSp>
+    </p:spTree>
+    <p:extLst>
+      <p:ext uri="{BB962C8B-B14F-4D97-AF65-F5344CB8AC3E}">
+        <p14:creationId xmlns:p14="http://schemas.microsoft.com/office/powerpoint/2010/main" val="1085324764"/>
+      </p:ext>
+    </p:extLst>
+  </p:cSld>
+  <p:clrMapOvr>
+    <a:masterClrMapping/>
+  </p:clrMapOvr>
+</p:sld>
+</file>
+
+<file path=ppt/slides/slide7.xml><?xml version="1.0" encoding="utf-8"?>
+<p:sld xmlns:a="http://schemas.openxmlformats.org/drawingml/2006/main" xmlns:r="http://schemas.openxmlformats.org/officeDocument/2006/relationships" xmlns:p="http://schemas.openxmlformats.org/presentationml/2006/main">
+  <p:cSld>
+    <p:spTree>
+      <p:nvGrpSpPr>
+        <p:cNvPr id="1" name=""/>
+        <p:cNvGrpSpPr/>
+        <p:nvPr/>
+      </p:nvGrpSpPr>
+      <p:grpSpPr>
+        <a:xfrm>
+          <a:off x="0" y="0"/>
+          <a:ext cx="0" cy="0"/>
+          <a:chOff x="0" y="0"/>
+          <a:chExt cx="0" cy="0"/>
+        </a:xfrm>
+      </p:grpSpPr>
+      <p:sp>
+        <p:nvSpPr>
+          <p:cNvPr id="2" name="Rectangle à coins arrondis 1"/>
+          <p:cNvSpPr/>
+          <p:nvPr/>
+        </p:nvSpPr>
+        <p:spPr>
+          <a:xfrm>
+            <a:off x="611560" y="764704"/>
+            <a:ext cx="4176464" cy="4824536"/>
+          </a:xfrm>
+          <a:prstGeom prst="roundRect">
+            <a:avLst/>
+          </a:prstGeom>
+        </p:spPr>
+        <p:style>
+          <a:lnRef idx="1">
+            <a:schemeClr val="dk1"/>
+          </a:lnRef>
+          <a:fillRef idx="2">
+            <a:schemeClr val="dk1"/>
+          </a:fillRef>
+          <a:effectRef idx="1">
+            <a:schemeClr val="dk1"/>
+          </a:effectRef>
+          <a:fontRef idx="minor">
+            <a:schemeClr val="dk1"/>
+          </a:fontRef>
+        </p:style>
+        <p:txBody>
+          <a:bodyPr vert="vert270" rtlCol="0" anchor="b" anchorCtr="1"/>
+          <a:lstStyle/>
+          <a:p>
+            <a:pPr algn="ctr"/>
+            <a:r>
+              <a:rPr lang="fr-FR" sz="2400" dirty="0" smtClean="0"/>
+              <a:t>Système</a:t>
+            </a:r>
+          </a:p>
+          <a:p>
+            <a:pPr algn="ctr"/>
+            <a:r>
+              <a:rPr lang="fr-FR" sz="2400" dirty="0" smtClean="0"/>
+              <a:t>d’Information</a:t>
+            </a:r>
+            <a:endParaRPr lang="fr-FR" sz="2400" dirty="0"/>
+          </a:p>
+        </p:txBody>
+      </p:sp>
+      <p:sp>
+        <p:nvSpPr>
+          <p:cNvPr id="3" name="Rectangle à coins arrondis 2"/>
+          <p:cNvSpPr/>
+          <p:nvPr/>
+        </p:nvSpPr>
+        <p:spPr>
+          <a:xfrm>
+            <a:off x="1152778" y="1143697"/>
+            <a:ext cx="1622559" cy="826190"/>
+          </a:xfrm>
+          <a:prstGeom prst="roundRect">
+            <a:avLst/>
+          </a:prstGeom>
+        </p:spPr>
+        <p:style>
+          <a:lnRef idx="2">
+            <a:schemeClr val="accent3">
+              <a:shade val="50000"/>
+            </a:schemeClr>
+          </a:lnRef>
+          <a:fillRef idx="1">
+            <a:schemeClr val="accent3"/>
+          </a:fillRef>
+          <a:effectRef idx="0">
+            <a:schemeClr val="accent3"/>
+          </a:effectRef>
+          <a:fontRef idx="minor">
+            <a:schemeClr val="lt1"/>
+          </a:fontRef>
+        </p:style>
+        <p:txBody>
+          <a:bodyPr rtlCol="0" anchor="ctr"/>
+          <a:lstStyle/>
+          <a:p>
+            <a:r>
+              <a:rPr lang="fr-FR" sz="2400" dirty="0" smtClean="0"/>
+              <a:t>Personnel</a:t>
+            </a:r>
+            <a:endParaRPr lang="fr-FR" sz="2400" dirty="0"/>
+          </a:p>
+        </p:txBody>
+      </p:sp>
+      <p:sp>
+        <p:nvSpPr>
+          <p:cNvPr id="4" name="Rectangle à coins arrondis 3"/>
+          <p:cNvSpPr/>
+          <p:nvPr/>
+        </p:nvSpPr>
+        <p:spPr>
+          <a:xfrm>
+            <a:off x="1152777" y="3176972"/>
+            <a:ext cx="1622559" cy="826190"/>
+          </a:xfrm>
+          <a:prstGeom prst="roundRect">
+            <a:avLst/>
+          </a:prstGeom>
+        </p:spPr>
+        <p:style>
+          <a:lnRef idx="2">
+            <a:schemeClr val="accent3">
+              <a:shade val="50000"/>
+            </a:schemeClr>
+          </a:lnRef>
+          <a:fillRef idx="1">
+            <a:schemeClr val="accent3"/>
+          </a:fillRef>
+          <a:effectRef idx="0">
+            <a:schemeClr val="accent3"/>
+          </a:effectRef>
+          <a:fontRef idx="minor">
+            <a:schemeClr val="lt1"/>
+          </a:fontRef>
+        </p:style>
+        <p:txBody>
+          <a:bodyPr rtlCol="0" anchor="ctr"/>
+          <a:lstStyle/>
+          <a:p>
+            <a:r>
+              <a:rPr lang="fr-FR" sz="2400" dirty="0" smtClean="0"/>
+              <a:t>Matériel</a:t>
+            </a:r>
+            <a:endParaRPr lang="fr-FR" sz="2400" dirty="0"/>
+          </a:p>
+        </p:txBody>
+      </p:sp>
+      <p:sp>
+        <p:nvSpPr>
+          <p:cNvPr id="5" name="Rectangle à coins arrondis 4"/>
+          <p:cNvSpPr/>
+          <p:nvPr/>
+        </p:nvSpPr>
+        <p:spPr>
+          <a:xfrm>
+            <a:off x="1152778" y="2153606"/>
+            <a:ext cx="1622559" cy="826190"/>
+          </a:xfrm>
+          <a:prstGeom prst="roundRect">
+            <a:avLst/>
+          </a:prstGeom>
+        </p:spPr>
+        <p:style>
+          <a:lnRef idx="2">
+            <a:schemeClr val="accent3">
+              <a:shade val="50000"/>
+            </a:schemeClr>
+          </a:lnRef>
+          <a:fillRef idx="1">
+            <a:schemeClr val="accent3"/>
+          </a:fillRef>
+          <a:effectRef idx="0">
+            <a:schemeClr val="accent3"/>
+          </a:effectRef>
+          <a:fontRef idx="minor">
+            <a:schemeClr val="lt1"/>
+          </a:fontRef>
+        </p:style>
+        <p:txBody>
+          <a:bodyPr rtlCol="0" anchor="ctr"/>
+          <a:lstStyle/>
+          <a:p>
+            <a:r>
+              <a:rPr lang="fr-FR" sz="2400" dirty="0" smtClean="0"/>
+              <a:t>Logiciel</a:t>
+            </a:r>
+            <a:endParaRPr lang="fr-FR" sz="2400" dirty="0"/>
+          </a:p>
+        </p:txBody>
+      </p:sp>
+      <p:sp>
+        <p:nvSpPr>
+          <p:cNvPr id="6" name="Rectangle à coins arrondis 5"/>
+          <p:cNvSpPr/>
+          <p:nvPr/>
+        </p:nvSpPr>
+        <p:spPr>
+          <a:xfrm>
+            <a:off x="1152778" y="4229981"/>
+            <a:ext cx="1622559" cy="826190"/>
+          </a:xfrm>
+          <a:prstGeom prst="roundRect">
+            <a:avLst/>
+          </a:prstGeom>
+        </p:spPr>
+        <p:style>
+          <a:lnRef idx="2">
+            <a:schemeClr val="accent3">
+              <a:shade val="50000"/>
+            </a:schemeClr>
+          </a:lnRef>
+          <a:fillRef idx="1">
+            <a:schemeClr val="accent3"/>
+          </a:fillRef>
+          <a:effectRef idx="0">
+            <a:schemeClr val="accent3"/>
+          </a:effectRef>
+          <a:fontRef idx="minor">
+            <a:schemeClr val="lt1"/>
+          </a:fontRef>
+        </p:style>
+        <p:txBody>
+          <a:bodyPr rtlCol="0" anchor="ctr"/>
+          <a:lstStyle/>
+          <a:p>
+            <a:r>
+              <a:rPr lang="fr-FR" sz="2400" dirty="0" smtClean="0"/>
+              <a:t>Données</a:t>
+            </a:r>
+            <a:endParaRPr lang="fr-FR" sz="2400" dirty="0"/>
+          </a:p>
+        </p:txBody>
+      </p:sp>
+      <p:cxnSp>
+        <p:nvCxnSpPr>
+          <p:cNvPr id="10" name="Connecteur droit avec flèche 9"/>
+          <p:cNvCxnSpPr/>
+          <p:nvPr/>
+        </p:nvCxnSpPr>
+        <p:spPr>
+          <a:xfrm>
+            <a:off x="4788024" y="1588150"/>
+            <a:ext cx="1008112" cy="0"/>
+          </a:xfrm>
+          <a:prstGeom prst="straightConnector1">
+            <a:avLst/>
+          </a:prstGeom>
+          <a:ln>
+            <a:tailEnd type="arrow"/>
+          </a:ln>
+        </p:spPr>
+        <p:style>
+          <a:lnRef idx="2">
+            <a:schemeClr val="dk1"/>
+          </a:lnRef>
+          <a:fillRef idx="0">
+            <a:schemeClr val="dk1"/>
+          </a:fillRef>
+          <a:effectRef idx="1">
+            <a:schemeClr val="dk1"/>
+          </a:effectRef>
+          <a:fontRef idx="minor">
+            <a:schemeClr val="tx1"/>
+          </a:fontRef>
+        </p:style>
+      </p:cxnSp>
+      <p:cxnSp>
+        <p:nvCxnSpPr>
+          <p:cNvPr id="13" name="Connecteur droit avec flèche 12"/>
+          <p:cNvCxnSpPr/>
+          <p:nvPr/>
+        </p:nvCxnSpPr>
+        <p:spPr>
+          <a:xfrm>
+            <a:off x="4788024" y="2492896"/>
+            <a:ext cx="1008112" cy="0"/>
+          </a:xfrm>
+          <a:prstGeom prst="straightConnector1">
+            <a:avLst/>
+          </a:prstGeom>
+          <a:ln>
+            <a:tailEnd type="arrow"/>
+          </a:ln>
+        </p:spPr>
+        <p:style>
+          <a:lnRef idx="2">
+            <a:schemeClr val="dk1"/>
+          </a:lnRef>
+          <a:fillRef idx="0">
+            <a:schemeClr val="dk1"/>
+          </a:fillRef>
+          <a:effectRef idx="1">
+            <a:schemeClr val="dk1"/>
+          </a:effectRef>
+          <a:fontRef idx="minor">
+            <a:schemeClr val="tx1"/>
+          </a:fontRef>
+        </p:style>
+      </p:cxnSp>
+      <p:cxnSp>
+        <p:nvCxnSpPr>
+          <p:cNvPr id="14" name="Connecteur droit avec flèche 13"/>
+          <p:cNvCxnSpPr/>
+          <p:nvPr/>
+        </p:nvCxnSpPr>
+        <p:spPr>
+          <a:xfrm>
+            <a:off x="4788024" y="3573016"/>
+            <a:ext cx="1008112" cy="0"/>
+          </a:xfrm>
+          <a:prstGeom prst="straightConnector1">
+            <a:avLst/>
+          </a:prstGeom>
+          <a:ln>
+            <a:tailEnd type="arrow"/>
+          </a:ln>
+        </p:spPr>
+        <p:style>
+          <a:lnRef idx="2">
+            <a:schemeClr val="dk1"/>
+          </a:lnRef>
+          <a:fillRef idx="0">
+            <a:schemeClr val="dk1"/>
+          </a:fillRef>
+          <a:effectRef idx="1">
+            <a:schemeClr val="dk1"/>
+          </a:effectRef>
+          <a:fontRef idx="minor">
+            <a:schemeClr val="tx1"/>
+          </a:fontRef>
+        </p:style>
+      </p:cxnSp>
+      <p:cxnSp>
+        <p:nvCxnSpPr>
+          <p:cNvPr id="15" name="Connecteur droit avec flèche 14"/>
+          <p:cNvCxnSpPr/>
+          <p:nvPr/>
+        </p:nvCxnSpPr>
+        <p:spPr>
+          <a:xfrm>
+            <a:off x="4788024" y="4581128"/>
+            <a:ext cx="1008112" cy="0"/>
+          </a:xfrm>
+          <a:prstGeom prst="straightConnector1">
+            <a:avLst/>
+          </a:prstGeom>
+          <a:ln>
+            <a:tailEnd type="arrow"/>
+          </a:ln>
+        </p:spPr>
+        <p:style>
+          <a:lnRef idx="2">
+            <a:schemeClr val="dk1"/>
+          </a:lnRef>
+          <a:fillRef idx="0">
+            <a:schemeClr val="dk1"/>
+          </a:fillRef>
+          <a:effectRef idx="1">
+            <a:schemeClr val="dk1"/>
+          </a:effectRef>
+          <a:fontRef idx="minor">
+            <a:schemeClr val="tx1"/>
+          </a:fontRef>
+        </p:style>
+      </p:cxnSp>
+      <p:sp>
+        <p:nvSpPr>
+          <p:cNvPr id="16" name="ZoneTexte 15"/>
+          <p:cNvSpPr txBox="1"/>
+          <p:nvPr/>
+        </p:nvSpPr>
+        <p:spPr>
+          <a:xfrm>
+            <a:off x="6084168" y="1403484"/>
+            <a:ext cx="1656184" cy="369332"/>
+          </a:xfrm>
+          <a:prstGeom prst="rect">
+            <a:avLst/>
+          </a:prstGeom>
+          <a:noFill/>
+        </p:spPr>
+        <p:txBody>
+          <a:bodyPr wrap="square" rtlCol="0">
+            <a:spAutoFit/>
+          </a:bodyPr>
+          <a:lstStyle/>
+          <a:p>
+            <a:r>
+              <a:rPr lang="fr-FR" dirty="0" smtClean="0"/>
+              <a:t>Collecter</a:t>
+            </a:r>
+            <a:endParaRPr lang="fr-FR" dirty="0"/>
+          </a:p>
+        </p:txBody>
+      </p:sp>
+      <p:sp>
+        <p:nvSpPr>
+          <p:cNvPr id="17" name="ZoneTexte 16"/>
+          <p:cNvSpPr txBox="1"/>
+          <p:nvPr/>
+        </p:nvSpPr>
+        <p:spPr>
+          <a:xfrm>
+            <a:off x="6084168" y="2308230"/>
+            <a:ext cx="1656184" cy="369332"/>
+          </a:xfrm>
+          <a:prstGeom prst="rect">
+            <a:avLst/>
+          </a:prstGeom>
+          <a:noFill/>
+        </p:spPr>
+        <p:txBody>
+          <a:bodyPr wrap="square" rtlCol="0">
+            <a:spAutoFit/>
+          </a:bodyPr>
+          <a:lstStyle/>
+          <a:p>
+            <a:r>
+              <a:rPr lang="fr-FR" dirty="0" smtClean="0"/>
+              <a:t>Transformer</a:t>
+            </a:r>
+            <a:endParaRPr lang="fr-FR" dirty="0"/>
+          </a:p>
+        </p:txBody>
+      </p:sp>
+      <p:sp>
+        <p:nvSpPr>
+          <p:cNvPr id="18" name="ZoneTexte 17"/>
+          <p:cNvSpPr txBox="1"/>
+          <p:nvPr/>
+        </p:nvSpPr>
+        <p:spPr>
+          <a:xfrm>
+            <a:off x="6084168" y="3347329"/>
+            <a:ext cx="1656184" cy="369332"/>
+          </a:xfrm>
+          <a:prstGeom prst="rect">
+            <a:avLst/>
+          </a:prstGeom>
+          <a:noFill/>
+        </p:spPr>
+        <p:txBody>
+          <a:bodyPr wrap="square" rtlCol="0">
+            <a:spAutoFit/>
+          </a:bodyPr>
+          <a:lstStyle/>
+          <a:p>
+            <a:r>
+              <a:rPr lang="fr-FR" dirty="0" smtClean="0"/>
+              <a:t>Conserver</a:t>
+            </a:r>
+            <a:endParaRPr lang="fr-FR" dirty="0"/>
+          </a:p>
+        </p:txBody>
+      </p:sp>
+      <p:sp>
+        <p:nvSpPr>
+          <p:cNvPr id="19" name="ZoneTexte 18"/>
+          <p:cNvSpPr txBox="1"/>
+          <p:nvPr/>
+        </p:nvSpPr>
+        <p:spPr>
+          <a:xfrm>
+            <a:off x="6084168" y="4396462"/>
+            <a:ext cx="1656184" cy="369332"/>
+          </a:xfrm>
+          <a:prstGeom prst="rect">
+            <a:avLst/>
+          </a:prstGeom>
+          <a:noFill/>
+        </p:spPr>
+        <p:txBody>
+          <a:bodyPr wrap="square" rtlCol="0">
+            <a:spAutoFit/>
+          </a:bodyPr>
+          <a:lstStyle/>
+          <a:p>
+            <a:r>
+              <a:rPr lang="fr-FR" dirty="0" smtClean="0"/>
+              <a:t>Diffuser</a:t>
+            </a:r>
+            <a:endParaRPr lang="fr-FR" dirty="0"/>
+          </a:p>
+        </p:txBody>
+      </p:sp>
+    </p:spTree>
+    <p:extLst>
+      <p:ext uri="{BB962C8B-B14F-4D97-AF65-F5344CB8AC3E}">
+        <p14:creationId xmlns:p14="http://schemas.microsoft.com/office/powerpoint/2010/main" val="643032167"/>
+      </p:ext>
+    </p:extLst>
+  </p:cSld>
+  <p:clrMapOvr>
+    <a:masterClrMapping/>
+  </p:clrMapOvr>
+</p:sld>
+</file>
+
+<file path=ppt/slides/slide8.xml><?xml version="1.0" encoding="utf-8"?>
+<p:sld xmlns:a="http://schemas.openxmlformats.org/drawingml/2006/main" xmlns:r="http://schemas.openxmlformats.org/officeDocument/2006/relationships" xmlns:p="http://schemas.openxmlformats.org/presentationml/2006/main">
+  <p:cSld>
+    <p:spTree>
+      <p:nvGrpSpPr>
+        <p:cNvPr id="1" name=""/>
+        <p:cNvGrpSpPr/>
+        <p:nvPr/>
+      </p:nvGrpSpPr>
+      <p:grpSpPr>
+        <a:xfrm>
+          <a:off x="0" y="0"/>
+          <a:ext cx="0" cy="0"/>
+          <a:chOff x="0" y="0"/>
+          <a:chExt cx="0" cy="0"/>
+        </a:xfrm>
+      </p:grpSpPr>
+      <p:sp>
+        <p:nvSpPr>
+          <p:cNvPr id="2" name="Ellipse 1"/>
+          <p:cNvSpPr/>
+          <p:nvPr/>
+        </p:nvSpPr>
+        <p:spPr>
+          <a:xfrm>
+            <a:off x="2195736" y="1412776"/>
+            <a:ext cx="4896544" cy="3816424"/>
+          </a:xfrm>
+          <a:prstGeom prst="ellipse">
+            <a:avLst/>
+          </a:prstGeom>
+        </p:spPr>
+        <p:style>
+          <a:lnRef idx="2">
+            <a:schemeClr val="accent1">
+              <a:shade val="50000"/>
+            </a:schemeClr>
+          </a:lnRef>
+          <a:fillRef idx="1">
+            <a:schemeClr val="accent1"/>
+          </a:fillRef>
+          <a:effectRef idx="0">
+            <a:schemeClr val="accent1"/>
+          </a:effectRef>
+          <a:fontRef idx="minor">
+            <a:schemeClr val="lt1"/>
+          </a:fontRef>
+        </p:style>
+        <p:txBody>
+          <a:bodyPr rtlCol="0" anchor="ctr"/>
+          <a:lstStyle/>
+          <a:p>
+            <a:pPr algn="ctr"/>
+            <a:r>
+              <a:rPr lang="fr-FR" sz="2400" dirty="0" smtClean="0"/>
+              <a:t>Use cases</a:t>
+            </a:r>
+            <a:endParaRPr lang="fr-FR" sz="2400" dirty="0"/>
+          </a:p>
+        </p:txBody>
+      </p:sp>
+      <p:sp>
+        <p:nvSpPr>
+          <p:cNvPr id="3" name="Rectangle à coins arrondis 2"/>
+          <p:cNvSpPr/>
+          <p:nvPr/>
+        </p:nvSpPr>
+        <p:spPr>
+          <a:xfrm>
+            <a:off x="1475656" y="1124744"/>
+            <a:ext cx="2304256" cy="1656184"/>
+          </a:xfrm>
+          <a:prstGeom prst="roundRect">
+            <a:avLst/>
+          </a:prstGeom>
+        </p:spPr>
+        <p:style>
+          <a:lnRef idx="2">
+            <a:schemeClr val="accent2"/>
+          </a:lnRef>
+          <a:fillRef idx="1">
+            <a:schemeClr val="lt1"/>
+          </a:fillRef>
+          <a:effectRef idx="0">
+            <a:schemeClr val="accent2"/>
+          </a:effectRef>
+          <a:fontRef idx="minor">
+            <a:schemeClr val="dk1"/>
+          </a:fontRef>
+        </p:style>
+        <p:txBody>
+          <a:bodyPr rtlCol="0" anchor="ctr"/>
+          <a:lstStyle/>
+          <a:p>
+            <a:pPr algn="ctr"/>
+            <a:r>
+              <a:rPr lang="fr-FR" dirty="0" smtClean="0"/>
+              <a:t>Vue logique</a:t>
+            </a:r>
+            <a:endParaRPr lang="fr-FR" dirty="0"/>
+          </a:p>
+        </p:txBody>
+      </p:sp>
+      <p:sp>
+        <p:nvSpPr>
+          <p:cNvPr id="4" name="Rectangle à coins arrondis 3"/>
+          <p:cNvSpPr/>
+          <p:nvPr/>
+        </p:nvSpPr>
+        <p:spPr>
+          <a:xfrm>
+            <a:off x="1475656" y="3789040"/>
+            <a:ext cx="2304256" cy="1656184"/>
+          </a:xfrm>
+          <a:prstGeom prst="roundRect">
+            <a:avLst/>
+          </a:prstGeom>
+        </p:spPr>
+        <p:style>
+          <a:lnRef idx="2">
+            <a:schemeClr val="accent3"/>
+          </a:lnRef>
+          <a:fillRef idx="1">
+            <a:schemeClr val="lt1"/>
+          </a:fillRef>
+          <a:effectRef idx="0">
+            <a:schemeClr val="accent3"/>
+          </a:effectRef>
+          <a:fontRef idx="minor">
+            <a:schemeClr val="dk1"/>
+          </a:fontRef>
+        </p:style>
+        <p:txBody>
+          <a:bodyPr rtlCol="0" anchor="ctr"/>
+          <a:lstStyle/>
+          <a:p>
+            <a:pPr algn="ctr"/>
+            <a:r>
+              <a:rPr lang="fr-FR" dirty="0" smtClean="0"/>
+              <a:t>Vue processus</a:t>
+            </a:r>
+            <a:endParaRPr lang="fr-FR" dirty="0"/>
+          </a:p>
+        </p:txBody>
+      </p:sp>
+      <p:sp>
+        <p:nvSpPr>
+          <p:cNvPr id="5" name="Rectangle à coins arrondis 4"/>
+          <p:cNvSpPr/>
+          <p:nvPr/>
+        </p:nvSpPr>
+        <p:spPr>
+          <a:xfrm>
+            <a:off x="5652120" y="3789040"/>
+            <a:ext cx="2304256" cy="1656184"/>
+          </a:xfrm>
+          <a:prstGeom prst="roundRect">
+            <a:avLst/>
+          </a:prstGeom>
+        </p:spPr>
+        <p:style>
+          <a:lnRef idx="2">
+            <a:schemeClr val="accent6"/>
+          </a:lnRef>
+          <a:fillRef idx="1">
+            <a:schemeClr val="lt1"/>
+          </a:fillRef>
+          <a:effectRef idx="0">
+            <a:schemeClr val="accent6"/>
+          </a:effectRef>
+          <a:fontRef idx="minor">
+            <a:schemeClr val="dk1"/>
+          </a:fontRef>
+        </p:style>
+        <p:txBody>
+          <a:bodyPr rtlCol="0" anchor="ctr"/>
+          <a:lstStyle/>
+          <a:p>
+            <a:pPr algn="ctr"/>
+            <a:r>
+              <a:rPr lang="fr-FR" dirty="0" smtClean="0"/>
+              <a:t>Vue déploiement</a:t>
+            </a:r>
+            <a:endParaRPr lang="fr-FR" dirty="0"/>
+          </a:p>
+        </p:txBody>
+      </p:sp>
+      <p:sp>
+        <p:nvSpPr>
+          <p:cNvPr id="6" name="Rectangle à coins arrondis 5"/>
+          <p:cNvSpPr/>
+          <p:nvPr/>
+        </p:nvSpPr>
+        <p:spPr>
+          <a:xfrm>
+            <a:off x="5652120" y="1124744"/>
+            <a:ext cx="2304256" cy="1656184"/>
+          </a:xfrm>
+          <a:prstGeom prst="roundRect">
+            <a:avLst/>
+          </a:prstGeom>
+        </p:spPr>
+        <p:style>
+          <a:lnRef idx="2">
+            <a:schemeClr val="dk1"/>
+          </a:lnRef>
+          <a:fillRef idx="1">
+            <a:schemeClr val="lt1"/>
+          </a:fillRef>
+          <a:effectRef idx="0">
+            <a:schemeClr val="dk1"/>
+          </a:effectRef>
+          <a:fontRef idx="minor">
+            <a:schemeClr val="dk1"/>
+          </a:fontRef>
+        </p:style>
+        <p:txBody>
+          <a:bodyPr rtlCol="0" anchor="ctr"/>
+          <a:lstStyle/>
+          <a:p>
+            <a:pPr algn="ctr"/>
+            <a:r>
+              <a:rPr lang="fr-FR" dirty="0" smtClean="0"/>
+              <a:t>Vue composants</a:t>
+            </a:r>
+            <a:endParaRPr lang="fr-FR" dirty="0"/>
+          </a:p>
+        </p:txBody>
+      </p:sp>
+    </p:spTree>
+    <p:extLst>
+      <p:ext uri="{BB962C8B-B14F-4D97-AF65-F5344CB8AC3E}">
+        <p14:creationId xmlns:p14="http://schemas.microsoft.com/office/powerpoint/2010/main" val="972004577"/>
       </p:ext>
     </p:extLst>
   </p:cSld>

</xml_diff>

<commit_message>
ENSG ASI 2014 : wip on HA
</commit_message>
<xml_diff>
--- a/cours/ensg-asi-2014/src/raws/img_gen.pptx
+++ b/cours/ensg-asi-2014/src/raws/img_gen.pptx
@@ -13,6 +13,7 @@
     <p:sldId id="263" r:id="rId7"/>
     <p:sldId id="261" r:id="rId8"/>
     <p:sldId id="262" r:id="rId9"/>
+    <p:sldId id="264" r:id="rId10"/>
   </p:sldIdLst>
   <p:sldSz cx="9144000" cy="6858000" type="screen4x3"/>
   <p:notesSz cx="6858000" cy="9144000"/>
@@ -295,7 +296,7 @@
           <a:p>
             <a:fld id="{B511EEBD-DB93-4DB6-9ADA-68547254FD74}" type="datetimeFigureOut">
               <a:rPr lang="fr-FR" smtClean="0"/>
-              <a:t>20/10/2014</a:t>
+              <a:t>14/11/2014</a:t>
             </a:fld>
             <a:endParaRPr lang="fr-FR"/>
           </a:p>
@@ -465,7 +466,7 @@
           <a:p>
             <a:fld id="{B511EEBD-DB93-4DB6-9ADA-68547254FD74}" type="datetimeFigureOut">
               <a:rPr lang="fr-FR" smtClean="0"/>
-              <a:t>20/10/2014</a:t>
+              <a:t>14/11/2014</a:t>
             </a:fld>
             <a:endParaRPr lang="fr-FR"/>
           </a:p>
@@ -645,7 +646,7 @@
           <a:p>
             <a:fld id="{B511EEBD-DB93-4DB6-9ADA-68547254FD74}" type="datetimeFigureOut">
               <a:rPr lang="fr-FR" smtClean="0"/>
-              <a:t>20/10/2014</a:t>
+              <a:t>14/11/2014</a:t>
             </a:fld>
             <a:endParaRPr lang="fr-FR"/>
           </a:p>
@@ -815,7 +816,7 @@
           <a:p>
             <a:fld id="{B511EEBD-DB93-4DB6-9ADA-68547254FD74}" type="datetimeFigureOut">
               <a:rPr lang="fr-FR" smtClean="0"/>
-              <a:t>20/10/2014</a:t>
+              <a:t>14/11/2014</a:t>
             </a:fld>
             <a:endParaRPr lang="fr-FR"/>
           </a:p>
@@ -1061,7 +1062,7 @@
           <a:p>
             <a:fld id="{B511EEBD-DB93-4DB6-9ADA-68547254FD74}" type="datetimeFigureOut">
               <a:rPr lang="fr-FR" smtClean="0"/>
-              <a:t>20/10/2014</a:t>
+              <a:t>14/11/2014</a:t>
             </a:fld>
             <a:endParaRPr lang="fr-FR"/>
           </a:p>
@@ -1349,7 +1350,7 @@
           <a:p>
             <a:fld id="{B511EEBD-DB93-4DB6-9ADA-68547254FD74}" type="datetimeFigureOut">
               <a:rPr lang="fr-FR" smtClean="0"/>
-              <a:t>20/10/2014</a:t>
+              <a:t>14/11/2014</a:t>
             </a:fld>
             <a:endParaRPr lang="fr-FR"/>
           </a:p>
@@ -1771,7 +1772,7 @@
           <a:p>
             <a:fld id="{B511EEBD-DB93-4DB6-9ADA-68547254FD74}" type="datetimeFigureOut">
               <a:rPr lang="fr-FR" smtClean="0"/>
-              <a:t>20/10/2014</a:t>
+              <a:t>14/11/2014</a:t>
             </a:fld>
             <a:endParaRPr lang="fr-FR"/>
           </a:p>
@@ -1889,7 +1890,7 @@
           <a:p>
             <a:fld id="{B511EEBD-DB93-4DB6-9ADA-68547254FD74}" type="datetimeFigureOut">
               <a:rPr lang="fr-FR" smtClean="0"/>
-              <a:t>20/10/2014</a:t>
+              <a:t>14/11/2014</a:t>
             </a:fld>
             <a:endParaRPr lang="fr-FR"/>
           </a:p>
@@ -1984,7 +1985,7 @@
           <a:p>
             <a:fld id="{B511EEBD-DB93-4DB6-9ADA-68547254FD74}" type="datetimeFigureOut">
               <a:rPr lang="fr-FR" smtClean="0"/>
-              <a:t>20/10/2014</a:t>
+              <a:t>14/11/2014</a:t>
             </a:fld>
             <a:endParaRPr lang="fr-FR"/>
           </a:p>
@@ -2261,7 +2262,7 @@
           <a:p>
             <a:fld id="{B511EEBD-DB93-4DB6-9ADA-68547254FD74}" type="datetimeFigureOut">
               <a:rPr lang="fr-FR" smtClean="0"/>
-              <a:t>20/10/2014</a:t>
+              <a:t>14/11/2014</a:t>
             </a:fld>
             <a:endParaRPr lang="fr-FR"/>
           </a:p>
@@ -2514,7 +2515,7 @@
           <a:p>
             <a:fld id="{B511EEBD-DB93-4DB6-9ADA-68547254FD74}" type="datetimeFigureOut">
               <a:rPr lang="fr-FR" smtClean="0"/>
-              <a:t>20/10/2014</a:t>
+              <a:t>14/11/2014</a:t>
             </a:fld>
             <a:endParaRPr lang="fr-FR"/>
           </a:p>
@@ -2727,7 +2728,7 @@
           <a:p>
             <a:fld id="{B511EEBD-DB93-4DB6-9ADA-68547254FD74}" type="datetimeFigureOut">
               <a:rPr lang="fr-FR" smtClean="0"/>
-              <a:t>20/10/2014</a:t>
+              <a:t>14/11/2014</a:t>
             </a:fld>
             <a:endParaRPr lang="fr-FR"/>
           </a:p>
@@ -7086,6 +7087,733 @@
     <p:extLst>
       <p:ext uri="{BB962C8B-B14F-4D97-AF65-F5344CB8AC3E}">
         <p14:creationId xmlns:p14="http://schemas.microsoft.com/office/powerpoint/2010/main" val="972004577"/>
+      </p:ext>
+    </p:extLst>
+  </p:cSld>
+  <p:clrMapOvr>
+    <a:masterClrMapping/>
+  </p:clrMapOvr>
+</p:sld>
+</file>
+
+<file path=ppt/slides/slide9.xml><?xml version="1.0" encoding="utf-8"?>
+<p:sld xmlns:a="http://schemas.openxmlformats.org/drawingml/2006/main" xmlns:r="http://schemas.openxmlformats.org/officeDocument/2006/relationships" xmlns:p="http://schemas.openxmlformats.org/presentationml/2006/main">
+  <p:cSld>
+    <p:spTree>
+      <p:nvGrpSpPr>
+        <p:cNvPr id="1" name=""/>
+        <p:cNvGrpSpPr/>
+        <p:nvPr/>
+      </p:nvGrpSpPr>
+      <p:grpSpPr>
+        <a:xfrm>
+          <a:off x="0" y="0"/>
+          <a:ext cx="0" cy="0"/>
+          <a:chOff x="0" y="0"/>
+          <a:chExt cx="0" cy="0"/>
+        </a:xfrm>
+      </p:grpSpPr>
+      <p:sp>
+        <p:nvSpPr>
+          <p:cNvPr id="2" name="Rectangle à coins arrondis 1"/>
+          <p:cNvSpPr/>
+          <p:nvPr/>
+        </p:nvSpPr>
+        <p:spPr>
+          <a:xfrm>
+            <a:off x="169640" y="2705797"/>
+            <a:ext cx="2304256" cy="1152128"/>
+          </a:xfrm>
+          <a:prstGeom prst="roundRect">
+            <a:avLst/>
+          </a:prstGeom>
+        </p:spPr>
+        <p:style>
+          <a:lnRef idx="2">
+            <a:schemeClr val="accent3">
+              <a:shade val="50000"/>
+            </a:schemeClr>
+          </a:lnRef>
+          <a:fillRef idx="1">
+            <a:schemeClr val="accent3"/>
+          </a:fillRef>
+          <a:effectRef idx="0">
+            <a:schemeClr val="accent3"/>
+          </a:effectRef>
+          <a:fontRef idx="minor">
+            <a:schemeClr val="lt1"/>
+          </a:fontRef>
+        </p:style>
+        <p:txBody>
+          <a:bodyPr rtlCol="0" anchor="ctr"/>
+          <a:lstStyle/>
+          <a:p>
+            <a:pPr algn="ctr"/>
+            <a:r>
+              <a:rPr lang="fr-FR" dirty="0" smtClean="0"/>
+              <a:t>Etat nominal</a:t>
+            </a:r>
+          </a:p>
+          <a:p>
+            <a:pPr algn="ctr"/>
+            <a:r>
+              <a:rPr lang="fr-FR" dirty="0" smtClean="0"/>
+              <a:t>(service rendu)</a:t>
+            </a:r>
+            <a:endParaRPr lang="fr-FR" dirty="0"/>
+          </a:p>
+        </p:txBody>
+      </p:sp>
+      <p:sp>
+        <p:nvSpPr>
+          <p:cNvPr id="3" name="Rectangle à coins arrondis 2"/>
+          <p:cNvSpPr/>
+          <p:nvPr/>
+        </p:nvSpPr>
+        <p:spPr>
+          <a:xfrm>
+            <a:off x="3347864" y="2705797"/>
+            <a:ext cx="2304256" cy="1152128"/>
+          </a:xfrm>
+          <a:prstGeom prst="roundRect">
+            <a:avLst/>
+          </a:prstGeom>
+        </p:spPr>
+        <p:style>
+          <a:lnRef idx="2">
+            <a:schemeClr val="accent6">
+              <a:shade val="50000"/>
+            </a:schemeClr>
+          </a:lnRef>
+          <a:fillRef idx="1">
+            <a:schemeClr val="accent6"/>
+          </a:fillRef>
+          <a:effectRef idx="0">
+            <a:schemeClr val="accent6"/>
+          </a:effectRef>
+          <a:fontRef idx="minor">
+            <a:schemeClr val="lt1"/>
+          </a:fontRef>
+        </p:style>
+        <p:txBody>
+          <a:bodyPr rtlCol="0" anchor="ctr"/>
+          <a:lstStyle/>
+          <a:p>
+            <a:pPr algn="ctr"/>
+            <a:r>
+              <a:rPr lang="fr-FR" dirty="0" smtClean="0"/>
+              <a:t>Etat dégradé</a:t>
+            </a:r>
+          </a:p>
+          <a:p>
+            <a:pPr algn="ctr"/>
+            <a:r>
+              <a:rPr lang="fr-FR" dirty="0" smtClean="0"/>
+              <a:t>(service partiel)</a:t>
+            </a:r>
+            <a:endParaRPr lang="fr-FR" dirty="0"/>
+          </a:p>
+        </p:txBody>
+      </p:sp>
+      <p:sp>
+        <p:nvSpPr>
+          <p:cNvPr id="4" name="Rectangle à coins arrondis 3"/>
+          <p:cNvSpPr/>
+          <p:nvPr/>
+        </p:nvSpPr>
+        <p:spPr>
+          <a:xfrm>
+            <a:off x="6588224" y="2705797"/>
+            <a:ext cx="2304256" cy="1152128"/>
+          </a:xfrm>
+          <a:prstGeom prst="roundRect">
+            <a:avLst/>
+          </a:prstGeom>
+        </p:spPr>
+        <p:style>
+          <a:lnRef idx="2">
+            <a:schemeClr val="accent2">
+              <a:shade val="50000"/>
+            </a:schemeClr>
+          </a:lnRef>
+          <a:fillRef idx="1">
+            <a:schemeClr val="accent2"/>
+          </a:fillRef>
+          <a:effectRef idx="0">
+            <a:schemeClr val="accent2"/>
+          </a:effectRef>
+          <a:fontRef idx="minor">
+            <a:schemeClr val="lt1"/>
+          </a:fontRef>
+        </p:style>
+        <p:txBody>
+          <a:bodyPr rtlCol="0" anchor="ctr"/>
+          <a:lstStyle/>
+          <a:p>
+            <a:pPr algn="ctr"/>
+            <a:r>
+              <a:rPr lang="fr-FR" dirty="0" smtClean="0"/>
+              <a:t>Etat défaillant</a:t>
+            </a:r>
+          </a:p>
+          <a:p>
+            <a:pPr algn="ctr"/>
+            <a:r>
+              <a:rPr lang="fr-FR" dirty="0" smtClean="0"/>
+              <a:t>(service non rendu)</a:t>
+            </a:r>
+            <a:endParaRPr lang="fr-FR" dirty="0"/>
+          </a:p>
+        </p:txBody>
+      </p:sp>
+      <p:cxnSp>
+        <p:nvCxnSpPr>
+          <p:cNvPr id="6" name="Connecteur en angle 5"/>
+          <p:cNvCxnSpPr>
+            <a:stCxn id="2" idx="0"/>
+          </p:cNvCxnSpPr>
+          <p:nvPr/>
+        </p:nvCxnSpPr>
+        <p:spPr>
+          <a:xfrm rot="16200000" flipH="1">
+            <a:off x="2190800" y="1836764"/>
+            <a:ext cx="288031" cy="2026096"/>
+          </a:xfrm>
+          <a:prstGeom prst="bentConnector4">
+            <a:avLst>
+              <a:gd name="adj1" fmla="val -79366"/>
+              <a:gd name="adj2" fmla="val 78432"/>
+            </a:avLst>
+          </a:prstGeom>
+          <a:ln>
+            <a:tailEnd type="arrow"/>
+          </a:ln>
+        </p:spPr>
+        <p:style>
+          <a:lnRef idx="2">
+            <a:schemeClr val="dk1"/>
+          </a:lnRef>
+          <a:fillRef idx="0">
+            <a:schemeClr val="dk1"/>
+          </a:fillRef>
+          <a:effectRef idx="1">
+            <a:schemeClr val="dk1"/>
+          </a:effectRef>
+          <a:fontRef idx="minor">
+            <a:schemeClr val="tx1"/>
+          </a:fontRef>
+        </p:style>
+      </p:cxnSp>
+      <p:cxnSp>
+        <p:nvCxnSpPr>
+          <p:cNvPr id="12" name="Connecteur en angle 11"/>
+          <p:cNvCxnSpPr>
+            <a:endCxn id="2" idx="2"/>
+          </p:cNvCxnSpPr>
+          <p:nvPr/>
+        </p:nvCxnSpPr>
+        <p:spPr>
+          <a:xfrm rot="10800000" flipV="1">
+            <a:off x="1321768" y="3569893"/>
+            <a:ext cx="2026096" cy="288032"/>
+          </a:xfrm>
+          <a:prstGeom prst="bentConnector4">
+            <a:avLst>
+              <a:gd name="adj1" fmla="val 21568"/>
+              <a:gd name="adj2" fmla="val 179366"/>
+            </a:avLst>
+          </a:prstGeom>
+          <a:ln>
+            <a:tailEnd type="arrow"/>
+          </a:ln>
+        </p:spPr>
+        <p:style>
+          <a:lnRef idx="2">
+            <a:schemeClr val="dk1"/>
+          </a:lnRef>
+          <a:fillRef idx="0">
+            <a:schemeClr val="dk1"/>
+          </a:fillRef>
+          <a:effectRef idx="1">
+            <a:schemeClr val="dk1"/>
+          </a:effectRef>
+          <a:fontRef idx="minor">
+            <a:schemeClr val="tx1"/>
+          </a:fontRef>
+        </p:style>
+      </p:cxnSp>
+      <p:cxnSp>
+        <p:nvCxnSpPr>
+          <p:cNvPr id="17" name="Connecteur en angle 16"/>
+          <p:cNvCxnSpPr>
+            <a:endCxn id="4" idx="0"/>
+          </p:cNvCxnSpPr>
+          <p:nvPr/>
+        </p:nvCxnSpPr>
+        <p:spPr>
+          <a:xfrm flipV="1">
+            <a:off x="5645770" y="2705797"/>
+            <a:ext cx="2094582" cy="294381"/>
+          </a:xfrm>
+          <a:prstGeom prst="bentConnector4">
+            <a:avLst>
+              <a:gd name="adj1" fmla="val 22497"/>
+              <a:gd name="adj2" fmla="val 177654"/>
+            </a:avLst>
+          </a:prstGeom>
+          <a:ln>
+            <a:tailEnd type="arrow"/>
+          </a:ln>
+        </p:spPr>
+        <p:style>
+          <a:lnRef idx="2">
+            <a:schemeClr val="dk1"/>
+          </a:lnRef>
+          <a:fillRef idx="0">
+            <a:schemeClr val="dk1"/>
+          </a:fillRef>
+          <a:effectRef idx="1">
+            <a:schemeClr val="dk1"/>
+          </a:effectRef>
+          <a:fontRef idx="minor">
+            <a:schemeClr val="tx1"/>
+          </a:fontRef>
+        </p:style>
+      </p:cxnSp>
+      <p:cxnSp>
+        <p:nvCxnSpPr>
+          <p:cNvPr id="20" name="Connecteur en angle 19"/>
+          <p:cNvCxnSpPr>
+            <a:stCxn id="4" idx="2"/>
+          </p:cNvCxnSpPr>
+          <p:nvPr/>
+        </p:nvCxnSpPr>
+        <p:spPr>
+          <a:xfrm rot="5400000" flipH="1">
+            <a:off x="6552222" y="2669795"/>
+            <a:ext cx="288032" cy="2088228"/>
+          </a:xfrm>
+          <a:prstGeom prst="bentConnector4">
+            <a:avLst>
+              <a:gd name="adj1" fmla="val -79366"/>
+              <a:gd name="adj2" fmla="val 77586"/>
+            </a:avLst>
+          </a:prstGeom>
+          <a:ln>
+            <a:tailEnd type="arrow"/>
+          </a:ln>
+        </p:spPr>
+        <p:style>
+          <a:lnRef idx="2">
+            <a:schemeClr val="dk1"/>
+          </a:lnRef>
+          <a:fillRef idx="0">
+            <a:schemeClr val="dk1"/>
+          </a:fillRef>
+          <a:effectRef idx="1">
+            <a:schemeClr val="dk1"/>
+          </a:effectRef>
+          <a:fontRef idx="minor">
+            <a:schemeClr val="tx1"/>
+          </a:fontRef>
+        </p:style>
+      </p:cxnSp>
+      <p:cxnSp>
+        <p:nvCxnSpPr>
+          <p:cNvPr id="25" name="Connecteur en angle 24"/>
+          <p:cNvCxnSpPr>
+            <a:endCxn id="3" idx="0"/>
+          </p:cNvCxnSpPr>
+          <p:nvPr/>
+        </p:nvCxnSpPr>
+        <p:spPr>
+          <a:xfrm>
+            <a:off x="3779913" y="2705797"/>
+            <a:ext cx="720079" cy="12700"/>
+          </a:xfrm>
+          <a:prstGeom prst="bentConnector4">
+            <a:avLst>
+              <a:gd name="adj1" fmla="val -2630"/>
+              <a:gd name="adj2" fmla="val -7145457"/>
+            </a:avLst>
+          </a:prstGeom>
+          <a:ln>
+            <a:tailEnd type="arrow"/>
+          </a:ln>
+        </p:spPr>
+        <p:style>
+          <a:lnRef idx="2">
+            <a:schemeClr val="dk1"/>
+          </a:lnRef>
+          <a:fillRef idx="0">
+            <a:schemeClr val="dk1"/>
+          </a:fillRef>
+          <a:effectRef idx="1">
+            <a:schemeClr val="dk1"/>
+          </a:effectRef>
+          <a:fontRef idx="minor">
+            <a:schemeClr val="tx1"/>
+          </a:fontRef>
+        </p:style>
+      </p:cxnSp>
+      <p:cxnSp>
+        <p:nvCxnSpPr>
+          <p:cNvPr id="37" name="Connecteur en angle 36"/>
+          <p:cNvCxnSpPr>
+            <a:endCxn id="3" idx="2"/>
+          </p:cNvCxnSpPr>
+          <p:nvPr/>
+        </p:nvCxnSpPr>
+        <p:spPr>
+          <a:xfrm rot="10800000">
+            <a:off x="4499993" y="3857925"/>
+            <a:ext cx="576065" cy="12700"/>
+          </a:xfrm>
+          <a:prstGeom prst="bentConnector4">
+            <a:avLst>
+              <a:gd name="adj1" fmla="val -4237"/>
+              <a:gd name="adj2" fmla="val -5618189"/>
+            </a:avLst>
+          </a:prstGeom>
+          <a:ln>
+            <a:tailEnd type="arrow"/>
+          </a:ln>
+        </p:spPr>
+        <p:style>
+          <a:lnRef idx="2">
+            <a:schemeClr val="dk1"/>
+          </a:lnRef>
+          <a:fillRef idx="0">
+            <a:schemeClr val="dk1"/>
+          </a:fillRef>
+          <a:effectRef idx="1">
+            <a:schemeClr val="dk1"/>
+          </a:effectRef>
+          <a:fontRef idx="minor">
+            <a:schemeClr val="tx1"/>
+          </a:fontRef>
+        </p:style>
+      </p:cxnSp>
+      <p:cxnSp>
+        <p:nvCxnSpPr>
+          <p:cNvPr id="58" name="Connecteur en angle 57"/>
+          <p:cNvCxnSpPr>
+            <a:stCxn id="2" idx="0"/>
+            <a:endCxn id="4" idx="0"/>
+          </p:cNvCxnSpPr>
+          <p:nvPr/>
+        </p:nvCxnSpPr>
+        <p:spPr>
+          <a:xfrm rot="5400000" flipH="1" flipV="1">
+            <a:off x="4531060" y="-503495"/>
+            <a:ext cx="12700" cy="6418584"/>
+          </a:xfrm>
+          <a:prstGeom prst="bentConnector3">
+            <a:avLst>
+              <a:gd name="adj1" fmla="val 15654543"/>
+            </a:avLst>
+          </a:prstGeom>
+          <a:ln>
+            <a:tailEnd type="arrow"/>
+          </a:ln>
+        </p:spPr>
+        <p:style>
+          <a:lnRef idx="2">
+            <a:schemeClr val="dk1"/>
+          </a:lnRef>
+          <a:fillRef idx="0">
+            <a:schemeClr val="dk1"/>
+          </a:fillRef>
+          <a:effectRef idx="1">
+            <a:schemeClr val="dk1"/>
+          </a:effectRef>
+          <a:fontRef idx="minor">
+            <a:schemeClr val="tx1"/>
+          </a:fontRef>
+        </p:style>
+      </p:cxnSp>
+      <p:cxnSp>
+        <p:nvCxnSpPr>
+          <p:cNvPr id="62" name="Connecteur en angle 61"/>
+          <p:cNvCxnSpPr>
+            <a:stCxn id="4" idx="2"/>
+            <a:endCxn id="2" idx="2"/>
+          </p:cNvCxnSpPr>
+          <p:nvPr/>
+        </p:nvCxnSpPr>
+        <p:spPr>
+          <a:xfrm rot="5400000">
+            <a:off x="4531060" y="648633"/>
+            <a:ext cx="12700" cy="6418584"/>
+          </a:xfrm>
+          <a:prstGeom prst="bentConnector3">
+            <a:avLst>
+              <a:gd name="adj1" fmla="val 11400000"/>
+            </a:avLst>
+          </a:prstGeom>
+          <a:ln>
+            <a:tailEnd type="arrow"/>
+          </a:ln>
+        </p:spPr>
+        <p:style>
+          <a:lnRef idx="2">
+            <a:schemeClr val="dk1"/>
+          </a:lnRef>
+          <a:fillRef idx="0">
+            <a:schemeClr val="dk1"/>
+          </a:fillRef>
+          <a:effectRef idx="1">
+            <a:schemeClr val="dk1"/>
+          </a:effectRef>
+          <a:fontRef idx="minor">
+            <a:schemeClr val="tx1"/>
+          </a:fontRef>
+        </p:style>
+      </p:cxnSp>
+      <p:sp>
+        <p:nvSpPr>
+          <p:cNvPr id="67" name="ZoneTexte 66"/>
+          <p:cNvSpPr txBox="1"/>
+          <p:nvPr/>
+        </p:nvSpPr>
+        <p:spPr>
+          <a:xfrm>
+            <a:off x="3347864" y="260648"/>
+            <a:ext cx="2155398" cy="369332"/>
+          </a:xfrm>
+          <a:prstGeom prst="rect">
+            <a:avLst/>
+          </a:prstGeom>
+          <a:noFill/>
+        </p:spPr>
+        <p:txBody>
+          <a:bodyPr wrap="none" rtlCol="0">
+            <a:spAutoFit/>
+          </a:bodyPr>
+          <a:lstStyle/>
+          <a:p>
+            <a:r>
+              <a:rPr lang="fr-FR" dirty="0" smtClean="0"/>
+              <a:t>Défaillance complète</a:t>
+            </a:r>
+            <a:endParaRPr lang="fr-FR" dirty="0"/>
+          </a:p>
+        </p:txBody>
+      </p:sp>
+      <p:sp>
+        <p:nvSpPr>
+          <p:cNvPr id="68" name="ZoneTexte 67"/>
+          <p:cNvSpPr txBox="1"/>
+          <p:nvPr/>
+        </p:nvSpPr>
+        <p:spPr>
+          <a:xfrm>
+            <a:off x="3113131" y="1251047"/>
+            <a:ext cx="2053639" cy="369332"/>
+          </a:xfrm>
+          <a:prstGeom prst="rect">
+            <a:avLst/>
+          </a:prstGeom>
+          <a:noFill/>
+        </p:spPr>
+        <p:txBody>
+          <a:bodyPr wrap="none" rtlCol="0">
+            <a:spAutoFit/>
+          </a:bodyPr>
+          <a:lstStyle/>
+          <a:p>
+            <a:r>
+              <a:rPr lang="fr-FR" dirty="0" smtClean="0"/>
+              <a:t>Défaillance partielle</a:t>
+            </a:r>
+            <a:endParaRPr lang="fr-FR" dirty="0"/>
+          </a:p>
+        </p:txBody>
+      </p:sp>
+      <p:sp>
+        <p:nvSpPr>
+          <p:cNvPr id="69" name="ZoneTexte 68"/>
+          <p:cNvSpPr txBox="1"/>
+          <p:nvPr/>
+        </p:nvSpPr>
+        <p:spPr>
+          <a:xfrm>
+            <a:off x="1328118" y="1988840"/>
+            <a:ext cx="2053639" cy="369332"/>
+          </a:xfrm>
+          <a:prstGeom prst="rect">
+            <a:avLst/>
+          </a:prstGeom>
+          <a:noFill/>
+        </p:spPr>
+        <p:txBody>
+          <a:bodyPr wrap="none" rtlCol="0">
+            <a:spAutoFit/>
+          </a:bodyPr>
+          <a:lstStyle/>
+          <a:p>
+            <a:r>
+              <a:rPr lang="fr-FR" dirty="0" smtClean="0"/>
+              <a:t>Défaillance partielle</a:t>
+            </a:r>
+            <a:endParaRPr lang="fr-FR" dirty="0"/>
+          </a:p>
+        </p:txBody>
+      </p:sp>
+      <p:sp>
+        <p:nvSpPr>
+          <p:cNvPr id="71" name="ZoneTexte 70"/>
+          <p:cNvSpPr txBox="1"/>
+          <p:nvPr/>
+        </p:nvSpPr>
+        <p:spPr>
+          <a:xfrm>
+            <a:off x="5364088" y="1988840"/>
+            <a:ext cx="2155398" cy="369332"/>
+          </a:xfrm>
+          <a:prstGeom prst="rect">
+            <a:avLst/>
+          </a:prstGeom>
+          <a:noFill/>
+        </p:spPr>
+        <p:txBody>
+          <a:bodyPr wrap="none" rtlCol="0">
+            <a:spAutoFit/>
+          </a:bodyPr>
+          <a:lstStyle/>
+          <a:p>
+            <a:r>
+              <a:rPr lang="fr-FR" dirty="0" smtClean="0"/>
+              <a:t>Défaillance complète</a:t>
+            </a:r>
+            <a:endParaRPr lang="fr-FR" dirty="0"/>
+          </a:p>
+        </p:txBody>
+      </p:sp>
+      <p:sp>
+        <p:nvSpPr>
+          <p:cNvPr id="72" name="ZoneTexte 71"/>
+          <p:cNvSpPr txBox="1"/>
+          <p:nvPr/>
+        </p:nvSpPr>
+        <p:spPr>
+          <a:xfrm>
+            <a:off x="3272587" y="5517232"/>
+            <a:ext cx="2305952" cy="369332"/>
+          </a:xfrm>
+          <a:prstGeom prst="rect">
+            <a:avLst/>
+          </a:prstGeom>
+          <a:noFill/>
+        </p:spPr>
+        <p:txBody>
+          <a:bodyPr wrap="none" rtlCol="0">
+            <a:spAutoFit/>
+          </a:bodyPr>
+          <a:lstStyle/>
+          <a:p>
+            <a:r>
+              <a:rPr lang="fr-FR" dirty="0" smtClean="0"/>
+              <a:t>Restauration complète</a:t>
+            </a:r>
+            <a:endParaRPr lang="fr-FR" dirty="0"/>
+          </a:p>
+        </p:txBody>
+      </p:sp>
+      <p:sp>
+        <p:nvSpPr>
+          <p:cNvPr id="73" name="ZoneTexte 72"/>
+          <p:cNvSpPr txBox="1"/>
+          <p:nvPr/>
+        </p:nvSpPr>
+        <p:spPr>
+          <a:xfrm>
+            <a:off x="1473961" y="4221088"/>
+            <a:ext cx="2305952" cy="369332"/>
+          </a:xfrm>
+          <a:prstGeom prst="rect">
+            <a:avLst/>
+          </a:prstGeom>
+          <a:noFill/>
+        </p:spPr>
+        <p:txBody>
+          <a:bodyPr wrap="none" rtlCol="0">
+            <a:spAutoFit/>
+          </a:bodyPr>
+          <a:lstStyle/>
+          <a:p>
+            <a:r>
+              <a:rPr lang="fr-FR" dirty="0" smtClean="0"/>
+              <a:t>Restauration complète</a:t>
+            </a:r>
+            <a:endParaRPr lang="fr-FR" dirty="0"/>
+          </a:p>
+        </p:txBody>
+      </p:sp>
+      <p:sp>
+        <p:nvSpPr>
+          <p:cNvPr id="74" name="ZoneTexte 73"/>
+          <p:cNvSpPr txBox="1"/>
+          <p:nvPr/>
+        </p:nvSpPr>
+        <p:spPr>
+          <a:xfrm>
+            <a:off x="3685928" y="4738272"/>
+            <a:ext cx="2204193" cy="369332"/>
+          </a:xfrm>
+          <a:prstGeom prst="rect">
+            <a:avLst/>
+          </a:prstGeom>
+          <a:noFill/>
+        </p:spPr>
+        <p:txBody>
+          <a:bodyPr wrap="none" rtlCol="0">
+            <a:spAutoFit/>
+          </a:bodyPr>
+          <a:lstStyle/>
+          <a:p>
+            <a:r>
+              <a:rPr lang="fr-FR" dirty="0" smtClean="0"/>
+              <a:t>Restauration partielle</a:t>
+            </a:r>
+            <a:endParaRPr lang="fr-FR" dirty="0"/>
+          </a:p>
+        </p:txBody>
+      </p:sp>
+      <p:sp>
+        <p:nvSpPr>
+          <p:cNvPr id="75" name="ZoneTexte 74"/>
+          <p:cNvSpPr txBox="1"/>
+          <p:nvPr/>
+        </p:nvSpPr>
+        <p:spPr>
+          <a:xfrm>
+            <a:off x="5433459" y="4149080"/>
+            <a:ext cx="2204193" cy="369332"/>
+          </a:xfrm>
+          <a:prstGeom prst="rect">
+            <a:avLst/>
+          </a:prstGeom>
+          <a:noFill/>
+        </p:spPr>
+        <p:txBody>
+          <a:bodyPr wrap="none" rtlCol="0">
+            <a:spAutoFit/>
+          </a:bodyPr>
+          <a:lstStyle/>
+          <a:p>
+            <a:r>
+              <a:rPr lang="fr-FR" dirty="0" smtClean="0"/>
+              <a:t>Restauration partielle</a:t>
+            </a:r>
+            <a:endParaRPr lang="fr-FR" dirty="0"/>
+          </a:p>
+        </p:txBody>
+      </p:sp>
+    </p:spTree>
+    <p:extLst>
+      <p:ext uri="{BB962C8B-B14F-4D97-AF65-F5344CB8AC3E}">
+        <p14:creationId xmlns:p14="http://schemas.microsoft.com/office/powerpoint/2010/main" val="2282466870"/>
       </p:ext>
     </p:extLst>
   </p:cSld>

</xml_diff>

<commit_message>
[ENSG ASI 2014] fin soa
</commit_message>
<xml_diff>
--- a/cours/ensg-asi-2014/src/raws/img_gen.pptx
+++ b/cours/ensg-asi-2014/src/raws/img_gen.pptx
@@ -22,6 +22,9 @@
     <p:sldId id="270" r:id="rId16"/>
     <p:sldId id="271" r:id="rId17"/>
     <p:sldId id="272" r:id="rId18"/>
+    <p:sldId id="273" r:id="rId19"/>
+    <p:sldId id="276" r:id="rId20"/>
+    <p:sldId id="275" r:id="rId21"/>
   </p:sldIdLst>
   <p:sldSz cx="9144000" cy="6858000" type="screen4x3"/>
   <p:notesSz cx="6858000" cy="9144000"/>
@@ -7136,19 +7139,19 @@
     </dgm:pt>
   </dgm:ptLst>
   <dgm:cxnLst>
-    <dgm:cxn modelId="{2AE9C35E-3273-4DAA-A6D8-BCD8A78582CC}" srcId="{B18DC067-9F63-424D-8553-3F76E8EF746A}" destId="{B83A7A2C-093C-4CF0-807B-ABB5179346D3}" srcOrd="0" destOrd="0" parTransId="{0A238EC3-2DD4-4C33-8D8A-4F342F670016}" sibTransId="{96F93F9C-FD31-45EF-B7C3-C2D2BF2EB185}"/>
-    <dgm:cxn modelId="{5FF50579-AABA-49BA-AC98-F016508A8440}" type="presOf" srcId="{6B41AD1D-A3FB-4AF2-9542-37F0A7BD4393}" destId="{6EC877B3-C26C-4423-9711-F7172DDEE7FB}" srcOrd="0" destOrd="0" presId="urn:microsoft.com/office/officeart/2005/8/layout/hierarchy4"/>
     <dgm:cxn modelId="{A019861F-C4F5-44F6-8D98-F6DC604DE51B}" srcId="{B83A7A2C-093C-4CF0-807B-ABB5179346D3}" destId="{03863854-F35C-4D1C-A662-F080B785E8F9}" srcOrd="0" destOrd="0" parTransId="{932F43F2-A616-4B60-83AC-B1718E87CFD9}" sibTransId="{EB8E4B3E-AF28-431E-BFA0-0F3614E59D3C}"/>
-    <dgm:cxn modelId="{C8F7CBE1-E3E1-4A23-9C6B-1BF17F63877F}" type="presOf" srcId="{7F8A0140-C8B6-4AF1-B926-86169866F043}" destId="{891DC49C-520D-4C3E-89C0-519A4BB70127}" srcOrd="0" destOrd="0" presId="urn:microsoft.com/office/officeart/2005/8/layout/hierarchy4"/>
     <dgm:cxn modelId="{7A5C532F-061D-4A63-98AA-9A8B5E1E978D}" type="presOf" srcId="{B18DC067-9F63-424D-8553-3F76E8EF746A}" destId="{9E3AE8A1-37D1-4C62-8A72-E09AF00023AA}" srcOrd="0" destOrd="0" presId="urn:microsoft.com/office/officeart/2005/8/layout/hierarchy4"/>
-    <dgm:cxn modelId="{A9D632EB-6B36-4226-B1AB-959A59699BA3}" type="presOf" srcId="{F8178CC8-7586-44D5-B9F2-3C912B808393}" destId="{A71E157E-2E6A-46C1-B68C-6F32834BC1CE}" srcOrd="0" destOrd="0" presId="urn:microsoft.com/office/officeart/2005/8/layout/hierarchy4"/>
-    <dgm:cxn modelId="{B78EBCEE-F2DD-4A50-BFE5-503906CA8023}" type="presOf" srcId="{B83A7A2C-093C-4CF0-807B-ABB5179346D3}" destId="{6D4C26C8-B30D-4B10-9C88-1544645608C8}" srcOrd="0" destOrd="0" presId="urn:microsoft.com/office/officeart/2005/8/layout/hierarchy4"/>
-    <dgm:cxn modelId="{4965CC9A-FAFC-4391-9A75-6DEC81152D35}" type="presOf" srcId="{03863854-F35C-4D1C-A662-F080B785E8F9}" destId="{DA053704-99ED-4498-9AFE-B6BAE31C7D40}" srcOrd="0" destOrd="0" presId="urn:microsoft.com/office/officeart/2005/8/layout/hierarchy4"/>
-    <dgm:cxn modelId="{3F1DA067-5EED-4438-BC3B-96BADE785FB9}" srcId="{B83A7A2C-093C-4CF0-807B-ABB5179346D3}" destId="{F8178CC8-7586-44D5-B9F2-3C912B808393}" srcOrd="1" destOrd="0" parTransId="{778BF30C-E051-4C74-ACA0-5B9074BCA9B6}" sibTransId="{14B53E76-3A99-4198-AB6A-BB47496C8EE8}"/>
-    <dgm:cxn modelId="{8EE64356-BFFC-4F96-86BB-F4B6C49B860E}" type="presOf" srcId="{3EF2CB08-D40A-4E40-B185-EC5E32528E39}" destId="{67CC1F6E-23F5-4B14-84CE-AE1BBE1F85C1}" srcOrd="0" destOrd="0" presId="urn:microsoft.com/office/officeart/2005/8/layout/hierarchy4"/>
     <dgm:cxn modelId="{1728D6AA-DD2B-4F89-986D-C47505562D40}" srcId="{F8178CC8-7586-44D5-B9F2-3C912B808393}" destId="{3EF2CB08-D40A-4E40-B185-EC5E32528E39}" srcOrd="0" destOrd="0" parTransId="{CC844EF2-C259-4960-9150-3C9C18DC4BC8}" sibTransId="{3997AEA7-41FA-429E-909C-A83852D361B3}"/>
     <dgm:cxn modelId="{6E5703AE-2C34-4856-95BA-871F4518A263}" srcId="{03863854-F35C-4D1C-A662-F080B785E8F9}" destId="{6B41AD1D-A3FB-4AF2-9542-37F0A7BD4393}" srcOrd="0" destOrd="0" parTransId="{F6A2ED43-EF8C-46E7-BC68-B6BB9508EC13}" sibTransId="{9A01A00B-BC54-497C-96C1-5BA53BA1FBDC}"/>
     <dgm:cxn modelId="{F05038E6-EE3C-439B-B513-F7D55288AB4F}" srcId="{03863854-F35C-4D1C-A662-F080B785E8F9}" destId="{7F8A0140-C8B6-4AF1-B926-86169866F043}" srcOrd="1" destOrd="0" parTransId="{275EF790-B38B-4A02-BCFA-DCA3E0549F40}" sibTransId="{A66D89F2-F3A9-4E5D-9CDF-2BBA30490511}"/>
+    <dgm:cxn modelId="{C8F7CBE1-E3E1-4A23-9C6B-1BF17F63877F}" type="presOf" srcId="{7F8A0140-C8B6-4AF1-B926-86169866F043}" destId="{891DC49C-520D-4C3E-89C0-519A4BB70127}" srcOrd="0" destOrd="0" presId="urn:microsoft.com/office/officeart/2005/8/layout/hierarchy4"/>
+    <dgm:cxn modelId="{A9D632EB-6B36-4226-B1AB-959A59699BA3}" type="presOf" srcId="{F8178CC8-7586-44D5-B9F2-3C912B808393}" destId="{A71E157E-2E6A-46C1-B68C-6F32834BC1CE}" srcOrd="0" destOrd="0" presId="urn:microsoft.com/office/officeart/2005/8/layout/hierarchy4"/>
+    <dgm:cxn modelId="{5FF50579-AABA-49BA-AC98-F016508A8440}" type="presOf" srcId="{6B41AD1D-A3FB-4AF2-9542-37F0A7BD4393}" destId="{6EC877B3-C26C-4423-9711-F7172DDEE7FB}" srcOrd="0" destOrd="0" presId="urn:microsoft.com/office/officeart/2005/8/layout/hierarchy4"/>
+    <dgm:cxn modelId="{8EE64356-BFFC-4F96-86BB-F4B6C49B860E}" type="presOf" srcId="{3EF2CB08-D40A-4E40-B185-EC5E32528E39}" destId="{67CC1F6E-23F5-4B14-84CE-AE1BBE1F85C1}" srcOrd="0" destOrd="0" presId="urn:microsoft.com/office/officeart/2005/8/layout/hierarchy4"/>
+    <dgm:cxn modelId="{4965CC9A-FAFC-4391-9A75-6DEC81152D35}" type="presOf" srcId="{03863854-F35C-4D1C-A662-F080B785E8F9}" destId="{DA053704-99ED-4498-9AFE-B6BAE31C7D40}" srcOrd="0" destOrd="0" presId="urn:microsoft.com/office/officeart/2005/8/layout/hierarchy4"/>
+    <dgm:cxn modelId="{3F1DA067-5EED-4438-BC3B-96BADE785FB9}" srcId="{B83A7A2C-093C-4CF0-807B-ABB5179346D3}" destId="{F8178CC8-7586-44D5-B9F2-3C912B808393}" srcOrd="1" destOrd="0" parTransId="{778BF30C-E051-4C74-ACA0-5B9074BCA9B6}" sibTransId="{14B53E76-3A99-4198-AB6A-BB47496C8EE8}"/>
+    <dgm:cxn modelId="{B78EBCEE-F2DD-4A50-BFE5-503906CA8023}" type="presOf" srcId="{B83A7A2C-093C-4CF0-807B-ABB5179346D3}" destId="{6D4C26C8-B30D-4B10-9C88-1544645608C8}" srcOrd="0" destOrd="0" presId="urn:microsoft.com/office/officeart/2005/8/layout/hierarchy4"/>
+    <dgm:cxn modelId="{2AE9C35E-3273-4DAA-A6D8-BCD8A78582CC}" srcId="{B18DC067-9F63-424D-8553-3F76E8EF746A}" destId="{B83A7A2C-093C-4CF0-807B-ABB5179346D3}" srcOrd="0" destOrd="0" parTransId="{0A238EC3-2DD4-4C33-8D8A-4F342F670016}" sibTransId="{96F93F9C-FD31-45EF-B7C3-C2D2BF2EB185}"/>
     <dgm:cxn modelId="{CD2EEC64-1857-4549-B595-A14F320D45C6}" type="presParOf" srcId="{9E3AE8A1-37D1-4C62-8A72-E09AF00023AA}" destId="{66078A0A-95E2-4CFC-A654-68790941C79A}" srcOrd="0" destOrd="0" presId="urn:microsoft.com/office/officeart/2005/8/layout/hierarchy4"/>
     <dgm:cxn modelId="{53997919-5DDD-4F3E-9FCD-C6DB1BD7D0E8}" type="presParOf" srcId="{66078A0A-95E2-4CFC-A654-68790941C79A}" destId="{6D4C26C8-B30D-4B10-9C88-1544645608C8}" srcOrd="0" destOrd="0" presId="urn:microsoft.com/office/officeart/2005/8/layout/hierarchy4"/>
     <dgm:cxn modelId="{FD3ACD2C-2896-4302-874B-DBBEFB3FEE20}" type="presParOf" srcId="{66078A0A-95E2-4CFC-A654-68790941C79A}" destId="{1C9ACBB3-61DD-41E8-9F47-23213F6FB90B}" srcOrd="1" destOrd="0" presId="urn:microsoft.com/office/officeart/2005/8/layout/hierarchy4"/>
@@ -12109,1107 +12112,6 @@
       <dsp:cNvGrpSpPr/>
     </dsp:nvGrpSpPr>
     <dsp:grpSpPr/>
-    <dsp:sp modelId="{6478A964-31EB-445D-9D12-4A3451A86D3C}">
-      <dsp:nvSpPr>
-        <dsp:cNvPr id="0" name=""/>
-        <dsp:cNvSpPr/>
-      </dsp:nvSpPr>
-      <dsp:spPr>
-        <a:xfrm>
-          <a:off x="4204" y="3430964"/>
-          <a:ext cx="6087591" cy="633015"/>
-        </a:xfrm>
-        <a:prstGeom prst="roundRect">
-          <a:avLst>
-            <a:gd name="adj" fmla="val 10000"/>
-          </a:avLst>
-        </a:prstGeom>
-        <a:solidFill>
-          <a:schemeClr val="dk1"/>
-        </a:solidFill>
-        <a:ln w="25400" cap="flat" cmpd="sng" algn="ctr">
-          <a:solidFill>
-            <a:schemeClr val="dk1">
-              <a:shade val="50000"/>
-            </a:schemeClr>
-          </a:solidFill>
-          <a:prstDash val="solid"/>
-        </a:ln>
-        <a:effectLst/>
-      </dsp:spPr>
-      <dsp:style>
-        <a:lnRef idx="2">
-          <a:schemeClr val="dk1">
-            <a:shade val="50000"/>
-          </a:schemeClr>
-        </a:lnRef>
-        <a:fillRef idx="1">
-          <a:schemeClr val="dk1"/>
-        </a:fillRef>
-        <a:effectRef idx="0">
-          <a:schemeClr val="dk1"/>
-        </a:effectRef>
-        <a:fontRef idx="minor">
-          <a:schemeClr val="lt1"/>
-        </a:fontRef>
-      </dsp:style>
-      <dsp:txBody>
-        <a:bodyPr spcFirstLastPara="0" vert="horz" wrap="square" lIns="102870" tIns="102870" rIns="102870" bIns="102870" numCol="1" spcCol="1270" anchor="ctr" anchorCtr="0">
-          <a:noAutofit/>
-        </a:bodyPr>
-        <a:lstStyle/>
-        <a:p>
-          <a:pPr lvl="0" algn="ctr" defTabSz="1200150">
-            <a:lnSpc>
-              <a:spcPct val="90000"/>
-            </a:lnSpc>
-            <a:spcBef>
-              <a:spcPct val="0"/>
-            </a:spcBef>
-            <a:spcAft>
-              <a:spcPct val="35000"/>
-            </a:spcAft>
-          </a:pPr>
-          <a:r>
-            <a:rPr lang="fr-FR" sz="2700" kern="1200" dirty="0" smtClean="0"/>
-            <a:t>Matériel</a:t>
-          </a:r>
-          <a:endParaRPr lang="fr-FR" sz="2700" kern="1200" dirty="0"/>
-        </a:p>
-      </dsp:txBody>
-      <dsp:txXfrm>
-        <a:off x="22744" y="3449504"/>
-        <a:ext cx="6050511" cy="595935"/>
-      </dsp:txXfrm>
-    </dsp:sp>
-    <dsp:sp modelId="{38AA97D6-BC05-4DF8-8307-3605CFBD985F}">
-      <dsp:nvSpPr>
-        <dsp:cNvPr id="0" name=""/>
-        <dsp:cNvSpPr/>
-      </dsp:nvSpPr>
-      <dsp:spPr>
-        <a:xfrm>
-          <a:off x="4204" y="2744775"/>
-          <a:ext cx="6087591" cy="633015"/>
-        </a:xfrm>
-        <a:prstGeom prst="roundRect">
-          <a:avLst>
-            <a:gd name="adj" fmla="val 10000"/>
-          </a:avLst>
-        </a:prstGeom>
-        <a:solidFill>
-          <a:schemeClr val="accent2"/>
-        </a:solidFill>
-        <a:ln w="25400" cap="flat" cmpd="sng" algn="ctr">
-          <a:solidFill>
-            <a:schemeClr val="accent2">
-              <a:shade val="50000"/>
-            </a:schemeClr>
-          </a:solidFill>
-          <a:prstDash val="solid"/>
-        </a:ln>
-        <a:effectLst/>
-      </dsp:spPr>
-      <dsp:style>
-        <a:lnRef idx="2">
-          <a:schemeClr val="accent2">
-            <a:shade val="50000"/>
-          </a:schemeClr>
-        </a:lnRef>
-        <a:fillRef idx="1">
-          <a:schemeClr val="accent2"/>
-        </a:fillRef>
-        <a:effectRef idx="0">
-          <a:schemeClr val="accent2"/>
-        </a:effectRef>
-        <a:fontRef idx="minor">
-          <a:schemeClr val="lt1"/>
-        </a:fontRef>
-      </dsp:style>
-      <dsp:txBody>
-        <a:bodyPr spcFirstLastPara="0" vert="horz" wrap="square" lIns="102870" tIns="102870" rIns="102870" bIns="102870" numCol="1" spcCol="1270" anchor="ctr" anchorCtr="0">
-          <a:noAutofit/>
-        </a:bodyPr>
-        <a:lstStyle/>
-        <a:p>
-          <a:pPr lvl="0" algn="ctr" defTabSz="1200150">
-            <a:lnSpc>
-              <a:spcPct val="90000"/>
-            </a:lnSpc>
-            <a:spcBef>
-              <a:spcPct val="0"/>
-            </a:spcBef>
-            <a:spcAft>
-              <a:spcPct val="35000"/>
-            </a:spcAft>
-          </a:pPr>
-          <a:r>
-            <a:rPr lang="fr-FR" sz="2700" kern="1200" dirty="0" smtClean="0"/>
-            <a:t>OS</a:t>
-          </a:r>
-          <a:endParaRPr lang="fr-FR" sz="2700" kern="1200" dirty="0"/>
-        </a:p>
-      </dsp:txBody>
-      <dsp:txXfrm>
-        <a:off x="22744" y="2763315"/>
-        <a:ext cx="6050511" cy="595935"/>
-      </dsp:txXfrm>
-    </dsp:sp>
-    <dsp:sp modelId="{753C40B7-CE70-4C43-9890-A243E5AEF5E2}">
-      <dsp:nvSpPr>
-        <dsp:cNvPr id="0" name=""/>
-        <dsp:cNvSpPr/>
-      </dsp:nvSpPr>
-      <dsp:spPr>
-        <a:xfrm>
-          <a:off x="4204" y="2058586"/>
-          <a:ext cx="6087591" cy="633015"/>
-        </a:xfrm>
-        <a:prstGeom prst="roundRect">
-          <a:avLst>
-            <a:gd name="adj" fmla="val 10000"/>
-          </a:avLst>
-        </a:prstGeom>
-        <a:solidFill>
-          <a:schemeClr val="accent1">
-            <a:hueOff val="0"/>
-            <a:satOff val="0"/>
-            <a:lumOff val="0"/>
-            <a:alphaOff val="0"/>
-          </a:schemeClr>
-        </a:solidFill>
-        <a:ln w="25400" cap="flat" cmpd="sng" algn="ctr">
-          <a:solidFill>
-            <a:schemeClr val="lt1">
-              <a:hueOff val="0"/>
-              <a:satOff val="0"/>
-              <a:lumOff val="0"/>
-              <a:alphaOff val="0"/>
-            </a:schemeClr>
-          </a:solidFill>
-          <a:prstDash val="solid"/>
-        </a:ln>
-        <a:effectLst/>
-      </dsp:spPr>
-      <dsp:style>
-        <a:lnRef idx="2">
-          <a:scrgbClr r="0" g="0" b="0"/>
-        </a:lnRef>
-        <a:fillRef idx="1">
-          <a:scrgbClr r="0" g="0" b="0"/>
-        </a:fillRef>
-        <a:effectRef idx="0">
-          <a:scrgbClr r="0" g="0" b="0"/>
-        </a:effectRef>
-        <a:fontRef idx="minor">
-          <a:schemeClr val="lt1"/>
-        </a:fontRef>
-      </dsp:style>
-      <dsp:txBody>
-        <a:bodyPr spcFirstLastPara="0" vert="horz" wrap="square" lIns="102870" tIns="102870" rIns="102870" bIns="102870" numCol="1" spcCol="1270" anchor="ctr" anchorCtr="0">
-          <a:noAutofit/>
-        </a:bodyPr>
-        <a:lstStyle/>
-        <a:p>
-          <a:pPr lvl="0" algn="ctr" defTabSz="1200150">
-            <a:lnSpc>
-              <a:spcPct val="90000"/>
-            </a:lnSpc>
-            <a:spcBef>
-              <a:spcPct val="0"/>
-            </a:spcBef>
-            <a:spcAft>
-              <a:spcPct val="35000"/>
-            </a:spcAft>
-          </a:pPr>
-          <a:r>
-            <a:rPr lang="fr-FR" sz="2700" kern="1200" dirty="0" smtClean="0"/>
-            <a:t>Hyperviseur</a:t>
-          </a:r>
-          <a:endParaRPr lang="fr-FR" sz="2700" kern="1200" dirty="0"/>
-        </a:p>
-      </dsp:txBody>
-      <dsp:txXfrm>
-        <a:off x="22744" y="2077126"/>
-        <a:ext cx="6050511" cy="595935"/>
-      </dsp:txXfrm>
-    </dsp:sp>
-    <dsp:sp modelId="{3A63A0DC-182E-4E75-9287-AC720D90D4F8}">
-      <dsp:nvSpPr>
-        <dsp:cNvPr id="0" name=""/>
-        <dsp:cNvSpPr/>
-      </dsp:nvSpPr>
-      <dsp:spPr>
-        <a:xfrm>
-          <a:off x="4204" y="1372397"/>
-          <a:ext cx="2015236" cy="633015"/>
-        </a:xfrm>
-        <a:prstGeom prst="roundRect">
-          <a:avLst>
-            <a:gd name="adj" fmla="val 10000"/>
-          </a:avLst>
-        </a:prstGeom>
-        <a:solidFill>
-          <a:schemeClr val="accent6"/>
-        </a:solidFill>
-        <a:ln w="25400" cap="flat" cmpd="sng" algn="ctr">
-          <a:solidFill>
-            <a:schemeClr val="accent6">
-              <a:shade val="50000"/>
-            </a:schemeClr>
-          </a:solidFill>
-          <a:prstDash val="solid"/>
-        </a:ln>
-        <a:effectLst/>
-      </dsp:spPr>
-      <dsp:style>
-        <a:lnRef idx="2">
-          <a:schemeClr val="accent6">
-            <a:shade val="50000"/>
-          </a:schemeClr>
-        </a:lnRef>
-        <a:fillRef idx="1">
-          <a:schemeClr val="accent6"/>
-        </a:fillRef>
-        <a:effectRef idx="0">
-          <a:schemeClr val="accent6"/>
-        </a:effectRef>
-        <a:fontRef idx="minor">
-          <a:schemeClr val="lt1"/>
-        </a:fontRef>
-      </dsp:style>
-      <dsp:txBody>
-        <a:bodyPr spcFirstLastPara="0" vert="horz" wrap="square" lIns="60960" tIns="60960" rIns="60960" bIns="60960" numCol="1" spcCol="1270" anchor="ctr" anchorCtr="0">
-          <a:noAutofit/>
-        </a:bodyPr>
-        <a:lstStyle/>
-        <a:p>
-          <a:pPr lvl="0" algn="ctr" defTabSz="711200">
-            <a:lnSpc>
-              <a:spcPct val="90000"/>
-            </a:lnSpc>
-            <a:spcBef>
-              <a:spcPct val="0"/>
-            </a:spcBef>
-            <a:spcAft>
-              <a:spcPct val="35000"/>
-            </a:spcAft>
-          </a:pPr>
-          <a:r>
-            <a:rPr lang="fr-FR" sz="1600" kern="1200" dirty="0" smtClean="0"/>
-            <a:t>Matériel V1</a:t>
-          </a:r>
-          <a:endParaRPr lang="fr-FR" sz="1600" kern="1200" dirty="0"/>
-        </a:p>
-      </dsp:txBody>
-      <dsp:txXfrm>
-        <a:off x="22744" y="1390937"/>
-        <a:ext cx="1978156" cy="595935"/>
-      </dsp:txXfrm>
-    </dsp:sp>
-    <dsp:sp modelId="{2A8D64FB-4E0D-4C37-B1CA-8AFFFCDA5E26}">
-      <dsp:nvSpPr>
-        <dsp:cNvPr id="0" name=""/>
-        <dsp:cNvSpPr/>
-      </dsp:nvSpPr>
-      <dsp:spPr>
-        <a:xfrm>
-          <a:off x="4204" y="686208"/>
-          <a:ext cx="2015236" cy="633015"/>
-        </a:xfrm>
-        <a:prstGeom prst="roundRect">
-          <a:avLst>
-            <a:gd name="adj" fmla="val 10000"/>
-          </a:avLst>
-        </a:prstGeom>
-        <a:solidFill>
-          <a:schemeClr val="accent4"/>
-        </a:solidFill>
-        <a:ln w="25400" cap="flat" cmpd="sng" algn="ctr">
-          <a:solidFill>
-            <a:schemeClr val="accent4">
-              <a:shade val="50000"/>
-            </a:schemeClr>
-          </a:solidFill>
-          <a:prstDash val="solid"/>
-        </a:ln>
-        <a:effectLst/>
-      </dsp:spPr>
-      <dsp:style>
-        <a:lnRef idx="2">
-          <a:schemeClr val="accent4">
-            <a:shade val="50000"/>
-          </a:schemeClr>
-        </a:lnRef>
-        <a:fillRef idx="1">
-          <a:schemeClr val="accent4"/>
-        </a:fillRef>
-        <a:effectRef idx="0">
-          <a:schemeClr val="accent4"/>
-        </a:effectRef>
-        <a:fontRef idx="minor">
-          <a:schemeClr val="lt1"/>
-        </a:fontRef>
-      </dsp:style>
-      <dsp:txBody>
-        <a:bodyPr spcFirstLastPara="0" vert="horz" wrap="square" lIns="60960" tIns="60960" rIns="60960" bIns="60960" numCol="1" spcCol="1270" anchor="ctr" anchorCtr="0">
-          <a:noAutofit/>
-        </a:bodyPr>
-        <a:lstStyle/>
-        <a:p>
-          <a:pPr lvl="0" algn="ctr" defTabSz="711200">
-            <a:lnSpc>
-              <a:spcPct val="90000"/>
-            </a:lnSpc>
-            <a:spcBef>
-              <a:spcPct val="0"/>
-            </a:spcBef>
-            <a:spcAft>
-              <a:spcPct val="35000"/>
-            </a:spcAft>
-          </a:pPr>
-          <a:r>
-            <a:rPr lang="fr-FR" sz="1600" kern="1200" dirty="0" smtClean="0"/>
-            <a:t>OS 1</a:t>
-          </a:r>
-          <a:endParaRPr lang="fr-FR" sz="1600" kern="1200" dirty="0"/>
-        </a:p>
-      </dsp:txBody>
-      <dsp:txXfrm>
-        <a:off x="22744" y="704748"/>
-        <a:ext cx="1978156" cy="595935"/>
-      </dsp:txXfrm>
-    </dsp:sp>
-    <dsp:sp modelId="{2A6E3044-8CDF-49C1-92CC-57D3C5CB2DB6}">
-      <dsp:nvSpPr>
-        <dsp:cNvPr id="0" name=""/>
-        <dsp:cNvSpPr/>
-      </dsp:nvSpPr>
-      <dsp:spPr>
-        <a:xfrm>
-          <a:off x="4204" y="19"/>
-          <a:ext cx="997148" cy="633015"/>
-        </a:xfrm>
-        <a:prstGeom prst="roundRect">
-          <a:avLst>
-            <a:gd name="adj" fmla="val 10000"/>
-          </a:avLst>
-        </a:prstGeom>
-        <a:solidFill>
-          <a:schemeClr val="accent3"/>
-        </a:solidFill>
-        <a:ln w="25400" cap="flat" cmpd="sng" algn="ctr">
-          <a:solidFill>
-            <a:schemeClr val="accent3">
-              <a:shade val="50000"/>
-            </a:schemeClr>
-          </a:solidFill>
-          <a:prstDash val="solid"/>
-        </a:ln>
-        <a:effectLst/>
-      </dsp:spPr>
-      <dsp:style>
-        <a:lnRef idx="2">
-          <a:schemeClr val="accent3">
-            <a:shade val="50000"/>
-          </a:schemeClr>
-        </a:lnRef>
-        <a:fillRef idx="1">
-          <a:schemeClr val="accent3"/>
-        </a:fillRef>
-        <a:effectRef idx="0">
-          <a:schemeClr val="accent3"/>
-        </a:effectRef>
-        <a:fontRef idx="minor">
-          <a:schemeClr val="lt1"/>
-        </a:fontRef>
-      </dsp:style>
-      <dsp:txBody>
-        <a:bodyPr spcFirstLastPara="0" vert="horz" wrap="square" lIns="60960" tIns="60960" rIns="60960" bIns="60960" numCol="1" spcCol="1270" anchor="ctr" anchorCtr="0">
-          <a:noAutofit/>
-        </a:bodyPr>
-        <a:lstStyle/>
-        <a:p>
-          <a:pPr lvl="0" algn="ctr" defTabSz="711200">
-            <a:lnSpc>
-              <a:spcPct val="90000"/>
-            </a:lnSpc>
-            <a:spcBef>
-              <a:spcPct val="0"/>
-            </a:spcBef>
-            <a:spcAft>
-              <a:spcPct val="35000"/>
-            </a:spcAft>
-          </a:pPr>
-          <a:r>
-            <a:rPr lang="fr-FR" sz="1600" kern="1200" dirty="0" smtClean="0"/>
-            <a:t>App A</a:t>
-          </a:r>
-          <a:endParaRPr lang="fr-FR" sz="1600" kern="1200" dirty="0"/>
-        </a:p>
-      </dsp:txBody>
-      <dsp:txXfrm>
-        <a:off x="22744" y="18559"/>
-        <a:ext cx="960068" cy="595935"/>
-      </dsp:txXfrm>
-    </dsp:sp>
-    <dsp:sp modelId="{0BD06233-EC09-4F02-A27D-3AF5B69376FF}">
-      <dsp:nvSpPr>
-        <dsp:cNvPr id="0" name=""/>
-        <dsp:cNvSpPr/>
-      </dsp:nvSpPr>
-      <dsp:spPr>
-        <a:xfrm>
-          <a:off x="1022292" y="19"/>
-          <a:ext cx="997148" cy="633015"/>
-        </a:xfrm>
-        <a:prstGeom prst="roundRect">
-          <a:avLst>
-            <a:gd name="adj" fmla="val 10000"/>
-          </a:avLst>
-        </a:prstGeom>
-        <a:solidFill>
-          <a:schemeClr val="accent3"/>
-        </a:solidFill>
-        <a:ln w="25400" cap="flat" cmpd="sng" algn="ctr">
-          <a:solidFill>
-            <a:schemeClr val="accent3">
-              <a:shade val="50000"/>
-            </a:schemeClr>
-          </a:solidFill>
-          <a:prstDash val="solid"/>
-        </a:ln>
-        <a:effectLst/>
-      </dsp:spPr>
-      <dsp:style>
-        <a:lnRef idx="2">
-          <a:schemeClr val="accent3">
-            <a:shade val="50000"/>
-          </a:schemeClr>
-        </a:lnRef>
-        <a:fillRef idx="1">
-          <a:schemeClr val="accent3"/>
-        </a:fillRef>
-        <a:effectRef idx="0">
-          <a:schemeClr val="accent3"/>
-        </a:effectRef>
-        <a:fontRef idx="minor">
-          <a:schemeClr val="lt1"/>
-        </a:fontRef>
-      </dsp:style>
-      <dsp:txBody>
-        <a:bodyPr spcFirstLastPara="0" vert="horz" wrap="square" lIns="60960" tIns="60960" rIns="60960" bIns="60960" numCol="1" spcCol="1270" anchor="ctr" anchorCtr="0">
-          <a:noAutofit/>
-        </a:bodyPr>
-        <a:lstStyle/>
-        <a:p>
-          <a:pPr lvl="0" algn="ctr" defTabSz="711200">
-            <a:lnSpc>
-              <a:spcPct val="90000"/>
-            </a:lnSpc>
-            <a:spcBef>
-              <a:spcPct val="0"/>
-            </a:spcBef>
-            <a:spcAft>
-              <a:spcPct val="35000"/>
-            </a:spcAft>
-          </a:pPr>
-          <a:r>
-            <a:rPr lang="fr-FR" sz="1600" kern="1200" dirty="0" smtClean="0"/>
-            <a:t>App B</a:t>
-          </a:r>
-          <a:endParaRPr lang="fr-FR" sz="1600" kern="1200" dirty="0"/>
-        </a:p>
-      </dsp:txBody>
-      <dsp:txXfrm>
-        <a:off x="1040832" y="18559"/>
-        <a:ext cx="960068" cy="595935"/>
-      </dsp:txXfrm>
-    </dsp:sp>
-    <dsp:sp modelId="{FFB483E8-350F-4DAD-8E10-77DB15C54B0F}">
-      <dsp:nvSpPr>
-        <dsp:cNvPr id="0" name=""/>
-        <dsp:cNvSpPr/>
-      </dsp:nvSpPr>
-      <dsp:spPr>
-        <a:xfrm>
-          <a:off x="2040381" y="1372397"/>
-          <a:ext cx="3033325" cy="633015"/>
-        </a:xfrm>
-        <a:prstGeom prst="roundRect">
-          <a:avLst>
-            <a:gd name="adj" fmla="val 10000"/>
-          </a:avLst>
-        </a:prstGeom>
-        <a:solidFill>
-          <a:schemeClr val="accent6"/>
-        </a:solidFill>
-        <a:ln w="25400" cap="flat" cmpd="sng" algn="ctr">
-          <a:solidFill>
-            <a:schemeClr val="accent6">
-              <a:shade val="50000"/>
-            </a:schemeClr>
-          </a:solidFill>
-          <a:prstDash val="solid"/>
-        </a:ln>
-        <a:effectLst/>
-      </dsp:spPr>
-      <dsp:style>
-        <a:lnRef idx="2">
-          <a:schemeClr val="accent6">
-            <a:shade val="50000"/>
-          </a:schemeClr>
-        </a:lnRef>
-        <a:fillRef idx="1">
-          <a:schemeClr val="accent6"/>
-        </a:fillRef>
-        <a:effectRef idx="0">
-          <a:schemeClr val="accent6"/>
-        </a:effectRef>
-        <a:fontRef idx="minor">
-          <a:schemeClr val="lt1"/>
-        </a:fontRef>
-      </dsp:style>
-      <dsp:txBody>
-        <a:bodyPr spcFirstLastPara="0" vert="horz" wrap="square" lIns="60960" tIns="60960" rIns="60960" bIns="60960" numCol="1" spcCol="1270" anchor="ctr" anchorCtr="0">
-          <a:noAutofit/>
-        </a:bodyPr>
-        <a:lstStyle/>
-        <a:p>
-          <a:pPr lvl="0" algn="ctr" defTabSz="711200">
-            <a:lnSpc>
-              <a:spcPct val="90000"/>
-            </a:lnSpc>
-            <a:spcBef>
-              <a:spcPct val="0"/>
-            </a:spcBef>
-            <a:spcAft>
-              <a:spcPct val="35000"/>
-            </a:spcAft>
-          </a:pPr>
-          <a:r>
-            <a:rPr lang="fr-FR" sz="1600" kern="1200" dirty="0" smtClean="0"/>
-            <a:t>Matériel V2</a:t>
-          </a:r>
-          <a:endParaRPr lang="fr-FR" sz="1600" kern="1200" dirty="0"/>
-        </a:p>
-      </dsp:txBody>
-      <dsp:txXfrm>
-        <a:off x="2058921" y="1390937"/>
-        <a:ext cx="2996245" cy="595935"/>
-      </dsp:txXfrm>
-    </dsp:sp>
-    <dsp:sp modelId="{88768B6E-E3E6-46A6-A444-40AD01521686}">
-      <dsp:nvSpPr>
-        <dsp:cNvPr id="0" name=""/>
-        <dsp:cNvSpPr/>
-      </dsp:nvSpPr>
-      <dsp:spPr>
-        <a:xfrm>
-          <a:off x="2040381" y="686208"/>
-          <a:ext cx="3033325" cy="633015"/>
-        </a:xfrm>
-        <a:prstGeom prst="roundRect">
-          <a:avLst>
-            <a:gd name="adj" fmla="val 10000"/>
-          </a:avLst>
-        </a:prstGeom>
-        <a:solidFill>
-          <a:schemeClr val="accent4"/>
-        </a:solidFill>
-        <a:ln w="25400" cap="flat" cmpd="sng" algn="ctr">
-          <a:solidFill>
-            <a:schemeClr val="accent4">
-              <a:shade val="50000"/>
-            </a:schemeClr>
-          </a:solidFill>
-          <a:prstDash val="solid"/>
-        </a:ln>
-        <a:effectLst/>
-      </dsp:spPr>
-      <dsp:style>
-        <a:lnRef idx="2">
-          <a:schemeClr val="accent4">
-            <a:shade val="50000"/>
-          </a:schemeClr>
-        </a:lnRef>
-        <a:fillRef idx="1">
-          <a:schemeClr val="accent4"/>
-        </a:fillRef>
-        <a:effectRef idx="0">
-          <a:schemeClr val="accent4"/>
-        </a:effectRef>
-        <a:fontRef idx="minor">
-          <a:schemeClr val="lt1"/>
-        </a:fontRef>
-      </dsp:style>
-      <dsp:txBody>
-        <a:bodyPr spcFirstLastPara="0" vert="horz" wrap="square" lIns="60960" tIns="60960" rIns="60960" bIns="60960" numCol="1" spcCol="1270" anchor="ctr" anchorCtr="0">
-          <a:noAutofit/>
-        </a:bodyPr>
-        <a:lstStyle/>
-        <a:p>
-          <a:pPr lvl="0" algn="ctr" defTabSz="711200">
-            <a:lnSpc>
-              <a:spcPct val="90000"/>
-            </a:lnSpc>
-            <a:spcBef>
-              <a:spcPct val="0"/>
-            </a:spcBef>
-            <a:spcAft>
-              <a:spcPct val="35000"/>
-            </a:spcAft>
-          </a:pPr>
-          <a:r>
-            <a:rPr lang="fr-FR" sz="1600" kern="1200" dirty="0" smtClean="0"/>
-            <a:t>OS 2</a:t>
-          </a:r>
-          <a:endParaRPr lang="fr-FR" sz="1600" kern="1200" dirty="0"/>
-        </a:p>
-      </dsp:txBody>
-      <dsp:txXfrm>
-        <a:off x="2058921" y="704748"/>
-        <a:ext cx="2996245" cy="595935"/>
-      </dsp:txXfrm>
-    </dsp:sp>
-    <dsp:sp modelId="{7C85E38F-9729-4BF7-82D7-C837F3D2E167}">
-      <dsp:nvSpPr>
-        <dsp:cNvPr id="0" name=""/>
-        <dsp:cNvSpPr/>
-      </dsp:nvSpPr>
-      <dsp:spPr>
-        <a:xfrm>
-          <a:off x="2040381" y="19"/>
-          <a:ext cx="997148" cy="633015"/>
-        </a:xfrm>
-        <a:prstGeom prst="roundRect">
-          <a:avLst>
-            <a:gd name="adj" fmla="val 10000"/>
-          </a:avLst>
-        </a:prstGeom>
-        <a:solidFill>
-          <a:schemeClr val="accent3"/>
-        </a:solidFill>
-        <a:ln w="25400" cap="flat" cmpd="sng" algn="ctr">
-          <a:solidFill>
-            <a:schemeClr val="accent3">
-              <a:shade val="50000"/>
-            </a:schemeClr>
-          </a:solidFill>
-          <a:prstDash val="solid"/>
-        </a:ln>
-        <a:effectLst/>
-      </dsp:spPr>
-      <dsp:style>
-        <a:lnRef idx="2">
-          <a:schemeClr val="accent3">
-            <a:shade val="50000"/>
-          </a:schemeClr>
-        </a:lnRef>
-        <a:fillRef idx="1">
-          <a:schemeClr val="accent3"/>
-        </a:fillRef>
-        <a:effectRef idx="0">
-          <a:schemeClr val="accent3"/>
-        </a:effectRef>
-        <a:fontRef idx="minor">
-          <a:schemeClr val="lt1"/>
-        </a:fontRef>
-      </dsp:style>
-      <dsp:txBody>
-        <a:bodyPr spcFirstLastPara="0" vert="horz" wrap="square" lIns="60960" tIns="60960" rIns="60960" bIns="60960" numCol="1" spcCol="1270" anchor="ctr" anchorCtr="0">
-          <a:noAutofit/>
-        </a:bodyPr>
-        <a:lstStyle/>
-        <a:p>
-          <a:pPr lvl="0" algn="ctr" defTabSz="711200">
-            <a:lnSpc>
-              <a:spcPct val="90000"/>
-            </a:lnSpc>
-            <a:spcBef>
-              <a:spcPct val="0"/>
-            </a:spcBef>
-            <a:spcAft>
-              <a:spcPct val="35000"/>
-            </a:spcAft>
-          </a:pPr>
-          <a:r>
-            <a:rPr lang="fr-FR" sz="1600" kern="1200" dirty="0" smtClean="0"/>
-            <a:t>App C</a:t>
-          </a:r>
-          <a:endParaRPr lang="fr-FR" sz="1600" kern="1200" dirty="0"/>
-        </a:p>
-      </dsp:txBody>
-      <dsp:txXfrm>
-        <a:off x="2058921" y="18559"/>
-        <a:ext cx="960068" cy="595935"/>
-      </dsp:txXfrm>
-    </dsp:sp>
-    <dsp:sp modelId="{C8DAD4FD-39BC-4BAE-953F-EBDC79C48CB3}">
-      <dsp:nvSpPr>
-        <dsp:cNvPr id="0" name=""/>
-        <dsp:cNvSpPr/>
-      </dsp:nvSpPr>
-      <dsp:spPr>
-        <a:xfrm>
-          <a:off x="3058470" y="19"/>
-          <a:ext cx="997148" cy="633015"/>
-        </a:xfrm>
-        <a:prstGeom prst="roundRect">
-          <a:avLst>
-            <a:gd name="adj" fmla="val 10000"/>
-          </a:avLst>
-        </a:prstGeom>
-        <a:solidFill>
-          <a:schemeClr val="accent3"/>
-        </a:solidFill>
-        <a:ln w="25400" cap="flat" cmpd="sng" algn="ctr">
-          <a:solidFill>
-            <a:schemeClr val="accent3">
-              <a:shade val="50000"/>
-            </a:schemeClr>
-          </a:solidFill>
-          <a:prstDash val="solid"/>
-        </a:ln>
-        <a:effectLst/>
-      </dsp:spPr>
-      <dsp:style>
-        <a:lnRef idx="2">
-          <a:schemeClr val="accent3">
-            <a:shade val="50000"/>
-          </a:schemeClr>
-        </a:lnRef>
-        <a:fillRef idx="1">
-          <a:schemeClr val="accent3"/>
-        </a:fillRef>
-        <a:effectRef idx="0">
-          <a:schemeClr val="accent3"/>
-        </a:effectRef>
-        <a:fontRef idx="minor">
-          <a:schemeClr val="lt1"/>
-        </a:fontRef>
-      </dsp:style>
-      <dsp:txBody>
-        <a:bodyPr spcFirstLastPara="0" vert="horz" wrap="square" lIns="60960" tIns="60960" rIns="60960" bIns="60960" numCol="1" spcCol="1270" anchor="ctr" anchorCtr="0">
-          <a:noAutofit/>
-        </a:bodyPr>
-        <a:lstStyle/>
-        <a:p>
-          <a:pPr lvl="0" algn="ctr" defTabSz="711200">
-            <a:lnSpc>
-              <a:spcPct val="90000"/>
-            </a:lnSpc>
-            <a:spcBef>
-              <a:spcPct val="0"/>
-            </a:spcBef>
-            <a:spcAft>
-              <a:spcPct val="35000"/>
-            </a:spcAft>
-          </a:pPr>
-          <a:r>
-            <a:rPr lang="fr-FR" sz="1600" kern="1200" dirty="0" smtClean="0"/>
-            <a:t>App  D</a:t>
-          </a:r>
-          <a:endParaRPr lang="fr-FR" sz="1600" kern="1200" dirty="0"/>
-        </a:p>
-      </dsp:txBody>
-      <dsp:txXfrm>
-        <a:off x="3077010" y="18559"/>
-        <a:ext cx="960068" cy="595935"/>
-      </dsp:txXfrm>
-    </dsp:sp>
-    <dsp:sp modelId="{A0B5AD7C-2DFA-4B34-8132-7DCFAE4E3006}">
-      <dsp:nvSpPr>
-        <dsp:cNvPr id="0" name=""/>
-        <dsp:cNvSpPr/>
-      </dsp:nvSpPr>
-      <dsp:spPr>
-        <a:xfrm>
-          <a:off x="4076558" y="19"/>
-          <a:ext cx="997148" cy="633015"/>
-        </a:xfrm>
-        <a:prstGeom prst="roundRect">
-          <a:avLst>
-            <a:gd name="adj" fmla="val 10000"/>
-          </a:avLst>
-        </a:prstGeom>
-        <a:solidFill>
-          <a:schemeClr val="accent3"/>
-        </a:solidFill>
-        <a:ln w="25400" cap="flat" cmpd="sng" algn="ctr">
-          <a:solidFill>
-            <a:schemeClr val="accent3">
-              <a:shade val="50000"/>
-            </a:schemeClr>
-          </a:solidFill>
-          <a:prstDash val="solid"/>
-        </a:ln>
-        <a:effectLst/>
-      </dsp:spPr>
-      <dsp:style>
-        <a:lnRef idx="2">
-          <a:schemeClr val="accent3">
-            <a:shade val="50000"/>
-          </a:schemeClr>
-        </a:lnRef>
-        <a:fillRef idx="1">
-          <a:schemeClr val="accent3"/>
-        </a:fillRef>
-        <a:effectRef idx="0">
-          <a:schemeClr val="accent3"/>
-        </a:effectRef>
-        <a:fontRef idx="minor">
-          <a:schemeClr val="lt1"/>
-        </a:fontRef>
-      </dsp:style>
-      <dsp:txBody>
-        <a:bodyPr spcFirstLastPara="0" vert="horz" wrap="square" lIns="60960" tIns="60960" rIns="60960" bIns="60960" numCol="1" spcCol="1270" anchor="ctr" anchorCtr="0">
-          <a:noAutofit/>
-        </a:bodyPr>
-        <a:lstStyle/>
-        <a:p>
-          <a:pPr lvl="0" algn="ctr" defTabSz="711200">
-            <a:lnSpc>
-              <a:spcPct val="90000"/>
-            </a:lnSpc>
-            <a:spcBef>
-              <a:spcPct val="0"/>
-            </a:spcBef>
-            <a:spcAft>
-              <a:spcPct val="35000"/>
-            </a:spcAft>
-          </a:pPr>
-          <a:r>
-            <a:rPr lang="fr-FR" sz="1600" kern="1200" dirty="0" smtClean="0"/>
-            <a:t>App E</a:t>
-          </a:r>
-          <a:endParaRPr lang="fr-FR" sz="1600" kern="1200" dirty="0"/>
-        </a:p>
-      </dsp:txBody>
-      <dsp:txXfrm>
-        <a:off x="4095098" y="18559"/>
-        <a:ext cx="960068" cy="595935"/>
-      </dsp:txXfrm>
-    </dsp:sp>
-    <dsp:sp modelId="{6461C92D-485D-43C3-8F45-18BA77B3D0A1}">
-      <dsp:nvSpPr>
-        <dsp:cNvPr id="0" name=""/>
-        <dsp:cNvSpPr/>
-      </dsp:nvSpPr>
-      <dsp:spPr>
-        <a:xfrm>
-          <a:off x="5094647" y="1372397"/>
-          <a:ext cx="997148" cy="633015"/>
-        </a:xfrm>
-        <a:prstGeom prst="roundRect">
-          <a:avLst>
-            <a:gd name="adj" fmla="val 10000"/>
-          </a:avLst>
-        </a:prstGeom>
-        <a:solidFill>
-          <a:schemeClr val="accent6"/>
-        </a:solidFill>
-        <a:ln w="25400" cap="flat" cmpd="sng" algn="ctr">
-          <a:solidFill>
-            <a:schemeClr val="accent6">
-              <a:shade val="50000"/>
-            </a:schemeClr>
-          </a:solidFill>
-          <a:prstDash val="solid"/>
-        </a:ln>
-        <a:effectLst/>
-      </dsp:spPr>
-      <dsp:style>
-        <a:lnRef idx="2">
-          <a:schemeClr val="accent6">
-            <a:shade val="50000"/>
-          </a:schemeClr>
-        </a:lnRef>
-        <a:fillRef idx="1">
-          <a:schemeClr val="accent6"/>
-        </a:fillRef>
-        <a:effectRef idx="0">
-          <a:schemeClr val="accent6"/>
-        </a:effectRef>
-        <a:fontRef idx="minor">
-          <a:schemeClr val="lt1"/>
-        </a:fontRef>
-      </dsp:style>
-      <dsp:txBody>
-        <a:bodyPr spcFirstLastPara="0" vert="horz" wrap="square" lIns="60960" tIns="60960" rIns="60960" bIns="60960" numCol="1" spcCol="1270" anchor="ctr" anchorCtr="0">
-          <a:noAutofit/>
-        </a:bodyPr>
-        <a:lstStyle/>
-        <a:p>
-          <a:pPr lvl="0" algn="ctr" defTabSz="711200">
-            <a:lnSpc>
-              <a:spcPct val="90000"/>
-            </a:lnSpc>
-            <a:spcBef>
-              <a:spcPct val="0"/>
-            </a:spcBef>
-            <a:spcAft>
-              <a:spcPct val="35000"/>
-            </a:spcAft>
-          </a:pPr>
-          <a:r>
-            <a:rPr lang="fr-FR" sz="1600" kern="1200" dirty="0" smtClean="0"/>
-            <a:t>Matériel V3</a:t>
-          </a:r>
-          <a:endParaRPr lang="fr-FR" sz="1600" kern="1200" dirty="0"/>
-        </a:p>
-      </dsp:txBody>
-      <dsp:txXfrm>
-        <a:off x="5113187" y="1390937"/>
-        <a:ext cx="960068" cy="595935"/>
-      </dsp:txXfrm>
-    </dsp:sp>
-    <dsp:sp modelId="{0F6251B7-B9B9-41E4-9D33-7E1322AFC0FC}">
-      <dsp:nvSpPr>
-        <dsp:cNvPr id="0" name=""/>
-        <dsp:cNvSpPr/>
-      </dsp:nvSpPr>
-      <dsp:spPr>
-        <a:xfrm>
-          <a:off x="5094647" y="686208"/>
-          <a:ext cx="997148" cy="633015"/>
-        </a:xfrm>
-        <a:prstGeom prst="roundRect">
-          <a:avLst>
-            <a:gd name="adj" fmla="val 10000"/>
-          </a:avLst>
-        </a:prstGeom>
-        <a:solidFill>
-          <a:schemeClr val="accent4"/>
-        </a:solidFill>
-        <a:ln w="25400" cap="flat" cmpd="sng" algn="ctr">
-          <a:solidFill>
-            <a:schemeClr val="accent4">
-              <a:shade val="50000"/>
-            </a:schemeClr>
-          </a:solidFill>
-          <a:prstDash val="solid"/>
-        </a:ln>
-        <a:effectLst/>
-      </dsp:spPr>
-      <dsp:style>
-        <a:lnRef idx="2">
-          <a:schemeClr val="accent4">
-            <a:shade val="50000"/>
-          </a:schemeClr>
-        </a:lnRef>
-        <a:fillRef idx="1">
-          <a:schemeClr val="accent4"/>
-        </a:fillRef>
-        <a:effectRef idx="0">
-          <a:schemeClr val="accent4"/>
-        </a:effectRef>
-        <a:fontRef idx="minor">
-          <a:schemeClr val="lt1"/>
-        </a:fontRef>
-      </dsp:style>
-      <dsp:txBody>
-        <a:bodyPr spcFirstLastPara="0" vert="horz" wrap="square" lIns="60960" tIns="60960" rIns="60960" bIns="60960" numCol="1" spcCol="1270" anchor="ctr" anchorCtr="0">
-          <a:noAutofit/>
-        </a:bodyPr>
-        <a:lstStyle/>
-        <a:p>
-          <a:pPr lvl="0" algn="ctr" defTabSz="711200">
-            <a:lnSpc>
-              <a:spcPct val="90000"/>
-            </a:lnSpc>
-            <a:spcBef>
-              <a:spcPct val="0"/>
-            </a:spcBef>
-            <a:spcAft>
-              <a:spcPct val="35000"/>
-            </a:spcAft>
-          </a:pPr>
-          <a:r>
-            <a:rPr lang="fr-FR" sz="1600" kern="1200" dirty="0" smtClean="0"/>
-            <a:t>OS 3</a:t>
-          </a:r>
-          <a:endParaRPr lang="fr-FR" sz="1600" kern="1200" dirty="0"/>
-        </a:p>
-      </dsp:txBody>
-      <dsp:txXfrm>
-        <a:off x="5113187" y="704748"/>
-        <a:ext cx="960068" cy="595935"/>
-      </dsp:txXfrm>
-    </dsp:sp>
-    <dsp:sp modelId="{7196DF31-6366-497B-AA87-E553EC0F0266}">
-      <dsp:nvSpPr>
-        <dsp:cNvPr id="0" name=""/>
-        <dsp:cNvSpPr/>
-      </dsp:nvSpPr>
-      <dsp:spPr>
-        <a:xfrm>
-          <a:off x="5094647" y="19"/>
-          <a:ext cx="997148" cy="633015"/>
-        </a:xfrm>
-        <a:prstGeom prst="roundRect">
-          <a:avLst>
-            <a:gd name="adj" fmla="val 10000"/>
-          </a:avLst>
-        </a:prstGeom>
-        <a:solidFill>
-          <a:schemeClr val="accent3"/>
-        </a:solidFill>
-        <a:ln w="25400" cap="flat" cmpd="sng" algn="ctr">
-          <a:solidFill>
-            <a:schemeClr val="accent3">
-              <a:shade val="50000"/>
-            </a:schemeClr>
-          </a:solidFill>
-          <a:prstDash val="solid"/>
-        </a:ln>
-        <a:effectLst/>
-      </dsp:spPr>
-      <dsp:style>
-        <a:lnRef idx="2">
-          <a:schemeClr val="accent3">
-            <a:shade val="50000"/>
-          </a:schemeClr>
-        </a:lnRef>
-        <a:fillRef idx="1">
-          <a:schemeClr val="accent3"/>
-        </a:fillRef>
-        <a:effectRef idx="0">
-          <a:schemeClr val="accent3"/>
-        </a:effectRef>
-        <a:fontRef idx="minor">
-          <a:schemeClr val="lt1"/>
-        </a:fontRef>
-      </dsp:style>
-      <dsp:txBody>
-        <a:bodyPr spcFirstLastPara="0" vert="horz" wrap="square" lIns="60960" tIns="60960" rIns="60960" bIns="60960" numCol="1" spcCol="1270" anchor="ctr" anchorCtr="0">
-          <a:noAutofit/>
-        </a:bodyPr>
-        <a:lstStyle/>
-        <a:p>
-          <a:pPr lvl="0" algn="ctr" defTabSz="711200">
-            <a:lnSpc>
-              <a:spcPct val="90000"/>
-            </a:lnSpc>
-            <a:spcBef>
-              <a:spcPct val="0"/>
-            </a:spcBef>
-            <a:spcAft>
-              <a:spcPct val="35000"/>
-            </a:spcAft>
-          </a:pPr>
-          <a:r>
-            <a:rPr lang="fr-FR" sz="1600" kern="1200" dirty="0" smtClean="0"/>
-            <a:t>App F</a:t>
-          </a:r>
-          <a:endParaRPr lang="fr-FR" sz="1600" kern="1200" dirty="0"/>
-        </a:p>
-      </dsp:txBody>
-      <dsp:txXfrm>
-        <a:off x="5113187" y="18559"/>
-        <a:ext cx="960068" cy="595935"/>
-      </dsp:txXfrm>
-    </dsp:sp>
   </dsp:spTree>
 </dsp:drawing>
 </file>
@@ -27934,7 +26836,7 @@
           <a:p>
             <a:fld id="{B511EEBD-DB93-4DB6-9ADA-68547254FD74}" type="datetimeFigureOut">
               <a:rPr lang="fr-FR" smtClean="0"/>
-              <a:t>18/11/2014</a:t>
+              <a:t>19/11/2014</a:t>
             </a:fld>
             <a:endParaRPr lang="fr-FR"/>
           </a:p>
@@ -28104,7 +27006,7 @@
           <a:p>
             <a:fld id="{B511EEBD-DB93-4DB6-9ADA-68547254FD74}" type="datetimeFigureOut">
               <a:rPr lang="fr-FR" smtClean="0"/>
-              <a:t>18/11/2014</a:t>
+              <a:t>19/11/2014</a:t>
             </a:fld>
             <a:endParaRPr lang="fr-FR"/>
           </a:p>
@@ -28284,7 +27186,7 @@
           <a:p>
             <a:fld id="{B511EEBD-DB93-4DB6-9ADA-68547254FD74}" type="datetimeFigureOut">
               <a:rPr lang="fr-FR" smtClean="0"/>
-              <a:t>18/11/2014</a:t>
+              <a:t>19/11/2014</a:t>
             </a:fld>
             <a:endParaRPr lang="fr-FR"/>
           </a:p>
@@ -28454,7 +27356,7 @@
           <a:p>
             <a:fld id="{B511EEBD-DB93-4DB6-9ADA-68547254FD74}" type="datetimeFigureOut">
               <a:rPr lang="fr-FR" smtClean="0"/>
-              <a:t>18/11/2014</a:t>
+              <a:t>19/11/2014</a:t>
             </a:fld>
             <a:endParaRPr lang="fr-FR"/>
           </a:p>
@@ -28700,7 +27602,7 @@
           <a:p>
             <a:fld id="{B511EEBD-DB93-4DB6-9ADA-68547254FD74}" type="datetimeFigureOut">
               <a:rPr lang="fr-FR" smtClean="0"/>
-              <a:t>18/11/2014</a:t>
+              <a:t>19/11/2014</a:t>
             </a:fld>
             <a:endParaRPr lang="fr-FR"/>
           </a:p>
@@ -28988,7 +27890,7 @@
           <a:p>
             <a:fld id="{B511EEBD-DB93-4DB6-9ADA-68547254FD74}" type="datetimeFigureOut">
               <a:rPr lang="fr-FR" smtClean="0"/>
-              <a:t>18/11/2014</a:t>
+              <a:t>19/11/2014</a:t>
             </a:fld>
             <a:endParaRPr lang="fr-FR"/>
           </a:p>
@@ -29410,7 +28312,7 @@
           <a:p>
             <a:fld id="{B511EEBD-DB93-4DB6-9ADA-68547254FD74}" type="datetimeFigureOut">
               <a:rPr lang="fr-FR" smtClean="0"/>
-              <a:t>18/11/2014</a:t>
+              <a:t>19/11/2014</a:t>
             </a:fld>
             <a:endParaRPr lang="fr-FR"/>
           </a:p>
@@ -29528,7 +28430,7 @@
           <a:p>
             <a:fld id="{B511EEBD-DB93-4DB6-9ADA-68547254FD74}" type="datetimeFigureOut">
               <a:rPr lang="fr-FR" smtClean="0"/>
-              <a:t>18/11/2014</a:t>
+              <a:t>19/11/2014</a:t>
             </a:fld>
             <a:endParaRPr lang="fr-FR"/>
           </a:p>
@@ -29623,7 +28525,7 @@
           <a:p>
             <a:fld id="{B511EEBD-DB93-4DB6-9ADA-68547254FD74}" type="datetimeFigureOut">
               <a:rPr lang="fr-FR" smtClean="0"/>
-              <a:t>18/11/2014</a:t>
+              <a:t>19/11/2014</a:t>
             </a:fld>
             <a:endParaRPr lang="fr-FR"/>
           </a:p>
@@ -29900,7 +28802,7 @@
           <a:p>
             <a:fld id="{B511EEBD-DB93-4DB6-9ADA-68547254FD74}" type="datetimeFigureOut">
               <a:rPr lang="fr-FR" smtClean="0"/>
-              <a:t>18/11/2014</a:t>
+              <a:t>19/11/2014</a:t>
             </a:fld>
             <a:endParaRPr lang="fr-FR"/>
           </a:p>
@@ -30153,7 +29055,7 @@
           <a:p>
             <a:fld id="{B511EEBD-DB93-4DB6-9ADA-68547254FD74}" type="datetimeFigureOut">
               <a:rPr lang="fr-FR" smtClean="0"/>
-              <a:t>18/11/2014</a:t>
+              <a:t>19/11/2014</a:t>
             </a:fld>
             <a:endParaRPr lang="fr-FR"/>
           </a:p>
@@ -30366,7 +29268,7 @@
           <a:p>
             <a:fld id="{B511EEBD-DB93-4DB6-9ADA-68547254FD74}" type="datetimeFigureOut">
               <a:rPr lang="fr-FR" smtClean="0"/>
-              <a:t>18/11/2014</a:t>
+              <a:t>19/11/2014</a:t>
             </a:fld>
             <a:endParaRPr lang="fr-FR"/>
           </a:p>
@@ -31199,10 +30101,1447 @@
           <a:chExt cx="0" cy="0"/>
         </a:xfrm>
       </p:grpSpPr>
+      <p:sp>
+        <p:nvSpPr>
+          <p:cNvPr id="2" name="Nuage 1"/>
+          <p:cNvSpPr/>
+          <p:nvPr/>
+        </p:nvSpPr>
+        <p:spPr>
+          <a:xfrm>
+            <a:off x="395536" y="980728"/>
+            <a:ext cx="8280920" cy="1872208"/>
+          </a:xfrm>
+          <a:prstGeom prst="cloud">
+            <a:avLst/>
+          </a:prstGeom>
+        </p:spPr>
+        <p:style>
+          <a:lnRef idx="2">
+            <a:schemeClr val="accent6"/>
+          </a:lnRef>
+          <a:fillRef idx="1">
+            <a:schemeClr val="lt1"/>
+          </a:fillRef>
+          <a:effectRef idx="0">
+            <a:schemeClr val="accent6"/>
+          </a:effectRef>
+          <a:fontRef idx="minor">
+            <a:schemeClr val="dk1"/>
+          </a:fontRef>
+        </p:style>
+        <p:txBody>
+          <a:bodyPr rtlCol="0" anchor="ctr"/>
+          <a:lstStyle/>
+          <a:p>
+            <a:pPr algn="ctr"/>
+            <a:r>
+              <a:rPr lang="fr-FR" sz="4400" dirty="0" smtClean="0"/>
+              <a:t>?</a:t>
+            </a:r>
+            <a:endParaRPr lang="fr-FR" sz="4400" dirty="0"/>
+          </a:p>
+        </p:txBody>
+      </p:sp>
+      <p:sp>
+        <p:nvSpPr>
+          <p:cNvPr id="3" name="Nuage 2"/>
+          <p:cNvSpPr/>
+          <p:nvPr/>
+        </p:nvSpPr>
+        <p:spPr>
+          <a:xfrm>
+            <a:off x="378590" y="3861048"/>
+            <a:ext cx="8280920" cy="1872208"/>
+          </a:xfrm>
+          <a:prstGeom prst="cloud">
+            <a:avLst/>
+          </a:prstGeom>
+        </p:spPr>
+        <p:style>
+          <a:lnRef idx="2">
+            <a:schemeClr val="accent6"/>
+          </a:lnRef>
+          <a:fillRef idx="1">
+            <a:schemeClr val="lt1"/>
+          </a:fillRef>
+          <a:effectRef idx="0">
+            <a:schemeClr val="accent6"/>
+          </a:effectRef>
+          <a:fontRef idx="minor">
+            <a:schemeClr val="dk1"/>
+          </a:fontRef>
+        </p:style>
+        <p:txBody>
+          <a:bodyPr rtlCol="0" anchor="ctr"/>
+          <a:lstStyle/>
+          <a:p>
+            <a:pPr algn="ctr"/>
+            <a:r>
+              <a:rPr lang="fr-FR" sz="4400" dirty="0" smtClean="0"/>
+              <a:t>?</a:t>
+            </a:r>
+            <a:endParaRPr lang="fr-FR" sz="4400" dirty="0"/>
+          </a:p>
+        </p:txBody>
+      </p:sp>
+      <p:sp>
+        <p:nvSpPr>
+          <p:cNvPr id="4" name="Émoticône 3"/>
+          <p:cNvSpPr/>
+          <p:nvPr/>
+        </p:nvSpPr>
+        <p:spPr>
+          <a:xfrm>
+            <a:off x="3995936" y="188640"/>
+            <a:ext cx="720080" cy="720080"/>
+          </a:xfrm>
+          <a:prstGeom prst="smileyFace">
+            <a:avLst/>
+          </a:prstGeom>
+        </p:spPr>
+        <p:style>
+          <a:lnRef idx="2">
+            <a:schemeClr val="accent1">
+              <a:shade val="50000"/>
+            </a:schemeClr>
+          </a:lnRef>
+          <a:fillRef idx="1">
+            <a:schemeClr val="accent1"/>
+          </a:fillRef>
+          <a:effectRef idx="0">
+            <a:schemeClr val="accent1"/>
+          </a:effectRef>
+          <a:fontRef idx="minor">
+            <a:schemeClr val="lt1"/>
+          </a:fontRef>
+        </p:style>
+        <p:txBody>
+          <a:bodyPr rtlCol="0" anchor="ctr"/>
+          <a:lstStyle/>
+          <a:p>
+            <a:pPr algn="ctr"/>
+            <a:endParaRPr lang="fr-FR"/>
+          </a:p>
+        </p:txBody>
+      </p:sp>
+      <p:sp>
+        <p:nvSpPr>
+          <p:cNvPr id="5" name="Rectangle à coins arrondis 4"/>
+          <p:cNvSpPr/>
+          <p:nvPr/>
+        </p:nvSpPr>
+        <p:spPr>
+          <a:xfrm>
+            <a:off x="1619672" y="2492896"/>
+            <a:ext cx="2160240" cy="1512168"/>
+          </a:xfrm>
+          <a:prstGeom prst="roundRect">
+            <a:avLst/>
+          </a:prstGeom>
+        </p:spPr>
+        <p:style>
+          <a:lnRef idx="2">
+            <a:schemeClr val="accent3">
+              <a:shade val="50000"/>
+            </a:schemeClr>
+          </a:lnRef>
+          <a:fillRef idx="1">
+            <a:schemeClr val="accent3"/>
+          </a:fillRef>
+          <a:effectRef idx="0">
+            <a:schemeClr val="accent3"/>
+          </a:effectRef>
+          <a:fontRef idx="minor">
+            <a:schemeClr val="lt1"/>
+          </a:fontRef>
+        </p:style>
+        <p:txBody>
+          <a:bodyPr rtlCol="0" anchor="ctr"/>
+          <a:lstStyle/>
+          <a:p>
+            <a:pPr algn="ctr"/>
+            <a:r>
+              <a:rPr lang="fr-FR" dirty="0" err="1" smtClean="0"/>
+              <a:t>Géoserveur</a:t>
+            </a:r>
+            <a:r>
+              <a:rPr lang="fr-FR" dirty="0" smtClean="0"/>
+              <a:t> 1</a:t>
+            </a:r>
+            <a:endParaRPr lang="fr-FR" dirty="0"/>
+          </a:p>
+        </p:txBody>
+      </p:sp>
+      <p:sp>
+        <p:nvSpPr>
+          <p:cNvPr id="6" name="Rectangle à coins arrondis 5"/>
+          <p:cNvSpPr/>
+          <p:nvPr/>
+        </p:nvSpPr>
+        <p:spPr>
+          <a:xfrm>
+            <a:off x="5148064" y="2492896"/>
+            <a:ext cx="2160240" cy="1512168"/>
+          </a:xfrm>
+          <a:prstGeom prst="roundRect">
+            <a:avLst/>
+          </a:prstGeom>
+        </p:spPr>
+        <p:style>
+          <a:lnRef idx="2">
+            <a:schemeClr val="accent3">
+              <a:shade val="50000"/>
+            </a:schemeClr>
+          </a:lnRef>
+          <a:fillRef idx="1">
+            <a:schemeClr val="accent3"/>
+          </a:fillRef>
+          <a:effectRef idx="0">
+            <a:schemeClr val="accent3"/>
+          </a:effectRef>
+          <a:fontRef idx="minor">
+            <a:schemeClr val="lt1"/>
+          </a:fontRef>
+        </p:style>
+        <p:txBody>
+          <a:bodyPr rtlCol="0" anchor="ctr"/>
+          <a:lstStyle/>
+          <a:p>
+            <a:pPr algn="ctr"/>
+            <a:r>
+              <a:rPr lang="fr-FR" dirty="0" err="1" smtClean="0"/>
+              <a:t>Géoserveur</a:t>
+            </a:r>
+            <a:r>
+              <a:rPr lang="fr-FR" dirty="0" smtClean="0"/>
+              <a:t> 2</a:t>
+            </a:r>
+            <a:endParaRPr lang="fr-FR" dirty="0"/>
+          </a:p>
+        </p:txBody>
+      </p:sp>
+      <p:sp>
+        <p:nvSpPr>
+          <p:cNvPr id="7" name="Organigramme : Disque magnétique 6"/>
+          <p:cNvSpPr/>
+          <p:nvPr/>
+        </p:nvSpPr>
+        <p:spPr>
+          <a:xfrm>
+            <a:off x="3419872" y="5301208"/>
+            <a:ext cx="1872208" cy="1224136"/>
+          </a:xfrm>
+          <a:prstGeom prst="flowChartMagneticDisk">
+            <a:avLst/>
+          </a:prstGeom>
+        </p:spPr>
+        <p:style>
+          <a:lnRef idx="2">
+            <a:schemeClr val="accent4">
+              <a:shade val="50000"/>
+            </a:schemeClr>
+          </a:lnRef>
+          <a:fillRef idx="1">
+            <a:schemeClr val="accent4"/>
+          </a:fillRef>
+          <a:effectRef idx="0">
+            <a:schemeClr val="accent4"/>
+          </a:effectRef>
+          <a:fontRef idx="minor">
+            <a:schemeClr val="lt1"/>
+          </a:fontRef>
+        </p:style>
+        <p:txBody>
+          <a:bodyPr rtlCol="0" anchor="ctr"/>
+          <a:lstStyle/>
+          <a:p>
+            <a:pPr algn="ctr"/>
+            <a:r>
+              <a:rPr lang="fr-FR" dirty="0" err="1" smtClean="0"/>
+              <a:t>PgSQL</a:t>
+            </a:r>
+            <a:r>
+              <a:rPr lang="fr-FR" dirty="0" smtClean="0"/>
+              <a:t> + </a:t>
+            </a:r>
+            <a:r>
+              <a:rPr lang="fr-FR" dirty="0" err="1" smtClean="0"/>
+              <a:t>PostGIS</a:t>
+            </a:r>
+            <a:endParaRPr lang="fr-FR" dirty="0"/>
+          </a:p>
+        </p:txBody>
+      </p:sp>
+      <p:cxnSp>
+        <p:nvCxnSpPr>
+          <p:cNvPr id="9" name="Connecteur droit 8"/>
+          <p:cNvCxnSpPr>
+            <a:stCxn id="5" idx="2"/>
+            <a:endCxn id="7" idx="1"/>
+          </p:cNvCxnSpPr>
+          <p:nvPr/>
+        </p:nvCxnSpPr>
+        <p:spPr>
+          <a:xfrm>
+            <a:off x="2699792" y="4005064"/>
+            <a:ext cx="1656184" cy="1296144"/>
+          </a:xfrm>
+          <a:prstGeom prst="line">
+            <a:avLst/>
+          </a:prstGeom>
+        </p:spPr>
+        <p:style>
+          <a:lnRef idx="2">
+            <a:schemeClr val="dk1"/>
+          </a:lnRef>
+          <a:fillRef idx="0">
+            <a:schemeClr val="dk1"/>
+          </a:fillRef>
+          <a:effectRef idx="1">
+            <a:schemeClr val="dk1"/>
+          </a:effectRef>
+          <a:fontRef idx="minor">
+            <a:schemeClr val="tx1"/>
+          </a:fontRef>
+        </p:style>
+      </p:cxnSp>
+      <p:cxnSp>
+        <p:nvCxnSpPr>
+          <p:cNvPr id="10" name="Connecteur droit 9"/>
+          <p:cNvCxnSpPr>
+            <a:stCxn id="6" idx="2"/>
+            <a:endCxn id="7" idx="1"/>
+          </p:cNvCxnSpPr>
+          <p:nvPr/>
+        </p:nvCxnSpPr>
+        <p:spPr>
+          <a:xfrm flipH="1">
+            <a:off x="4355976" y="4005064"/>
+            <a:ext cx="1872208" cy="1296144"/>
+          </a:xfrm>
+          <a:prstGeom prst="line">
+            <a:avLst/>
+          </a:prstGeom>
+        </p:spPr>
+        <p:style>
+          <a:lnRef idx="2">
+            <a:schemeClr val="dk1"/>
+          </a:lnRef>
+          <a:fillRef idx="0">
+            <a:schemeClr val="dk1"/>
+          </a:fillRef>
+          <a:effectRef idx="1">
+            <a:schemeClr val="dk1"/>
+          </a:effectRef>
+          <a:fontRef idx="minor">
+            <a:schemeClr val="tx1"/>
+          </a:fontRef>
+        </p:style>
+      </p:cxnSp>
+      <p:cxnSp>
+        <p:nvCxnSpPr>
+          <p:cNvPr id="13" name="Connecteur droit 12"/>
+          <p:cNvCxnSpPr>
+            <a:stCxn id="4" idx="4"/>
+            <a:endCxn id="5" idx="0"/>
+          </p:cNvCxnSpPr>
+          <p:nvPr/>
+        </p:nvCxnSpPr>
+        <p:spPr>
+          <a:xfrm flipH="1">
+            <a:off x="2699792" y="908720"/>
+            <a:ext cx="1656184" cy="1584176"/>
+          </a:xfrm>
+          <a:prstGeom prst="line">
+            <a:avLst/>
+          </a:prstGeom>
+        </p:spPr>
+        <p:style>
+          <a:lnRef idx="2">
+            <a:schemeClr val="dk1"/>
+          </a:lnRef>
+          <a:fillRef idx="0">
+            <a:schemeClr val="dk1"/>
+          </a:fillRef>
+          <a:effectRef idx="1">
+            <a:schemeClr val="dk1"/>
+          </a:effectRef>
+          <a:fontRef idx="minor">
+            <a:schemeClr val="tx1"/>
+          </a:fontRef>
+        </p:style>
+      </p:cxnSp>
+      <p:cxnSp>
+        <p:nvCxnSpPr>
+          <p:cNvPr id="16" name="Connecteur droit 15"/>
+          <p:cNvCxnSpPr>
+            <a:stCxn id="4" idx="4"/>
+            <a:endCxn id="6" idx="0"/>
+          </p:cNvCxnSpPr>
+          <p:nvPr/>
+        </p:nvCxnSpPr>
+        <p:spPr>
+          <a:xfrm>
+            <a:off x="4355976" y="908720"/>
+            <a:ext cx="1872208" cy="1584176"/>
+          </a:xfrm>
+          <a:prstGeom prst="line">
+            <a:avLst/>
+          </a:prstGeom>
+        </p:spPr>
+        <p:style>
+          <a:lnRef idx="2">
+            <a:schemeClr val="dk1"/>
+          </a:lnRef>
+          <a:fillRef idx="0">
+            <a:schemeClr val="dk1"/>
+          </a:fillRef>
+          <a:effectRef idx="1">
+            <a:schemeClr val="dk1"/>
+          </a:effectRef>
+          <a:fontRef idx="minor">
+            <a:schemeClr val="tx1"/>
+          </a:fontRef>
+        </p:style>
+      </p:cxnSp>
     </p:spTree>
     <p:extLst>
       <p:ext uri="{BB962C8B-B14F-4D97-AF65-F5344CB8AC3E}">
         <p14:creationId xmlns:p14="http://schemas.microsoft.com/office/powerpoint/2010/main" val="1013534168"/>
+      </p:ext>
+    </p:extLst>
+  </p:cSld>
+  <p:clrMapOvr>
+    <a:masterClrMapping/>
+  </p:clrMapOvr>
+</p:sld>
+</file>
+
+<file path=ppt/slides/slide18.xml><?xml version="1.0" encoding="utf-8"?>
+<p:sld xmlns:a="http://schemas.openxmlformats.org/drawingml/2006/main" xmlns:r="http://schemas.openxmlformats.org/officeDocument/2006/relationships" xmlns:p="http://schemas.openxmlformats.org/presentationml/2006/main">
+  <p:cSld>
+    <p:spTree>
+      <p:nvGrpSpPr>
+        <p:cNvPr id="1" name=""/>
+        <p:cNvGrpSpPr/>
+        <p:nvPr/>
+      </p:nvGrpSpPr>
+      <p:grpSpPr>
+        <a:xfrm>
+          <a:off x="0" y="0"/>
+          <a:ext cx="0" cy="0"/>
+          <a:chOff x="0" y="0"/>
+          <a:chExt cx="0" cy="0"/>
+        </a:xfrm>
+      </p:grpSpPr>
+      <p:sp>
+        <p:nvSpPr>
+          <p:cNvPr id="2" name="Rectangle à coins arrondis 1"/>
+          <p:cNvSpPr/>
+          <p:nvPr/>
+        </p:nvSpPr>
+        <p:spPr>
+          <a:xfrm>
+            <a:off x="1835696" y="917104"/>
+            <a:ext cx="1872208" cy="936104"/>
+          </a:xfrm>
+          <a:prstGeom prst="roundRect">
+            <a:avLst/>
+          </a:prstGeom>
+        </p:spPr>
+        <p:style>
+          <a:lnRef idx="2">
+            <a:schemeClr val="dk1">
+              <a:shade val="50000"/>
+            </a:schemeClr>
+          </a:lnRef>
+          <a:fillRef idx="1">
+            <a:schemeClr val="dk1"/>
+          </a:fillRef>
+          <a:effectRef idx="0">
+            <a:schemeClr val="dk1"/>
+          </a:effectRef>
+          <a:fontRef idx="minor">
+            <a:schemeClr val="lt1"/>
+          </a:fontRef>
+        </p:style>
+        <p:txBody>
+          <a:bodyPr rtlCol="0" anchor="ctr"/>
+          <a:lstStyle/>
+          <a:p>
+            <a:pPr algn="ctr"/>
+            <a:r>
+              <a:rPr lang="fr-FR" dirty="0" smtClean="0"/>
+              <a:t>App A</a:t>
+            </a:r>
+            <a:endParaRPr lang="fr-FR" dirty="0"/>
+          </a:p>
+        </p:txBody>
+      </p:sp>
+      <p:sp>
+        <p:nvSpPr>
+          <p:cNvPr id="3" name="Rectangle à coins arrondis 2"/>
+          <p:cNvSpPr/>
+          <p:nvPr/>
+        </p:nvSpPr>
+        <p:spPr>
+          <a:xfrm>
+            <a:off x="5148064" y="917104"/>
+            <a:ext cx="1872208" cy="936104"/>
+          </a:xfrm>
+          <a:prstGeom prst="roundRect">
+            <a:avLst/>
+          </a:prstGeom>
+        </p:spPr>
+        <p:style>
+          <a:lnRef idx="2">
+            <a:schemeClr val="accent1">
+              <a:shade val="50000"/>
+            </a:schemeClr>
+          </a:lnRef>
+          <a:fillRef idx="1">
+            <a:schemeClr val="accent1"/>
+          </a:fillRef>
+          <a:effectRef idx="0">
+            <a:schemeClr val="accent1"/>
+          </a:effectRef>
+          <a:fontRef idx="minor">
+            <a:schemeClr val="lt1"/>
+          </a:fontRef>
+        </p:style>
+        <p:txBody>
+          <a:bodyPr rtlCol="0" anchor="ctr"/>
+          <a:lstStyle/>
+          <a:p>
+            <a:pPr algn="ctr"/>
+            <a:r>
+              <a:rPr lang="fr-FR" dirty="0" smtClean="0"/>
+              <a:t>App B</a:t>
+            </a:r>
+            <a:endParaRPr lang="fr-FR" dirty="0"/>
+          </a:p>
+        </p:txBody>
+      </p:sp>
+      <p:sp>
+        <p:nvSpPr>
+          <p:cNvPr id="4" name="Rectangle à coins arrondis 3"/>
+          <p:cNvSpPr/>
+          <p:nvPr/>
+        </p:nvSpPr>
+        <p:spPr>
+          <a:xfrm>
+            <a:off x="683568" y="2979084"/>
+            <a:ext cx="1872208" cy="936104"/>
+          </a:xfrm>
+          <a:prstGeom prst="roundRect">
+            <a:avLst/>
+          </a:prstGeom>
+        </p:spPr>
+        <p:style>
+          <a:lnRef idx="2">
+            <a:schemeClr val="accent2">
+              <a:shade val="50000"/>
+            </a:schemeClr>
+          </a:lnRef>
+          <a:fillRef idx="1">
+            <a:schemeClr val="accent2"/>
+          </a:fillRef>
+          <a:effectRef idx="0">
+            <a:schemeClr val="accent2"/>
+          </a:effectRef>
+          <a:fontRef idx="minor">
+            <a:schemeClr val="lt1"/>
+          </a:fontRef>
+        </p:style>
+        <p:txBody>
+          <a:bodyPr rtlCol="0" anchor="ctr"/>
+          <a:lstStyle/>
+          <a:p>
+            <a:pPr algn="ctr"/>
+            <a:r>
+              <a:rPr lang="fr-FR" dirty="0" smtClean="0"/>
+              <a:t>App C</a:t>
+            </a:r>
+            <a:endParaRPr lang="fr-FR" dirty="0"/>
+          </a:p>
+        </p:txBody>
+      </p:sp>
+      <p:sp>
+        <p:nvSpPr>
+          <p:cNvPr id="5" name="Rectangle à coins arrondis 4"/>
+          <p:cNvSpPr/>
+          <p:nvPr/>
+        </p:nvSpPr>
+        <p:spPr>
+          <a:xfrm>
+            <a:off x="6732240" y="3059208"/>
+            <a:ext cx="1872208" cy="936104"/>
+          </a:xfrm>
+          <a:prstGeom prst="roundRect">
+            <a:avLst/>
+          </a:prstGeom>
+        </p:spPr>
+        <p:style>
+          <a:lnRef idx="2">
+            <a:schemeClr val="accent4">
+              <a:shade val="50000"/>
+            </a:schemeClr>
+          </a:lnRef>
+          <a:fillRef idx="1">
+            <a:schemeClr val="accent4"/>
+          </a:fillRef>
+          <a:effectRef idx="0">
+            <a:schemeClr val="accent4"/>
+          </a:effectRef>
+          <a:fontRef idx="minor">
+            <a:schemeClr val="lt1"/>
+          </a:fontRef>
+        </p:style>
+        <p:txBody>
+          <a:bodyPr rtlCol="0" anchor="ctr"/>
+          <a:lstStyle/>
+          <a:p>
+            <a:pPr algn="ctr"/>
+            <a:r>
+              <a:rPr lang="fr-FR" dirty="0" smtClean="0"/>
+              <a:t>App D</a:t>
+            </a:r>
+            <a:endParaRPr lang="fr-FR" dirty="0"/>
+          </a:p>
+        </p:txBody>
+      </p:sp>
+      <p:sp>
+        <p:nvSpPr>
+          <p:cNvPr id="6" name="Rectangle à coins arrondis 5"/>
+          <p:cNvSpPr/>
+          <p:nvPr/>
+        </p:nvSpPr>
+        <p:spPr>
+          <a:xfrm>
+            <a:off x="3743641" y="4772655"/>
+            <a:ext cx="1872208" cy="936104"/>
+          </a:xfrm>
+          <a:prstGeom prst="roundRect">
+            <a:avLst/>
+          </a:prstGeom>
+        </p:spPr>
+        <p:style>
+          <a:lnRef idx="2">
+            <a:schemeClr val="accent6">
+              <a:shade val="50000"/>
+            </a:schemeClr>
+          </a:lnRef>
+          <a:fillRef idx="1">
+            <a:schemeClr val="accent6"/>
+          </a:fillRef>
+          <a:effectRef idx="0">
+            <a:schemeClr val="accent6"/>
+          </a:effectRef>
+          <a:fontRef idx="minor">
+            <a:schemeClr val="lt1"/>
+          </a:fontRef>
+        </p:style>
+        <p:txBody>
+          <a:bodyPr rtlCol="0" anchor="ctr"/>
+          <a:lstStyle/>
+          <a:p>
+            <a:pPr algn="ctr"/>
+            <a:r>
+              <a:rPr lang="fr-FR" dirty="0" smtClean="0"/>
+              <a:t>App E</a:t>
+            </a:r>
+            <a:endParaRPr lang="fr-FR" dirty="0"/>
+          </a:p>
+        </p:txBody>
+      </p:sp>
+      <p:cxnSp>
+        <p:nvCxnSpPr>
+          <p:cNvPr id="8" name="Connecteur droit 7"/>
+          <p:cNvCxnSpPr>
+            <a:stCxn id="2" idx="2"/>
+            <a:endCxn id="4" idx="0"/>
+          </p:cNvCxnSpPr>
+          <p:nvPr/>
+        </p:nvCxnSpPr>
+        <p:spPr>
+          <a:xfrm flipH="1">
+            <a:off x="1619672" y="1853208"/>
+            <a:ext cx="1152128" cy="1125876"/>
+          </a:xfrm>
+          <a:prstGeom prst="line">
+            <a:avLst/>
+          </a:prstGeom>
+        </p:spPr>
+        <p:style>
+          <a:lnRef idx="1">
+            <a:schemeClr val="accent1"/>
+          </a:lnRef>
+          <a:fillRef idx="0">
+            <a:schemeClr val="accent1"/>
+          </a:fillRef>
+          <a:effectRef idx="0">
+            <a:schemeClr val="accent1"/>
+          </a:effectRef>
+          <a:fontRef idx="minor">
+            <a:schemeClr val="tx1"/>
+          </a:fontRef>
+        </p:style>
+      </p:cxnSp>
+      <p:cxnSp>
+        <p:nvCxnSpPr>
+          <p:cNvPr id="10" name="Connecteur droit 9"/>
+          <p:cNvCxnSpPr>
+            <a:stCxn id="4" idx="2"/>
+          </p:cNvCxnSpPr>
+          <p:nvPr/>
+        </p:nvCxnSpPr>
+        <p:spPr>
+          <a:xfrm>
+            <a:off x="1619672" y="3915188"/>
+            <a:ext cx="2232248" cy="1325519"/>
+          </a:xfrm>
+          <a:prstGeom prst="line">
+            <a:avLst/>
+          </a:prstGeom>
+        </p:spPr>
+        <p:style>
+          <a:lnRef idx="1">
+            <a:schemeClr val="accent1"/>
+          </a:lnRef>
+          <a:fillRef idx="0">
+            <a:schemeClr val="accent1"/>
+          </a:fillRef>
+          <a:effectRef idx="0">
+            <a:schemeClr val="accent1"/>
+          </a:effectRef>
+          <a:fontRef idx="minor">
+            <a:schemeClr val="tx1"/>
+          </a:fontRef>
+        </p:style>
+      </p:cxnSp>
+      <p:cxnSp>
+        <p:nvCxnSpPr>
+          <p:cNvPr id="12" name="Connecteur droit 11"/>
+          <p:cNvCxnSpPr>
+            <a:stCxn id="2" idx="3"/>
+            <a:endCxn id="3" idx="1"/>
+          </p:cNvCxnSpPr>
+          <p:nvPr/>
+        </p:nvCxnSpPr>
+        <p:spPr>
+          <a:xfrm>
+            <a:off x="3707904" y="1385156"/>
+            <a:ext cx="1440160" cy="0"/>
+          </a:xfrm>
+          <a:prstGeom prst="line">
+            <a:avLst/>
+          </a:prstGeom>
+        </p:spPr>
+        <p:style>
+          <a:lnRef idx="1">
+            <a:schemeClr val="accent1"/>
+          </a:lnRef>
+          <a:fillRef idx="0">
+            <a:schemeClr val="accent1"/>
+          </a:fillRef>
+          <a:effectRef idx="0">
+            <a:schemeClr val="accent1"/>
+          </a:effectRef>
+          <a:fontRef idx="minor">
+            <a:schemeClr val="tx1"/>
+          </a:fontRef>
+        </p:style>
+      </p:cxnSp>
+      <p:cxnSp>
+        <p:nvCxnSpPr>
+          <p:cNvPr id="16" name="Connecteur droit 15"/>
+          <p:cNvCxnSpPr>
+            <a:stCxn id="3" idx="2"/>
+          </p:cNvCxnSpPr>
+          <p:nvPr/>
+        </p:nvCxnSpPr>
+        <p:spPr>
+          <a:xfrm>
+            <a:off x="6084168" y="1853208"/>
+            <a:ext cx="1872208" cy="1359768"/>
+          </a:xfrm>
+          <a:prstGeom prst="line">
+            <a:avLst/>
+          </a:prstGeom>
+        </p:spPr>
+        <p:style>
+          <a:lnRef idx="1">
+            <a:schemeClr val="accent1"/>
+          </a:lnRef>
+          <a:fillRef idx="0">
+            <a:schemeClr val="accent1"/>
+          </a:fillRef>
+          <a:effectRef idx="0">
+            <a:schemeClr val="accent1"/>
+          </a:effectRef>
+          <a:fontRef idx="minor">
+            <a:schemeClr val="tx1"/>
+          </a:fontRef>
+        </p:style>
+      </p:cxnSp>
+      <p:cxnSp>
+        <p:nvCxnSpPr>
+          <p:cNvPr id="18" name="Connecteur droit 17"/>
+          <p:cNvCxnSpPr>
+            <a:stCxn id="6" idx="3"/>
+            <a:endCxn id="5" idx="2"/>
+          </p:cNvCxnSpPr>
+          <p:nvPr/>
+        </p:nvCxnSpPr>
+        <p:spPr>
+          <a:xfrm flipV="1">
+            <a:off x="5615849" y="3995312"/>
+            <a:ext cx="2052495" cy="1245395"/>
+          </a:xfrm>
+          <a:prstGeom prst="line">
+            <a:avLst/>
+          </a:prstGeom>
+        </p:spPr>
+        <p:style>
+          <a:lnRef idx="1">
+            <a:schemeClr val="accent1"/>
+          </a:lnRef>
+          <a:fillRef idx="0">
+            <a:schemeClr val="accent1"/>
+          </a:fillRef>
+          <a:effectRef idx="0">
+            <a:schemeClr val="accent1"/>
+          </a:effectRef>
+          <a:fontRef idx="minor">
+            <a:schemeClr val="tx1"/>
+          </a:fontRef>
+        </p:style>
+      </p:cxnSp>
+      <p:cxnSp>
+        <p:nvCxnSpPr>
+          <p:cNvPr id="20" name="Connecteur droit 19"/>
+          <p:cNvCxnSpPr>
+            <a:stCxn id="2" idx="2"/>
+            <a:endCxn id="6" idx="0"/>
+          </p:cNvCxnSpPr>
+          <p:nvPr/>
+        </p:nvCxnSpPr>
+        <p:spPr>
+          <a:xfrm>
+            <a:off x="2771800" y="1853208"/>
+            <a:ext cx="1907945" cy="2919447"/>
+          </a:xfrm>
+          <a:prstGeom prst="line">
+            <a:avLst/>
+          </a:prstGeom>
+        </p:spPr>
+        <p:style>
+          <a:lnRef idx="1">
+            <a:schemeClr val="accent1"/>
+          </a:lnRef>
+          <a:fillRef idx="0">
+            <a:schemeClr val="accent1"/>
+          </a:fillRef>
+          <a:effectRef idx="0">
+            <a:schemeClr val="accent1"/>
+          </a:effectRef>
+          <a:fontRef idx="minor">
+            <a:schemeClr val="tx1"/>
+          </a:fontRef>
+        </p:style>
+      </p:cxnSp>
+      <p:cxnSp>
+        <p:nvCxnSpPr>
+          <p:cNvPr id="22" name="Connecteur droit 21"/>
+          <p:cNvCxnSpPr>
+            <a:stCxn id="2" idx="2"/>
+            <a:endCxn id="5" idx="1"/>
+          </p:cNvCxnSpPr>
+          <p:nvPr/>
+        </p:nvCxnSpPr>
+        <p:spPr>
+          <a:xfrm>
+            <a:off x="2771800" y="1853208"/>
+            <a:ext cx="3960440" cy="1674052"/>
+          </a:xfrm>
+          <a:prstGeom prst="line">
+            <a:avLst/>
+          </a:prstGeom>
+        </p:spPr>
+        <p:style>
+          <a:lnRef idx="1">
+            <a:schemeClr val="accent1"/>
+          </a:lnRef>
+          <a:fillRef idx="0">
+            <a:schemeClr val="accent1"/>
+          </a:fillRef>
+          <a:effectRef idx="0">
+            <a:schemeClr val="accent1"/>
+          </a:effectRef>
+          <a:fontRef idx="minor">
+            <a:schemeClr val="tx1"/>
+          </a:fontRef>
+        </p:style>
+      </p:cxnSp>
+      <p:cxnSp>
+        <p:nvCxnSpPr>
+          <p:cNvPr id="24" name="Connecteur droit 23"/>
+          <p:cNvCxnSpPr>
+            <a:stCxn id="3" idx="2"/>
+            <a:endCxn id="4" idx="3"/>
+          </p:cNvCxnSpPr>
+          <p:nvPr/>
+        </p:nvCxnSpPr>
+        <p:spPr>
+          <a:xfrm flipH="1">
+            <a:off x="2555776" y="1853208"/>
+            <a:ext cx="3528392" cy="1593928"/>
+          </a:xfrm>
+          <a:prstGeom prst="line">
+            <a:avLst/>
+          </a:prstGeom>
+        </p:spPr>
+        <p:style>
+          <a:lnRef idx="1">
+            <a:schemeClr val="accent1"/>
+          </a:lnRef>
+          <a:fillRef idx="0">
+            <a:schemeClr val="accent1"/>
+          </a:fillRef>
+          <a:effectRef idx="0">
+            <a:schemeClr val="accent1"/>
+          </a:effectRef>
+          <a:fontRef idx="minor">
+            <a:schemeClr val="tx1"/>
+          </a:fontRef>
+        </p:style>
+      </p:cxnSp>
+      <p:cxnSp>
+        <p:nvCxnSpPr>
+          <p:cNvPr id="26" name="Connecteur droit 25"/>
+          <p:cNvCxnSpPr>
+            <a:stCxn id="3" idx="2"/>
+            <a:endCxn id="6" idx="0"/>
+          </p:cNvCxnSpPr>
+          <p:nvPr/>
+        </p:nvCxnSpPr>
+        <p:spPr>
+          <a:xfrm flipH="1">
+            <a:off x="4679745" y="1853208"/>
+            <a:ext cx="1404423" cy="2919447"/>
+          </a:xfrm>
+          <a:prstGeom prst="line">
+            <a:avLst/>
+          </a:prstGeom>
+        </p:spPr>
+        <p:style>
+          <a:lnRef idx="1">
+            <a:schemeClr val="accent1"/>
+          </a:lnRef>
+          <a:fillRef idx="0">
+            <a:schemeClr val="accent1"/>
+          </a:fillRef>
+          <a:effectRef idx="0">
+            <a:schemeClr val="accent1"/>
+          </a:effectRef>
+          <a:fontRef idx="minor">
+            <a:schemeClr val="tx1"/>
+          </a:fontRef>
+        </p:style>
+      </p:cxnSp>
+      <p:cxnSp>
+        <p:nvCxnSpPr>
+          <p:cNvPr id="28" name="Connecteur droit 27"/>
+          <p:cNvCxnSpPr>
+            <a:stCxn id="4" idx="3"/>
+            <a:endCxn id="5" idx="1"/>
+          </p:cNvCxnSpPr>
+          <p:nvPr/>
+        </p:nvCxnSpPr>
+        <p:spPr>
+          <a:xfrm>
+            <a:off x="2555776" y="3447136"/>
+            <a:ext cx="4176464" cy="80124"/>
+          </a:xfrm>
+          <a:prstGeom prst="line">
+            <a:avLst/>
+          </a:prstGeom>
+        </p:spPr>
+        <p:style>
+          <a:lnRef idx="1">
+            <a:schemeClr val="accent1"/>
+          </a:lnRef>
+          <a:fillRef idx="0">
+            <a:schemeClr val="accent1"/>
+          </a:fillRef>
+          <a:effectRef idx="0">
+            <a:schemeClr val="accent1"/>
+          </a:effectRef>
+          <a:fontRef idx="minor">
+            <a:schemeClr val="tx1"/>
+          </a:fontRef>
+        </p:style>
+      </p:cxnSp>
+    </p:spTree>
+    <p:extLst>
+      <p:ext uri="{BB962C8B-B14F-4D97-AF65-F5344CB8AC3E}">
+        <p14:creationId xmlns:p14="http://schemas.microsoft.com/office/powerpoint/2010/main" val="3716341983"/>
+      </p:ext>
+    </p:extLst>
+  </p:cSld>
+  <p:clrMapOvr>
+    <a:masterClrMapping/>
+  </p:clrMapOvr>
+</p:sld>
+</file>
+
+<file path=ppt/slides/slide19.xml><?xml version="1.0" encoding="utf-8"?>
+<p:sld xmlns:a="http://schemas.openxmlformats.org/drawingml/2006/main" xmlns:r="http://schemas.openxmlformats.org/officeDocument/2006/relationships" xmlns:p="http://schemas.openxmlformats.org/presentationml/2006/main">
+  <p:cSld>
+    <p:spTree>
+      <p:nvGrpSpPr>
+        <p:cNvPr id="1" name=""/>
+        <p:cNvGrpSpPr/>
+        <p:nvPr/>
+      </p:nvGrpSpPr>
+      <p:grpSpPr>
+        <a:xfrm>
+          <a:off x="0" y="0"/>
+          <a:ext cx="0" cy="0"/>
+          <a:chOff x="0" y="0"/>
+          <a:chExt cx="0" cy="0"/>
+        </a:xfrm>
+      </p:grpSpPr>
+      <p:sp>
+        <p:nvSpPr>
+          <p:cNvPr id="2" name="Rectangle à coins arrondis 1"/>
+          <p:cNvSpPr/>
+          <p:nvPr/>
+        </p:nvSpPr>
+        <p:spPr>
+          <a:xfrm>
+            <a:off x="1835696" y="917104"/>
+            <a:ext cx="1872208" cy="936104"/>
+          </a:xfrm>
+          <a:prstGeom prst="roundRect">
+            <a:avLst/>
+          </a:prstGeom>
+        </p:spPr>
+        <p:style>
+          <a:lnRef idx="2">
+            <a:schemeClr val="dk1">
+              <a:shade val="50000"/>
+            </a:schemeClr>
+          </a:lnRef>
+          <a:fillRef idx="1">
+            <a:schemeClr val="dk1"/>
+          </a:fillRef>
+          <a:effectRef idx="0">
+            <a:schemeClr val="dk1"/>
+          </a:effectRef>
+          <a:fontRef idx="minor">
+            <a:schemeClr val="lt1"/>
+          </a:fontRef>
+        </p:style>
+        <p:txBody>
+          <a:bodyPr rtlCol="0" anchor="ctr"/>
+          <a:lstStyle/>
+          <a:p>
+            <a:pPr algn="ctr"/>
+            <a:r>
+              <a:rPr lang="fr-FR" dirty="0" smtClean="0"/>
+              <a:t>App A</a:t>
+            </a:r>
+            <a:endParaRPr lang="fr-FR" dirty="0"/>
+          </a:p>
+        </p:txBody>
+      </p:sp>
+      <p:sp>
+        <p:nvSpPr>
+          <p:cNvPr id="3" name="Rectangle à coins arrondis 2"/>
+          <p:cNvSpPr/>
+          <p:nvPr/>
+        </p:nvSpPr>
+        <p:spPr>
+          <a:xfrm>
+            <a:off x="5148064" y="917104"/>
+            <a:ext cx="1872208" cy="936104"/>
+          </a:xfrm>
+          <a:prstGeom prst="roundRect">
+            <a:avLst/>
+          </a:prstGeom>
+        </p:spPr>
+        <p:style>
+          <a:lnRef idx="2">
+            <a:schemeClr val="accent1">
+              <a:shade val="50000"/>
+            </a:schemeClr>
+          </a:lnRef>
+          <a:fillRef idx="1">
+            <a:schemeClr val="accent1"/>
+          </a:fillRef>
+          <a:effectRef idx="0">
+            <a:schemeClr val="accent1"/>
+          </a:effectRef>
+          <a:fontRef idx="minor">
+            <a:schemeClr val="lt1"/>
+          </a:fontRef>
+        </p:style>
+        <p:txBody>
+          <a:bodyPr rtlCol="0" anchor="ctr"/>
+          <a:lstStyle/>
+          <a:p>
+            <a:pPr algn="ctr"/>
+            <a:r>
+              <a:rPr lang="fr-FR" dirty="0" smtClean="0"/>
+              <a:t>App B</a:t>
+            </a:r>
+            <a:endParaRPr lang="fr-FR" dirty="0"/>
+          </a:p>
+        </p:txBody>
+      </p:sp>
+      <p:sp>
+        <p:nvSpPr>
+          <p:cNvPr id="4" name="Rectangle à coins arrondis 3"/>
+          <p:cNvSpPr/>
+          <p:nvPr/>
+        </p:nvSpPr>
+        <p:spPr>
+          <a:xfrm>
+            <a:off x="670961" y="2826810"/>
+            <a:ext cx="1872208" cy="936104"/>
+          </a:xfrm>
+          <a:prstGeom prst="roundRect">
+            <a:avLst/>
+          </a:prstGeom>
+        </p:spPr>
+        <p:style>
+          <a:lnRef idx="2">
+            <a:schemeClr val="accent2">
+              <a:shade val="50000"/>
+            </a:schemeClr>
+          </a:lnRef>
+          <a:fillRef idx="1">
+            <a:schemeClr val="accent2"/>
+          </a:fillRef>
+          <a:effectRef idx="0">
+            <a:schemeClr val="accent2"/>
+          </a:effectRef>
+          <a:fontRef idx="minor">
+            <a:schemeClr val="lt1"/>
+          </a:fontRef>
+        </p:style>
+        <p:txBody>
+          <a:bodyPr rtlCol="0" anchor="ctr"/>
+          <a:lstStyle/>
+          <a:p>
+            <a:pPr algn="ctr"/>
+            <a:r>
+              <a:rPr lang="fr-FR" dirty="0" smtClean="0"/>
+              <a:t>App C</a:t>
+            </a:r>
+            <a:endParaRPr lang="fr-FR" dirty="0"/>
+          </a:p>
+        </p:txBody>
+      </p:sp>
+      <p:sp>
+        <p:nvSpPr>
+          <p:cNvPr id="5" name="Rectangle à coins arrondis 4"/>
+          <p:cNvSpPr/>
+          <p:nvPr/>
+        </p:nvSpPr>
+        <p:spPr>
+          <a:xfrm>
+            <a:off x="6876256" y="2877568"/>
+            <a:ext cx="1872208" cy="936104"/>
+          </a:xfrm>
+          <a:prstGeom prst="roundRect">
+            <a:avLst/>
+          </a:prstGeom>
+        </p:spPr>
+        <p:style>
+          <a:lnRef idx="2">
+            <a:schemeClr val="accent4">
+              <a:shade val="50000"/>
+            </a:schemeClr>
+          </a:lnRef>
+          <a:fillRef idx="1">
+            <a:schemeClr val="accent4"/>
+          </a:fillRef>
+          <a:effectRef idx="0">
+            <a:schemeClr val="accent4"/>
+          </a:effectRef>
+          <a:fontRef idx="minor">
+            <a:schemeClr val="lt1"/>
+          </a:fontRef>
+        </p:style>
+        <p:txBody>
+          <a:bodyPr rtlCol="0" anchor="ctr"/>
+          <a:lstStyle/>
+          <a:p>
+            <a:pPr algn="ctr"/>
+            <a:r>
+              <a:rPr lang="fr-FR" dirty="0" smtClean="0"/>
+              <a:t>App D</a:t>
+            </a:r>
+            <a:endParaRPr lang="fr-FR" dirty="0"/>
+          </a:p>
+        </p:txBody>
+      </p:sp>
+      <p:sp>
+        <p:nvSpPr>
+          <p:cNvPr id="6" name="Rectangle à coins arrondis 5"/>
+          <p:cNvSpPr/>
+          <p:nvPr/>
+        </p:nvSpPr>
+        <p:spPr>
+          <a:xfrm>
+            <a:off x="3743641" y="4772655"/>
+            <a:ext cx="1872208" cy="936104"/>
+          </a:xfrm>
+          <a:prstGeom prst="roundRect">
+            <a:avLst/>
+          </a:prstGeom>
+        </p:spPr>
+        <p:style>
+          <a:lnRef idx="2">
+            <a:schemeClr val="accent6">
+              <a:shade val="50000"/>
+            </a:schemeClr>
+          </a:lnRef>
+          <a:fillRef idx="1">
+            <a:schemeClr val="accent6"/>
+          </a:fillRef>
+          <a:effectRef idx="0">
+            <a:schemeClr val="accent6"/>
+          </a:effectRef>
+          <a:fontRef idx="minor">
+            <a:schemeClr val="lt1"/>
+          </a:fontRef>
+        </p:style>
+        <p:txBody>
+          <a:bodyPr rtlCol="0" anchor="ctr"/>
+          <a:lstStyle/>
+          <a:p>
+            <a:pPr algn="ctr"/>
+            <a:r>
+              <a:rPr lang="fr-FR" dirty="0" smtClean="0"/>
+              <a:t>App E</a:t>
+            </a:r>
+            <a:endParaRPr lang="fr-FR" dirty="0"/>
+          </a:p>
+        </p:txBody>
+      </p:sp>
+      <p:sp>
+        <p:nvSpPr>
+          <p:cNvPr id="7" name="Rectangle à coins arrondis 6"/>
+          <p:cNvSpPr/>
+          <p:nvPr/>
+        </p:nvSpPr>
+        <p:spPr>
+          <a:xfrm>
+            <a:off x="3203848" y="2492896"/>
+            <a:ext cx="3024336" cy="1502416"/>
+          </a:xfrm>
+          <a:prstGeom prst="roundRect">
+            <a:avLst/>
+          </a:prstGeom>
+        </p:spPr>
+        <p:style>
+          <a:lnRef idx="1">
+            <a:schemeClr val="accent5"/>
+          </a:lnRef>
+          <a:fillRef idx="2">
+            <a:schemeClr val="accent5"/>
+          </a:fillRef>
+          <a:effectRef idx="1">
+            <a:schemeClr val="accent5"/>
+          </a:effectRef>
+          <a:fontRef idx="minor">
+            <a:schemeClr val="dk1"/>
+          </a:fontRef>
+        </p:style>
+        <p:txBody>
+          <a:bodyPr rtlCol="0" anchor="ctr"/>
+          <a:lstStyle/>
+          <a:p>
+            <a:pPr algn="ctr"/>
+            <a:r>
+              <a:rPr lang="fr-FR" sz="4400" dirty="0" smtClean="0"/>
+              <a:t>EAI</a:t>
+            </a:r>
+            <a:endParaRPr lang="fr-FR" sz="4400" dirty="0"/>
+          </a:p>
+        </p:txBody>
+      </p:sp>
+      <p:cxnSp>
+        <p:nvCxnSpPr>
+          <p:cNvPr id="11" name="Connecteur droit 10"/>
+          <p:cNvCxnSpPr>
+            <a:stCxn id="2" idx="2"/>
+          </p:cNvCxnSpPr>
+          <p:nvPr/>
+        </p:nvCxnSpPr>
+        <p:spPr>
+          <a:xfrm>
+            <a:off x="2771800" y="1853208"/>
+            <a:ext cx="972108" cy="639688"/>
+          </a:xfrm>
+          <a:prstGeom prst="line">
+            <a:avLst/>
+          </a:prstGeom>
+        </p:spPr>
+        <p:style>
+          <a:lnRef idx="1">
+            <a:schemeClr val="accent1"/>
+          </a:lnRef>
+          <a:fillRef idx="0">
+            <a:schemeClr val="accent1"/>
+          </a:fillRef>
+          <a:effectRef idx="0">
+            <a:schemeClr val="accent1"/>
+          </a:effectRef>
+          <a:fontRef idx="minor">
+            <a:schemeClr val="tx1"/>
+          </a:fontRef>
+        </p:style>
+      </p:cxnSp>
+      <p:cxnSp>
+        <p:nvCxnSpPr>
+          <p:cNvPr id="14" name="Connecteur droit 13"/>
+          <p:cNvCxnSpPr>
+            <a:stCxn id="3" idx="2"/>
+          </p:cNvCxnSpPr>
+          <p:nvPr/>
+        </p:nvCxnSpPr>
+        <p:spPr>
+          <a:xfrm flipH="1">
+            <a:off x="5615849" y="1853208"/>
+            <a:ext cx="468319" cy="639688"/>
+          </a:xfrm>
+          <a:prstGeom prst="line">
+            <a:avLst/>
+          </a:prstGeom>
+        </p:spPr>
+        <p:style>
+          <a:lnRef idx="1">
+            <a:schemeClr val="accent1"/>
+          </a:lnRef>
+          <a:fillRef idx="0">
+            <a:schemeClr val="accent1"/>
+          </a:fillRef>
+          <a:effectRef idx="0">
+            <a:schemeClr val="accent1"/>
+          </a:effectRef>
+          <a:fontRef idx="minor">
+            <a:schemeClr val="tx1"/>
+          </a:fontRef>
+        </p:style>
+      </p:cxnSp>
+      <p:cxnSp>
+        <p:nvCxnSpPr>
+          <p:cNvPr id="17" name="Connecteur droit 16"/>
+          <p:cNvCxnSpPr>
+            <a:stCxn id="4" idx="3"/>
+            <a:endCxn id="7" idx="1"/>
+          </p:cNvCxnSpPr>
+          <p:nvPr/>
+        </p:nvCxnSpPr>
+        <p:spPr>
+          <a:xfrm flipV="1">
+            <a:off x="2543169" y="3244104"/>
+            <a:ext cx="660679" cy="50758"/>
+          </a:xfrm>
+          <a:prstGeom prst="line">
+            <a:avLst/>
+          </a:prstGeom>
+        </p:spPr>
+        <p:style>
+          <a:lnRef idx="1">
+            <a:schemeClr val="accent1"/>
+          </a:lnRef>
+          <a:fillRef idx="0">
+            <a:schemeClr val="accent1"/>
+          </a:fillRef>
+          <a:effectRef idx="0">
+            <a:schemeClr val="accent1"/>
+          </a:effectRef>
+          <a:fontRef idx="minor">
+            <a:schemeClr val="tx1"/>
+          </a:fontRef>
+        </p:style>
+      </p:cxnSp>
+      <p:cxnSp>
+        <p:nvCxnSpPr>
+          <p:cNvPr id="21" name="Connecteur droit 20"/>
+          <p:cNvCxnSpPr>
+            <a:stCxn id="6" idx="0"/>
+            <a:endCxn id="7" idx="2"/>
+          </p:cNvCxnSpPr>
+          <p:nvPr/>
+        </p:nvCxnSpPr>
+        <p:spPr>
+          <a:xfrm flipV="1">
+            <a:off x="4679745" y="3995312"/>
+            <a:ext cx="36271" cy="777343"/>
+          </a:xfrm>
+          <a:prstGeom prst="line">
+            <a:avLst/>
+          </a:prstGeom>
+        </p:spPr>
+        <p:style>
+          <a:lnRef idx="1">
+            <a:schemeClr val="accent1"/>
+          </a:lnRef>
+          <a:fillRef idx="0">
+            <a:schemeClr val="accent1"/>
+          </a:fillRef>
+          <a:effectRef idx="0">
+            <a:schemeClr val="accent1"/>
+          </a:effectRef>
+          <a:fontRef idx="minor">
+            <a:schemeClr val="tx1"/>
+          </a:fontRef>
+        </p:style>
+      </p:cxnSp>
+      <p:cxnSp>
+        <p:nvCxnSpPr>
+          <p:cNvPr id="27" name="Connecteur droit 26"/>
+          <p:cNvCxnSpPr>
+            <a:stCxn id="5" idx="1"/>
+            <a:endCxn id="7" idx="3"/>
+          </p:cNvCxnSpPr>
+          <p:nvPr/>
+        </p:nvCxnSpPr>
+        <p:spPr>
+          <a:xfrm flipH="1" flipV="1">
+            <a:off x="6228184" y="3244104"/>
+            <a:ext cx="648072" cy="101516"/>
+          </a:xfrm>
+          <a:prstGeom prst="line">
+            <a:avLst/>
+          </a:prstGeom>
+        </p:spPr>
+        <p:style>
+          <a:lnRef idx="1">
+            <a:schemeClr val="accent1"/>
+          </a:lnRef>
+          <a:fillRef idx="0">
+            <a:schemeClr val="accent1"/>
+          </a:fillRef>
+          <a:effectRef idx="0">
+            <a:schemeClr val="accent1"/>
+          </a:effectRef>
+          <a:fontRef idx="minor">
+            <a:schemeClr val="tx1"/>
+          </a:fontRef>
+        </p:style>
+      </p:cxnSp>
+    </p:spTree>
+    <p:extLst>
+      <p:ext uri="{BB962C8B-B14F-4D97-AF65-F5344CB8AC3E}">
+        <p14:creationId xmlns:p14="http://schemas.microsoft.com/office/powerpoint/2010/main" val="2621665047"/>
       </p:ext>
     </p:extLst>
   </p:cSld>
@@ -31455,6 +31794,533 @@
     <p:extLst>
       <p:ext uri="{BB962C8B-B14F-4D97-AF65-F5344CB8AC3E}">
         <p14:creationId xmlns:p14="http://schemas.microsoft.com/office/powerpoint/2010/main" val="442698763"/>
+      </p:ext>
+    </p:extLst>
+  </p:cSld>
+  <p:clrMapOvr>
+    <a:masterClrMapping/>
+  </p:clrMapOvr>
+</p:sld>
+</file>
+
+<file path=ppt/slides/slide20.xml><?xml version="1.0" encoding="utf-8"?>
+<p:sld xmlns:a="http://schemas.openxmlformats.org/drawingml/2006/main" xmlns:r="http://schemas.openxmlformats.org/officeDocument/2006/relationships" xmlns:p="http://schemas.openxmlformats.org/presentationml/2006/main">
+  <p:cSld>
+    <p:spTree>
+      <p:nvGrpSpPr>
+        <p:cNvPr id="1" name=""/>
+        <p:cNvGrpSpPr/>
+        <p:nvPr/>
+      </p:nvGrpSpPr>
+      <p:grpSpPr>
+        <a:xfrm>
+          <a:off x="0" y="0"/>
+          <a:ext cx="0" cy="0"/>
+          <a:chOff x="0" y="0"/>
+          <a:chExt cx="0" cy="0"/>
+        </a:xfrm>
+      </p:grpSpPr>
+      <p:sp>
+        <p:nvSpPr>
+          <p:cNvPr id="2" name="Rectangle à coins arrondis 1"/>
+          <p:cNvSpPr/>
+          <p:nvPr/>
+        </p:nvSpPr>
+        <p:spPr>
+          <a:xfrm>
+            <a:off x="1043608" y="449052"/>
+            <a:ext cx="1872208" cy="936104"/>
+          </a:xfrm>
+          <a:prstGeom prst="roundRect">
+            <a:avLst/>
+          </a:prstGeom>
+        </p:spPr>
+        <p:style>
+          <a:lnRef idx="2">
+            <a:schemeClr val="dk1">
+              <a:shade val="50000"/>
+            </a:schemeClr>
+          </a:lnRef>
+          <a:fillRef idx="1">
+            <a:schemeClr val="dk1"/>
+          </a:fillRef>
+          <a:effectRef idx="0">
+            <a:schemeClr val="dk1"/>
+          </a:effectRef>
+          <a:fontRef idx="minor">
+            <a:schemeClr val="lt1"/>
+          </a:fontRef>
+        </p:style>
+        <p:txBody>
+          <a:bodyPr rtlCol="0" anchor="ctr"/>
+          <a:lstStyle/>
+          <a:p>
+            <a:pPr algn="ctr"/>
+            <a:r>
+              <a:rPr lang="fr-FR" dirty="0" smtClean="0"/>
+              <a:t>App A</a:t>
+            </a:r>
+            <a:endParaRPr lang="fr-FR" dirty="0"/>
+          </a:p>
+        </p:txBody>
+      </p:sp>
+      <p:sp>
+        <p:nvSpPr>
+          <p:cNvPr id="3" name="Rectangle à coins arrondis 2"/>
+          <p:cNvSpPr/>
+          <p:nvPr/>
+        </p:nvSpPr>
+        <p:spPr>
+          <a:xfrm>
+            <a:off x="6642096" y="491818"/>
+            <a:ext cx="1872208" cy="936104"/>
+          </a:xfrm>
+          <a:prstGeom prst="roundRect">
+            <a:avLst/>
+          </a:prstGeom>
+        </p:spPr>
+        <p:style>
+          <a:lnRef idx="2">
+            <a:schemeClr val="accent1">
+              <a:shade val="50000"/>
+            </a:schemeClr>
+          </a:lnRef>
+          <a:fillRef idx="1">
+            <a:schemeClr val="accent1"/>
+          </a:fillRef>
+          <a:effectRef idx="0">
+            <a:schemeClr val="accent1"/>
+          </a:effectRef>
+          <a:fontRef idx="minor">
+            <a:schemeClr val="lt1"/>
+          </a:fontRef>
+        </p:style>
+        <p:txBody>
+          <a:bodyPr rtlCol="0" anchor="ctr"/>
+          <a:lstStyle/>
+          <a:p>
+            <a:pPr algn="ctr"/>
+            <a:r>
+              <a:rPr lang="fr-FR" dirty="0" smtClean="0"/>
+              <a:t>App B</a:t>
+            </a:r>
+            <a:endParaRPr lang="fr-FR" dirty="0"/>
+          </a:p>
+        </p:txBody>
+      </p:sp>
+      <p:sp>
+        <p:nvSpPr>
+          <p:cNvPr id="4" name="Rectangle à coins arrondis 3"/>
+          <p:cNvSpPr/>
+          <p:nvPr/>
+        </p:nvSpPr>
+        <p:spPr>
+          <a:xfrm>
+            <a:off x="662577" y="4772655"/>
+            <a:ext cx="1872208" cy="936104"/>
+          </a:xfrm>
+          <a:prstGeom prst="roundRect">
+            <a:avLst/>
+          </a:prstGeom>
+        </p:spPr>
+        <p:style>
+          <a:lnRef idx="2">
+            <a:schemeClr val="accent2">
+              <a:shade val="50000"/>
+            </a:schemeClr>
+          </a:lnRef>
+          <a:fillRef idx="1">
+            <a:schemeClr val="accent2"/>
+          </a:fillRef>
+          <a:effectRef idx="0">
+            <a:schemeClr val="accent2"/>
+          </a:effectRef>
+          <a:fontRef idx="minor">
+            <a:schemeClr val="lt1"/>
+          </a:fontRef>
+        </p:style>
+        <p:txBody>
+          <a:bodyPr rtlCol="0" anchor="ctr"/>
+          <a:lstStyle/>
+          <a:p>
+            <a:pPr algn="ctr"/>
+            <a:r>
+              <a:rPr lang="fr-FR" dirty="0" smtClean="0"/>
+              <a:t>App C</a:t>
+            </a:r>
+            <a:endParaRPr lang="fr-FR" dirty="0"/>
+          </a:p>
+        </p:txBody>
+      </p:sp>
+      <p:sp>
+        <p:nvSpPr>
+          <p:cNvPr id="5" name="Rectangle à coins arrondis 4"/>
+          <p:cNvSpPr/>
+          <p:nvPr/>
+        </p:nvSpPr>
+        <p:spPr>
+          <a:xfrm>
+            <a:off x="6634665" y="4772655"/>
+            <a:ext cx="1872208" cy="936104"/>
+          </a:xfrm>
+          <a:prstGeom prst="roundRect">
+            <a:avLst/>
+          </a:prstGeom>
+        </p:spPr>
+        <p:style>
+          <a:lnRef idx="2">
+            <a:schemeClr val="accent4">
+              <a:shade val="50000"/>
+            </a:schemeClr>
+          </a:lnRef>
+          <a:fillRef idx="1">
+            <a:schemeClr val="accent4"/>
+          </a:fillRef>
+          <a:effectRef idx="0">
+            <a:schemeClr val="accent4"/>
+          </a:effectRef>
+          <a:fontRef idx="minor">
+            <a:schemeClr val="lt1"/>
+          </a:fontRef>
+        </p:style>
+        <p:txBody>
+          <a:bodyPr rtlCol="0" anchor="ctr"/>
+          <a:lstStyle/>
+          <a:p>
+            <a:pPr algn="ctr"/>
+            <a:r>
+              <a:rPr lang="fr-FR" dirty="0" smtClean="0"/>
+              <a:t>App D</a:t>
+            </a:r>
+            <a:endParaRPr lang="fr-FR" dirty="0"/>
+          </a:p>
+        </p:txBody>
+      </p:sp>
+      <p:sp>
+        <p:nvSpPr>
+          <p:cNvPr id="6" name="Rectangle à coins arrondis 5"/>
+          <p:cNvSpPr/>
+          <p:nvPr/>
+        </p:nvSpPr>
+        <p:spPr>
+          <a:xfrm>
+            <a:off x="3743641" y="4772655"/>
+            <a:ext cx="1872208" cy="936104"/>
+          </a:xfrm>
+          <a:prstGeom prst="roundRect">
+            <a:avLst/>
+          </a:prstGeom>
+        </p:spPr>
+        <p:style>
+          <a:lnRef idx="2">
+            <a:schemeClr val="accent6">
+              <a:shade val="50000"/>
+            </a:schemeClr>
+          </a:lnRef>
+          <a:fillRef idx="1">
+            <a:schemeClr val="accent6"/>
+          </a:fillRef>
+          <a:effectRef idx="0">
+            <a:schemeClr val="accent6"/>
+          </a:effectRef>
+          <a:fontRef idx="minor">
+            <a:schemeClr val="lt1"/>
+          </a:fontRef>
+        </p:style>
+        <p:txBody>
+          <a:bodyPr rtlCol="0" anchor="ctr"/>
+          <a:lstStyle/>
+          <a:p>
+            <a:pPr algn="ctr"/>
+            <a:r>
+              <a:rPr lang="fr-FR" dirty="0" smtClean="0"/>
+              <a:t>App E</a:t>
+            </a:r>
+            <a:endParaRPr lang="fr-FR" dirty="0"/>
+          </a:p>
+        </p:txBody>
+      </p:sp>
+      <p:cxnSp>
+        <p:nvCxnSpPr>
+          <p:cNvPr id="8" name="Connecteur droit 7"/>
+          <p:cNvCxnSpPr>
+            <a:stCxn id="2" idx="2"/>
+            <a:endCxn id="4" idx="0"/>
+          </p:cNvCxnSpPr>
+          <p:nvPr/>
+        </p:nvCxnSpPr>
+        <p:spPr>
+          <a:xfrm flipH="1">
+            <a:off x="1598681" y="1385156"/>
+            <a:ext cx="381031" cy="3387499"/>
+          </a:xfrm>
+          <a:prstGeom prst="line">
+            <a:avLst/>
+          </a:prstGeom>
+        </p:spPr>
+        <p:style>
+          <a:lnRef idx="1">
+            <a:schemeClr val="accent1"/>
+          </a:lnRef>
+          <a:fillRef idx="0">
+            <a:schemeClr val="accent1"/>
+          </a:fillRef>
+          <a:effectRef idx="0">
+            <a:schemeClr val="accent1"/>
+          </a:effectRef>
+          <a:fontRef idx="minor">
+            <a:schemeClr val="tx1"/>
+          </a:fontRef>
+        </p:style>
+      </p:cxnSp>
+      <p:cxnSp>
+        <p:nvCxnSpPr>
+          <p:cNvPr id="12" name="Connecteur droit 11"/>
+          <p:cNvCxnSpPr>
+            <a:stCxn id="2" idx="3"/>
+            <a:endCxn id="3" idx="1"/>
+          </p:cNvCxnSpPr>
+          <p:nvPr/>
+        </p:nvCxnSpPr>
+        <p:spPr>
+          <a:xfrm>
+            <a:off x="2915816" y="917104"/>
+            <a:ext cx="3726280" cy="42766"/>
+          </a:xfrm>
+          <a:prstGeom prst="line">
+            <a:avLst/>
+          </a:prstGeom>
+        </p:spPr>
+        <p:style>
+          <a:lnRef idx="1">
+            <a:schemeClr val="accent1"/>
+          </a:lnRef>
+          <a:fillRef idx="0">
+            <a:schemeClr val="accent1"/>
+          </a:fillRef>
+          <a:effectRef idx="0">
+            <a:schemeClr val="accent1"/>
+          </a:effectRef>
+          <a:fontRef idx="minor">
+            <a:schemeClr val="tx1"/>
+          </a:fontRef>
+        </p:style>
+      </p:cxnSp>
+      <p:cxnSp>
+        <p:nvCxnSpPr>
+          <p:cNvPr id="20" name="Connecteur droit 19"/>
+          <p:cNvCxnSpPr>
+            <a:stCxn id="2" idx="2"/>
+            <a:endCxn id="6" idx="0"/>
+          </p:cNvCxnSpPr>
+          <p:nvPr/>
+        </p:nvCxnSpPr>
+        <p:spPr>
+          <a:xfrm>
+            <a:off x="1979712" y="1385156"/>
+            <a:ext cx="2700033" cy="3387499"/>
+          </a:xfrm>
+          <a:prstGeom prst="line">
+            <a:avLst/>
+          </a:prstGeom>
+        </p:spPr>
+        <p:style>
+          <a:lnRef idx="1">
+            <a:schemeClr val="accent1"/>
+          </a:lnRef>
+          <a:fillRef idx="0">
+            <a:schemeClr val="accent1"/>
+          </a:fillRef>
+          <a:effectRef idx="0">
+            <a:schemeClr val="accent1"/>
+          </a:effectRef>
+          <a:fontRef idx="minor">
+            <a:schemeClr val="tx1"/>
+          </a:fontRef>
+        </p:style>
+      </p:cxnSp>
+      <p:cxnSp>
+        <p:nvCxnSpPr>
+          <p:cNvPr id="22" name="Connecteur droit 21"/>
+          <p:cNvCxnSpPr>
+            <a:stCxn id="2" idx="2"/>
+          </p:cNvCxnSpPr>
+          <p:nvPr/>
+        </p:nvCxnSpPr>
+        <p:spPr>
+          <a:xfrm>
+            <a:off x="1979712" y="1385156"/>
+            <a:ext cx="5400600" cy="3387499"/>
+          </a:xfrm>
+          <a:prstGeom prst="line">
+            <a:avLst/>
+          </a:prstGeom>
+        </p:spPr>
+        <p:style>
+          <a:lnRef idx="1">
+            <a:schemeClr val="accent1"/>
+          </a:lnRef>
+          <a:fillRef idx="0">
+            <a:schemeClr val="accent1"/>
+          </a:fillRef>
+          <a:effectRef idx="0">
+            <a:schemeClr val="accent1"/>
+          </a:effectRef>
+          <a:fontRef idx="minor">
+            <a:schemeClr val="tx1"/>
+          </a:fontRef>
+        </p:style>
+      </p:cxnSp>
+      <p:cxnSp>
+        <p:nvCxnSpPr>
+          <p:cNvPr id="24" name="Connecteur droit 23"/>
+          <p:cNvCxnSpPr>
+            <a:stCxn id="3" idx="2"/>
+            <a:endCxn id="4" idx="0"/>
+          </p:cNvCxnSpPr>
+          <p:nvPr/>
+        </p:nvCxnSpPr>
+        <p:spPr>
+          <a:xfrm flipH="1">
+            <a:off x="1598681" y="1427922"/>
+            <a:ext cx="5979519" cy="3344733"/>
+          </a:xfrm>
+          <a:prstGeom prst="line">
+            <a:avLst/>
+          </a:prstGeom>
+        </p:spPr>
+        <p:style>
+          <a:lnRef idx="1">
+            <a:schemeClr val="accent1"/>
+          </a:lnRef>
+          <a:fillRef idx="0">
+            <a:schemeClr val="accent1"/>
+          </a:fillRef>
+          <a:effectRef idx="0">
+            <a:schemeClr val="accent1"/>
+          </a:effectRef>
+          <a:fontRef idx="minor">
+            <a:schemeClr val="tx1"/>
+          </a:fontRef>
+        </p:style>
+      </p:cxnSp>
+      <p:cxnSp>
+        <p:nvCxnSpPr>
+          <p:cNvPr id="26" name="Connecteur droit 25"/>
+          <p:cNvCxnSpPr>
+            <a:stCxn id="3" idx="2"/>
+            <a:endCxn id="6" idx="0"/>
+          </p:cNvCxnSpPr>
+          <p:nvPr/>
+        </p:nvCxnSpPr>
+        <p:spPr>
+          <a:xfrm flipH="1">
+            <a:off x="4679745" y="1427922"/>
+            <a:ext cx="2898455" cy="3344733"/>
+          </a:xfrm>
+          <a:prstGeom prst="line">
+            <a:avLst/>
+          </a:prstGeom>
+        </p:spPr>
+        <p:style>
+          <a:lnRef idx="1">
+            <a:schemeClr val="accent1"/>
+          </a:lnRef>
+          <a:fillRef idx="0">
+            <a:schemeClr val="accent1"/>
+          </a:fillRef>
+          <a:effectRef idx="0">
+            <a:schemeClr val="accent1"/>
+          </a:effectRef>
+          <a:fontRef idx="minor">
+            <a:schemeClr val="tx1"/>
+          </a:fontRef>
+        </p:style>
+      </p:cxnSp>
+      <p:sp>
+        <p:nvSpPr>
+          <p:cNvPr id="30" name="Rectangle à coins arrondis 29"/>
+          <p:cNvSpPr/>
+          <p:nvPr/>
+        </p:nvSpPr>
+        <p:spPr>
+          <a:xfrm>
+            <a:off x="539552" y="1988840"/>
+            <a:ext cx="7992888" cy="1969266"/>
+          </a:xfrm>
+          <a:prstGeom prst="roundRect">
+            <a:avLst/>
+          </a:prstGeom>
+          <a:solidFill>
+            <a:srgbClr val="000000">
+              <a:alpha val="45098"/>
+            </a:srgbClr>
+          </a:solidFill>
+        </p:spPr>
+        <p:style>
+          <a:lnRef idx="1">
+            <a:schemeClr val="accent5"/>
+          </a:lnRef>
+          <a:fillRef idx="2">
+            <a:schemeClr val="accent5"/>
+          </a:fillRef>
+          <a:effectRef idx="1">
+            <a:schemeClr val="accent5"/>
+          </a:effectRef>
+          <a:fontRef idx="minor">
+            <a:schemeClr val="dk1"/>
+          </a:fontRef>
+        </p:style>
+        <p:txBody>
+          <a:bodyPr rtlCol="0" anchor="ctr"/>
+          <a:lstStyle/>
+          <a:p>
+            <a:pPr algn="ctr"/>
+            <a:r>
+              <a:rPr lang="fr-FR" sz="4800" dirty="0" smtClean="0"/>
+              <a:t>ESB</a:t>
+            </a:r>
+            <a:endParaRPr lang="fr-FR" sz="4800" dirty="0"/>
+          </a:p>
+        </p:txBody>
+      </p:sp>
+      <p:cxnSp>
+        <p:nvCxnSpPr>
+          <p:cNvPr id="32" name="Connecteur droit 31"/>
+          <p:cNvCxnSpPr>
+            <a:stCxn id="3" idx="2"/>
+            <a:endCxn id="5" idx="0"/>
+          </p:cNvCxnSpPr>
+          <p:nvPr/>
+        </p:nvCxnSpPr>
+        <p:spPr>
+          <a:xfrm flipH="1">
+            <a:off x="7570769" y="1427922"/>
+            <a:ext cx="7431" cy="3344733"/>
+          </a:xfrm>
+          <a:prstGeom prst="line">
+            <a:avLst/>
+          </a:prstGeom>
+        </p:spPr>
+        <p:style>
+          <a:lnRef idx="1">
+            <a:schemeClr val="accent1"/>
+          </a:lnRef>
+          <a:fillRef idx="0">
+            <a:schemeClr val="accent1"/>
+          </a:fillRef>
+          <a:effectRef idx="0">
+            <a:schemeClr val="accent1"/>
+          </a:effectRef>
+          <a:fontRef idx="minor">
+            <a:schemeClr val="tx1"/>
+          </a:fontRef>
+        </p:style>
+      </p:cxnSp>
+    </p:spTree>
+    <p:extLst>
+      <p:ext uri="{BB962C8B-B14F-4D97-AF65-F5344CB8AC3E}">
+        <p14:creationId xmlns:p14="http://schemas.microsoft.com/office/powerpoint/2010/main" val="684939019"/>
       </p:ext>
     </p:extLst>
   </p:cSld>

</xml_diff>